<commit_message>
rh / redgate differencing is roughed in...yes folks, differencing.
</commit_message>
<xml_diff>
--- a/docs/RoundhousEPresentation.pptx
+++ b/docs/RoundhousEPresentation.pptx
@@ -5,15 +5,18 @@
     <p:sldMasterId id="2147483660" r:id="rId1"/>
   </p:sldMasterIdLst>
   <p:notesMasterIdLst>
-    <p:notesMasterId r:id="rId8"/>
+    <p:notesMasterId r:id="rId11"/>
   </p:notesMasterIdLst>
   <p:sldIdLst>
     <p:sldId id="256" r:id="rId2"/>
-    <p:sldId id="287" r:id="rId3"/>
-    <p:sldId id="285" r:id="rId4"/>
-    <p:sldId id="295" r:id="rId5"/>
-    <p:sldId id="294" r:id="rId6"/>
-    <p:sldId id="289" r:id="rId7"/>
+    <p:sldId id="296" r:id="rId3"/>
+    <p:sldId id="295" r:id="rId4"/>
+    <p:sldId id="297" r:id="rId5"/>
+    <p:sldId id="298" r:id="rId6"/>
+    <p:sldId id="299" r:id="rId7"/>
+    <p:sldId id="300" r:id="rId8"/>
+    <p:sldId id="294" r:id="rId9"/>
+    <p:sldId id="289" r:id="rId10"/>
   </p:sldIdLst>
   <p:sldSz cx="9144000" cy="6858000" type="screen4x3"/>
   <p:notesSz cx="6858000" cy="9144000"/>
@@ -198,7 +201,7 @@
             <a:fld id="{50B9556B-D0FD-4B47-B68C-0681912A50B6}" type="datetimeFigureOut">
               <a:rPr lang="en-US" smtClean="0"/>
               <a:pPr/>
-              <a:t>01/07/2010</a:t>
+              <a:t>6/18/2010</a:t>
             </a:fld>
             <a:endParaRPr lang="en-US"/>
           </a:p>
@@ -532,7 +535,7 @@
             <a:fld id="{A1D642FB-5C7D-46F5-ABB1-701CC3AB89E6}" type="slidenum">
               <a:rPr lang="en-US" smtClean="0"/>
               <a:pPr/>
-              <a:t>2</a:t>
+              <a:t>1</a:t>
             </a:fld>
             <a:endParaRPr lang="en-US"/>
           </a:p>
@@ -592,41 +595,7 @@
           </a:bodyPr>
           <a:lstStyle/>
           <a:p>
-            <a:r>
-              <a:rPr lang="en-US" dirty="0" smtClean="0"/>
-              <a:t>Product already using </a:t>
-            </a:r>
-          </a:p>
-          <a:p>
-            <a:endParaRPr lang="en-US" dirty="0" smtClean="0"/>
-          </a:p>
-          <a:p>
-            <a:r>
-              <a:rPr lang="en-US" dirty="0" err="1" smtClean="0"/>
-              <a:t>versionBuilder</a:t>
-            </a:r>
-            <a:endParaRPr lang="en-US" dirty="0" smtClean="0"/>
-          </a:p>
-          <a:p>
-            <a:r>
-              <a:rPr lang="en-US" dirty="0" err="1" smtClean="0"/>
-              <a:t>environmentBuilder</a:t>
-            </a:r>
-            <a:endParaRPr lang="en-US" dirty="0" smtClean="0"/>
-          </a:p>
-          <a:p>
-            <a:r>
-              <a:rPr lang="en-US" dirty="0" err="1" smtClean="0"/>
-              <a:t>docBuilder</a:t>
-            </a:r>
-            <a:r>
-              <a:rPr lang="en-US" dirty="0" smtClean="0"/>
-              <a:t>?</a:t>
-            </a:r>
-            <a:endParaRPr lang="en-US" smtClean="0"/>
-          </a:p>
-          <a:p>
-            <a:endParaRPr lang="en-US"/>
+            <a:endParaRPr lang="en-US" dirty="0"/>
           </a:p>
         </p:txBody>
       </p:sp>
@@ -648,7 +617,123 @@
             <a:fld id="{A1D642FB-5C7D-46F5-ABB1-701CC3AB89E6}" type="slidenum">
               <a:rPr lang="en-US" smtClean="0"/>
               <a:pPr/>
-              <a:t>5</a:t>
+              <a:t>2</a:t>
+            </a:fld>
+            <a:endParaRPr lang="en-US"/>
+          </a:p>
+        </p:txBody>
+      </p:sp>
+    </p:spTree>
+  </p:cSld>
+  <p:clrMapOvr>
+    <a:masterClrMapping/>
+  </p:clrMapOvr>
+</p:notes>
+</file>
+
+<file path=ppt/notesSlides/notesSlide3.xml><?xml version="1.0" encoding="utf-8"?>
+<p:notes xmlns:a="http://schemas.openxmlformats.org/drawingml/2006/main" xmlns:r="http://schemas.openxmlformats.org/officeDocument/2006/relationships" xmlns:p="http://schemas.openxmlformats.org/presentationml/2006/main">
+  <p:cSld>
+    <p:spTree>
+      <p:nvGrpSpPr>
+        <p:cNvPr id="1" name=""/>
+        <p:cNvGrpSpPr/>
+        <p:nvPr/>
+      </p:nvGrpSpPr>
+      <p:grpSpPr>
+        <a:xfrm>
+          <a:off x="0" y="0"/>
+          <a:ext cx="0" cy="0"/>
+          <a:chOff x="0" y="0"/>
+          <a:chExt cx="0" cy="0"/>
+        </a:xfrm>
+      </p:grpSpPr>
+      <p:sp>
+        <p:nvSpPr>
+          <p:cNvPr id="2" name="Slide Image Placeholder 1"/>
+          <p:cNvSpPr>
+            <a:spLocks noGrp="1" noRot="1" noChangeAspect="1"/>
+          </p:cNvSpPr>
+          <p:nvPr>
+            <p:ph type="sldImg"/>
+          </p:nvPr>
+        </p:nvSpPr>
+        <p:spPr/>
+      </p:sp>
+      <p:sp>
+        <p:nvSpPr>
+          <p:cNvPr id="3" name="Notes Placeholder 2"/>
+          <p:cNvSpPr>
+            <a:spLocks noGrp="1"/>
+          </p:cNvSpPr>
+          <p:nvPr>
+            <p:ph type="body" idx="1"/>
+          </p:nvPr>
+        </p:nvSpPr>
+        <p:spPr/>
+        <p:txBody>
+          <a:bodyPr>
+            <a:normAutofit/>
+          </a:bodyPr>
+          <a:lstStyle/>
+          <a:p>
+            <a:r>
+              <a:rPr lang="en-US" dirty="0" smtClean="0"/>
+              <a:t>Product already using </a:t>
+            </a:r>
+          </a:p>
+          <a:p>
+            <a:endParaRPr lang="en-US" dirty="0" smtClean="0"/>
+          </a:p>
+          <a:p>
+            <a:r>
+              <a:rPr lang="en-US" dirty="0" err="1" smtClean="0"/>
+              <a:t>versionBuilder</a:t>
+            </a:r>
+            <a:endParaRPr lang="en-US" dirty="0" smtClean="0"/>
+          </a:p>
+          <a:p>
+            <a:r>
+              <a:rPr lang="en-US" dirty="0" err="1" smtClean="0"/>
+              <a:t>environmentBuilder</a:t>
+            </a:r>
+            <a:endParaRPr lang="en-US" dirty="0" smtClean="0"/>
+          </a:p>
+          <a:p>
+            <a:r>
+              <a:rPr lang="en-US" dirty="0" err="1" smtClean="0"/>
+              <a:t>docBuilder</a:t>
+            </a:r>
+            <a:r>
+              <a:rPr lang="en-US" dirty="0" smtClean="0"/>
+              <a:t>?</a:t>
+            </a:r>
+            <a:endParaRPr lang="en-US" smtClean="0"/>
+          </a:p>
+          <a:p>
+            <a:endParaRPr lang="en-US"/>
+          </a:p>
+        </p:txBody>
+      </p:sp>
+      <p:sp>
+        <p:nvSpPr>
+          <p:cNvPr id="4" name="Slide Number Placeholder 3"/>
+          <p:cNvSpPr>
+            <a:spLocks noGrp="1"/>
+          </p:cNvSpPr>
+          <p:nvPr>
+            <p:ph type="sldNum" sz="quarter" idx="10"/>
+          </p:nvPr>
+        </p:nvSpPr>
+        <p:spPr/>
+        <p:txBody>
+          <a:bodyPr/>
+          <a:lstStyle/>
+          <a:p>
+            <a:fld id="{A1D642FB-5C7D-46F5-ABB1-701CC3AB89E6}" type="slidenum">
+              <a:rPr lang="en-US" smtClean="0"/>
+              <a:pPr/>
+              <a:t>8</a:t>
             </a:fld>
             <a:endParaRPr lang="en-US"/>
           </a:p>
@@ -688,7 +773,7 @@
           <p:nvPr userDrawn="1"/>
         </p:nvPicPr>
         <p:blipFill>
-          <a:blip r:embed="rId2" cstate="print"/>
+          <a:blip r:embed="rId2" cstate="screen"/>
           <a:stretch>
             <a:fillRect/>
           </a:stretch>
@@ -723,7 +808,7 @@
             <a:fld id="{08C7389D-B56E-4C42-BFE2-46A0FB05E106}" type="datetimeFigureOut">
               <a:rPr lang="en-US" smtClean="0"/>
               <a:pPr/>
-              <a:t>01/07/2010</a:t>
+              <a:t>6/18/2010</a:t>
             </a:fld>
             <a:endParaRPr lang="en-US"/>
           </a:p>
@@ -1002,7 +1087,7 @@
             <a:fld id="{08C7389D-B56E-4C42-BFE2-46A0FB05E106}" type="datetimeFigureOut">
               <a:rPr lang="en-US" smtClean="0"/>
               <a:pPr/>
-              <a:t>01/07/2010</a:t>
+              <a:t>6/18/2010</a:t>
             </a:fld>
             <a:endParaRPr lang="en-US"/>
           </a:p>
@@ -1189,7 +1274,7 @@
             <a:fld id="{08C7389D-B56E-4C42-BFE2-46A0FB05E106}" type="datetimeFigureOut">
               <a:rPr lang="en-US" smtClean="0"/>
               <a:pPr/>
-              <a:t>01/07/2010</a:t>
+              <a:t>6/18/2010</a:t>
             </a:fld>
             <a:endParaRPr lang="en-US"/>
           </a:p>
@@ -1376,7 +1461,7 @@
             <a:fld id="{08C7389D-B56E-4C42-BFE2-46A0FB05E106}" type="datetimeFigureOut">
               <a:rPr lang="en-US" smtClean="0"/>
               <a:pPr/>
-              <a:t>01/07/2010</a:t>
+              <a:t>6/18/2010</a:t>
             </a:fld>
             <a:endParaRPr lang="en-US"/>
           </a:p>
@@ -2861,7 +2946,7 @@
             <a:fld id="{08C7389D-B56E-4C42-BFE2-46A0FB05E106}" type="datetimeFigureOut">
               <a:rPr lang="en-US" smtClean="0"/>
               <a:pPr/>
-              <a:t>01/07/2010</a:t>
+              <a:t>6/18/2010</a:t>
             </a:fld>
             <a:endParaRPr lang="en-US"/>
           </a:p>
@@ -3463,7 +3548,7 @@
             <a:fld id="{08C7389D-B56E-4C42-BFE2-46A0FB05E106}" type="datetimeFigureOut">
               <a:rPr lang="en-US" smtClean="0"/>
               <a:pPr/>
-              <a:t>01/07/2010</a:t>
+              <a:t>6/18/2010</a:t>
             </a:fld>
             <a:endParaRPr lang="en-US"/>
           </a:p>
@@ -3902,7 +3987,7 @@
             <a:fld id="{08C7389D-B56E-4C42-BFE2-46A0FB05E106}" type="datetimeFigureOut">
               <a:rPr lang="en-US" smtClean="0"/>
               <a:pPr/>
-              <a:t>01/07/2010</a:t>
+              <a:t>6/18/2010</a:t>
             </a:fld>
             <a:endParaRPr lang="en-US"/>
           </a:p>
@@ -4465,7 +4550,7 @@
             <a:fld id="{08C7389D-B56E-4C42-BFE2-46A0FB05E106}" type="datetimeFigureOut">
               <a:rPr lang="en-US" smtClean="0"/>
               <a:pPr/>
-              <a:t>01/07/2010</a:t>
+              <a:t>6/18/2010</a:t>
             </a:fld>
             <a:endParaRPr lang="en-US"/>
           </a:p>
@@ -4563,7 +4648,7 @@
             <a:fld id="{08C7389D-B56E-4C42-BFE2-46A0FB05E106}" type="datetimeFigureOut">
               <a:rPr lang="en-US" smtClean="0"/>
               <a:pPr/>
-              <a:t>01/07/2010</a:t>
+              <a:t>6/18/2010</a:t>
             </a:fld>
             <a:endParaRPr lang="en-US"/>
           </a:p>
@@ -4819,7 +4904,7 @@
             <a:fld id="{08C7389D-B56E-4C42-BFE2-46A0FB05E106}" type="datetimeFigureOut">
               <a:rPr lang="en-US" smtClean="0"/>
               <a:pPr/>
-              <a:t>01/07/2010</a:t>
+              <a:t>6/18/2010</a:t>
             </a:fld>
             <a:endParaRPr lang="en-US"/>
           </a:p>
@@ -5542,7 +5627,7 @@
             <a:fld id="{08C7389D-B56E-4C42-BFE2-46A0FB05E106}" type="datetimeFigureOut">
               <a:rPr lang="en-US" smtClean="0"/>
               <a:pPr/>
-              <a:t>01/07/2010</a:t>
+              <a:t>6/18/2010</a:t>
             </a:fld>
             <a:endParaRPr lang="en-US"/>
           </a:p>
@@ -5769,7 +5854,7 @@
             <a:fld id="{08C7389D-B56E-4C42-BFE2-46A0FB05E106}" type="datetimeFigureOut">
               <a:rPr lang="en-US" smtClean="0"/>
               <a:pPr/>
-              <a:t>01/07/2010</a:t>
+              <a:t>6/18/2010</a:t>
             </a:fld>
             <a:endParaRPr lang="en-US"/>
           </a:p>
@@ -5807,7 +5892,7 @@
             <a:extLst/>
           </a:lstStyle>
           <a:p>
-            <a:endParaRPr lang="en-US"/>
+            <a:endParaRPr lang="en-US" dirty="0"/>
           </a:p>
         </p:txBody>
       </p:sp>
@@ -5854,22 +5939,22 @@
       </p:sp>
       <p:pic>
         <p:nvPicPr>
-          <p:cNvPr id="19" name="Picture 18" descr="UppercuTSmallInvert.gif"/>
+          <p:cNvPr id="8" name="Picture 7" descr="RoundhousE_Logo_NoBackground.gif"/>
           <p:cNvPicPr>
             <a:picLocks noChangeAspect="1"/>
           </p:cNvPicPr>
           <p:nvPr userDrawn="1"/>
         </p:nvPicPr>
         <p:blipFill>
-          <a:blip r:embed="rId13" cstate="print"/>
+          <a:blip r:embed="rId13" cstate="screen"/>
           <a:stretch>
             <a:fillRect/>
           </a:stretch>
         </p:blipFill>
         <p:spPr>
           <a:xfrm>
-            <a:off x="7421347" y="5230368"/>
-            <a:ext cx="1722653" cy="1627632"/>
+            <a:off x="7424928" y="5230368"/>
+            <a:ext cx="1712976" cy="1618488"/>
           </a:xfrm>
           <a:prstGeom prst="rect">
             <a:avLst/>
@@ -6203,21 +6288,19 @@
             <p:ph type="ctrTitle"/>
           </p:nvPr>
         </p:nvSpPr>
-        <p:spPr/>
+        <p:spPr>
+          <a:xfrm>
+            <a:off x="0" y="3816096"/>
+            <a:ext cx="9144000" cy="2279904"/>
+          </a:xfrm>
+        </p:spPr>
         <p:txBody>
           <a:bodyPr/>
           <a:lstStyle/>
           <a:p>
             <a:r>
               <a:rPr lang="en-US" dirty="0" smtClean="0"/>
-              <a:t>RoundhousE: </a:t>
-            </a:r>
-            <a:br>
-              <a:rPr lang="en-US" dirty="0" smtClean="0"/>
-            </a:br>
-            <a:r>
-              <a:rPr lang="en-US" dirty="0" smtClean="0"/>
-              <a:t>Database Migrations</a:t>
+              <a:t>Professional Database Management with RoundhousE!</a:t>
             </a:r>
             <a:endParaRPr lang="en-US" dirty="0"/>
           </a:p>
@@ -6233,10 +6316,15 @@
             <p:ph type="subTitle" idx="1"/>
           </p:nvPr>
         </p:nvSpPr>
-        <p:spPr/>
+        <p:spPr>
+          <a:xfrm>
+            <a:off x="304800" y="5791200"/>
+            <a:ext cx="8686800" cy="822960"/>
+          </a:xfrm>
+        </p:spPr>
         <p:txBody>
           <a:bodyPr>
-            <a:normAutofit fontScale="92500"/>
+            <a:normAutofit fontScale="92500" lnSpcReduction="20000"/>
           </a:bodyPr>
           <a:lstStyle/>
           <a:p>
@@ -6248,11 +6336,25 @@
           <a:p>
             <a:r>
               <a:rPr lang="en-US" sz="1900" dirty="0" smtClean="0"/>
-              <a:t>http://ferventcoder.com | ferventcoder@gmail.com | Twitter: </a:t>
-            </a:r>
-            <a:r>
-              <a:rPr lang="en-US" sz="1900" dirty="0" err="1" smtClean="0"/>
-              <a:t>ferventcoder</a:t>
+              <a:t>C# MVP </a:t>
+            </a:r>
+          </a:p>
+          <a:p>
+            <a:r>
+              <a:rPr lang="en-US" sz="1900" dirty="0" smtClean="0"/>
+              <a:t>http</a:t>
+            </a:r>
+            <a:r>
+              <a:rPr lang="en-US" sz="1900" dirty="0" smtClean="0"/>
+              <a:t>://ferventcoder.com | ferventcoder@gmail.com | </a:t>
+            </a:r>
+            <a:r>
+              <a:rPr lang="en-US" sz="1900" dirty="0" smtClean="0"/>
+              <a:t>Twitter</a:t>
+            </a:r>
+            <a:r>
+              <a:rPr lang="en-US" sz="1900" dirty="0" smtClean="0"/>
+              <a:t>: ferventcoder</a:t>
             </a:r>
             <a:endParaRPr lang="en-US" sz="1900" dirty="0"/>
           </a:p>
@@ -6330,21 +6432,36 @@
           <a:p>
             <a:r>
               <a:rPr lang="en-US" dirty="0" smtClean="0"/>
-              <a:t>Why Database Scripts should be in Source</a:t>
+              <a:t>All Database </a:t>
+            </a:r>
+            <a:r>
+              <a:rPr lang="en-US" dirty="0" smtClean="0"/>
+              <a:t>Scripts should be </a:t>
+            </a:r>
+            <a:r>
+              <a:rPr lang="en-US" dirty="0" smtClean="0"/>
+              <a:t>under s</a:t>
+            </a:r>
+            <a:r>
+              <a:rPr lang="en-US" dirty="0" smtClean="0"/>
+              <a:t>ource control</a:t>
             </a:r>
             <a:endParaRPr lang="en-US" dirty="0" smtClean="0"/>
           </a:p>
           <a:p>
             <a:r>
               <a:rPr lang="en-US" dirty="0" smtClean="0"/>
-              <a:t>Migration Tool named RoundhousE</a:t>
-            </a:r>
-            <a:endParaRPr lang="en-US" dirty="0" smtClean="0"/>
-          </a:p>
-          <a:p>
+              <a:t>A Migration </a:t>
+            </a:r>
             <a:r>
               <a:rPr lang="en-US" dirty="0" smtClean="0"/>
-              <a:t>Demo </a:t>
+              <a:t>Tool named RoundhousE</a:t>
+            </a:r>
+          </a:p>
+          <a:p>
+            <a:r>
+              <a:rPr lang="en-US" dirty="0" smtClean="0"/>
+              <a:t>Demos </a:t>
             </a:r>
             <a:r>
               <a:rPr lang="en-US" dirty="0" smtClean="0"/>
@@ -6403,11 +6520,15 @@
           <a:p>
             <a:r>
               <a:rPr lang="en-US" dirty="0" smtClean="0"/>
-              <a:t>What is a </a:t>
+              <a:t>Why do we </a:t>
             </a:r>
             <a:r>
               <a:rPr lang="en-US" dirty="0" smtClean="0"/>
-              <a:t>database migration?</a:t>
+              <a:t>need migrations</a:t>
+            </a:r>
+            <a:r>
+              <a:rPr lang="en-US" dirty="0" smtClean="0"/>
+              <a:t>?</a:t>
             </a:r>
             <a:endParaRPr lang="en-US" dirty="0"/>
           </a:p>
@@ -6437,13 +6558,13 @@
           <a:p>
             <a:r>
               <a:rPr lang="en-US" dirty="0" smtClean="0"/>
-              <a:t>Upgrading things on the database</a:t>
+              <a:t>Things invariably will change</a:t>
             </a:r>
           </a:p>
           <a:p>
             <a:r>
               <a:rPr lang="en-US" dirty="0" smtClean="0"/>
-              <a:t>Making changes to a database</a:t>
+              <a:t>Very few systems require no changes over the years</a:t>
             </a:r>
           </a:p>
           <a:p>
@@ -6500,7 +6621,7 @@
           <a:p>
             <a:r>
               <a:rPr lang="en-US" dirty="0" smtClean="0"/>
-              <a:t>Why do we migrate?</a:t>
+              <a:t>Define the Issue</a:t>
             </a:r>
             <a:endParaRPr lang="en-US" dirty="0"/>
           </a:p>
@@ -6516,12 +6637,7 @@
             <p:ph idx="1"/>
           </p:nvPr>
         </p:nvSpPr>
-        <p:spPr>
-          <a:xfrm>
-            <a:off x="914400" y="1371600"/>
-            <a:ext cx="7772400" cy="5105400"/>
-          </a:xfrm>
-        </p:spPr>
+        <p:spPr/>
         <p:txBody>
           <a:bodyPr>
             <a:normAutofit/>
@@ -6529,19 +6645,27 @@
           <a:lstStyle/>
           <a:p>
             <a:r>
-              <a:rPr lang="en-US" dirty="0" smtClean="0"/>
-              <a:t>Things invariably will change</a:t>
-            </a:r>
-          </a:p>
-          <a:p>
-            <a:r>
-              <a:rPr lang="en-US" dirty="0" smtClean="0"/>
-              <a:t>Very few systems require no changes over the years</a:t>
-            </a:r>
-            <a:endParaRPr lang="en-US" dirty="0" smtClean="0"/>
-          </a:p>
-          <a:p>
-            <a:endParaRPr lang="en-US" dirty="0"/>
+              <a:rPr lang="en-US" sz="3200" dirty="0" smtClean="0"/>
+              <a:t>Databases change – updates with new/changed tables, views, stored procedures, etc</a:t>
+            </a:r>
+            <a:endParaRPr lang="en-US" sz="3200" dirty="0" smtClean="0"/>
+          </a:p>
+          <a:p>
+            <a:r>
+              <a:rPr lang="en-US" sz="3200" dirty="0" smtClean="0"/>
+              <a:t>Databases </a:t>
+            </a:r>
+            <a:r>
+              <a:rPr lang="en-US" sz="3200" dirty="0" smtClean="0"/>
+              <a:t>store data</a:t>
+            </a:r>
+          </a:p>
+          <a:p>
+            <a:r>
+              <a:rPr lang="en-US" sz="3200" dirty="0" smtClean="0"/>
+              <a:t>Deleting data is bad. Don’t be a bad monkey!</a:t>
+            </a:r>
+            <a:endParaRPr lang="en-US" sz="3200" dirty="0" smtClean="0"/>
           </a:p>
         </p:txBody>
       </p:sp>
@@ -6592,33 +6716,1055 @@
           <a:bodyPr/>
           <a:lstStyle/>
           <a:p>
+            <a:pPr algn="ctr"/>
             <a:r>
               <a:rPr lang="en-US" dirty="0" smtClean="0"/>
-              <a:t>Let the demos begin</a:t>
+              <a:t>Different Environments</a:t>
             </a:r>
             <a:endParaRPr lang="en-US" dirty="0"/>
           </a:p>
         </p:txBody>
       </p:sp>
-      <p:sp>
-        <p:nvSpPr>
-          <p:cNvPr id="3" name="Content Placeholder 2"/>
-          <p:cNvSpPr>
-            <a:spLocks noGrp="1"/>
-          </p:cNvSpPr>
-          <p:nvPr>
-            <p:ph idx="1"/>
-          </p:nvPr>
-        </p:nvSpPr>
-        <p:spPr/>
-        <p:txBody>
-          <a:bodyPr/>
-          <a:lstStyle/>
-          <a:p>
-            <a:endParaRPr lang="en-US"/>
-          </a:p>
-        </p:txBody>
-      </p:sp>
+      <p:grpSp>
+        <p:nvGrpSpPr>
+          <p:cNvPr id="43" name="Group 42"/>
+          <p:cNvGrpSpPr/>
+          <p:nvPr/>
+        </p:nvGrpSpPr>
+        <p:grpSpPr>
+          <a:xfrm>
+            <a:off x="990600" y="1459468"/>
+            <a:ext cx="2362200" cy="2045732"/>
+            <a:chOff x="228600" y="1459468"/>
+            <a:chExt cx="2362200" cy="2045732"/>
+          </a:xfrm>
+        </p:grpSpPr>
+        <p:sp>
+          <p:nvSpPr>
+            <p:cNvPr id="4" name="Can 3"/>
+            <p:cNvSpPr/>
+            <p:nvPr/>
+          </p:nvSpPr>
+          <p:spPr>
+            <a:xfrm>
+              <a:off x="1752600" y="1905000"/>
+              <a:ext cx="609600" cy="685800"/>
+            </a:xfrm>
+            <a:prstGeom prst="can">
+              <a:avLst/>
+            </a:prstGeom>
+            <a:solidFill>
+              <a:schemeClr val="accent5">
+                <a:lumMod val="40000"/>
+                <a:lumOff val="60000"/>
+              </a:schemeClr>
+            </a:solidFill>
+          </p:spPr>
+          <p:style>
+            <a:lnRef idx="2">
+              <a:schemeClr val="accent1">
+                <a:shade val="50000"/>
+              </a:schemeClr>
+            </a:lnRef>
+            <a:fillRef idx="1">
+              <a:schemeClr val="accent1"/>
+            </a:fillRef>
+            <a:effectRef idx="0">
+              <a:schemeClr val="accent1"/>
+            </a:effectRef>
+            <a:fontRef idx="minor">
+              <a:schemeClr val="lt1"/>
+            </a:fontRef>
+          </p:style>
+          <p:txBody>
+            <a:bodyPr rtlCol="0" anchor="ctr"/>
+            <a:lstStyle/>
+            <a:p>
+              <a:pPr algn="ctr"/>
+              <a:endParaRPr lang="en-US"/>
+            </a:p>
+          </p:txBody>
+        </p:sp>
+        <p:pic>
+          <p:nvPicPr>
+            <p:cNvPr id="20" name="Picture 19" descr="000803_1078_0652_vuvv.gif"/>
+            <p:cNvPicPr>
+              <a:picLocks noChangeAspect="1"/>
+            </p:cNvPicPr>
+            <p:nvPr/>
+          </p:nvPicPr>
+          <p:blipFill>
+            <a:blip r:embed="rId2" cstate="print"/>
+            <a:stretch>
+              <a:fillRect/>
+            </a:stretch>
+          </p:blipFill>
+          <p:spPr>
+            <a:xfrm>
+              <a:off x="381000" y="1981200"/>
+              <a:ext cx="816015" cy="685800"/>
+            </a:xfrm>
+            <a:prstGeom prst="rect">
+              <a:avLst/>
+            </a:prstGeom>
+          </p:spPr>
+        </p:pic>
+        <p:pic>
+          <p:nvPicPr>
+            <p:cNvPr id="22" name="Picture 21" descr="000803_1078_0652_vuvv.gif"/>
+            <p:cNvPicPr>
+              <a:picLocks noChangeAspect="1"/>
+            </p:cNvPicPr>
+            <p:nvPr/>
+          </p:nvPicPr>
+          <p:blipFill>
+            <a:blip r:embed="rId2" cstate="print"/>
+            <a:stretch>
+              <a:fillRect/>
+            </a:stretch>
+          </p:blipFill>
+          <p:spPr>
+            <a:xfrm>
+              <a:off x="381000" y="2819400"/>
+              <a:ext cx="816015" cy="685800"/>
+            </a:xfrm>
+            <a:prstGeom prst="rect">
+              <a:avLst/>
+            </a:prstGeom>
+          </p:spPr>
+        </p:pic>
+        <p:sp>
+          <p:nvSpPr>
+            <p:cNvPr id="23" name="Can 22"/>
+            <p:cNvSpPr/>
+            <p:nvPr/>
+          </p:nvSpPr>
+          <p:spPr>
+            <a:xfrm>
+              <a:off x="1752600" y="2743200"/>
+              <a:ext cx="609600" cy="685800"/>
+            </a:xfrm>
+            <a:prstGeom prst="can">
+              <a:avLst/>
+            </a:prstGeom>
+            <a:solidFill>
+              <a:schemeClr val="accent5">
+                <a:lumMod val="40000"/>
+                <a:lumOff val="60000"/>
+              </a:schemeClr>
+            </a:solidFill>
+          </p:spPr>
+          <p:style>
+            <a:lnRef idx="2">
+              <a:schemeClr val="accent1">
+                <a:shade val="50000"/>
+              </a:schemeClr>
+            </a:lnRef>
+            <a:fillRef idx="1">
+              <a:schemeClr val="accent1"/>
+            </a:fillRef>
+            <a:effectRef idx="0">
+              <a:schemeClr val="accent1"/>
+            </a:effectRef>
+            <a:fontRef idx="minor">
+              <a:schemeClr val="lt1"/>
+            </a:fontRef>
+          </p:style>
+          <p:txBody>
+            <a:bodyPr rtlCol="0" anchor="ctr"/>
+            <a:lstStyle/>
+            <a:p>
+              <a:pPr algn="ctr"/>
+              <a:endParaRPr lang="en-US"/>
+            </a:p>
+          </p:txBody>
+        </p:sp>
+        <p:sp>
+          <p:nvSpPr>
+            <p:cNvPr id="25" name="TextBox 24"/>
+            <p:cNvSpPr txBox="1"/>
+            <p:nvPr/>
+          </p:nvSpPr>
+          <p:spPr>
+            <a:xfrm>
+              <a:off x="228600" y="1459468"/>
+              <a:ext cx="2362200" cy="369332"/>
+            </a:xfrm>
+            <a:prstGeom prst="rect">
+              <a:avLst/>
+            </a:prstGeom>
+            <a:noFill/>
+          </p:spPr>
+          <p:txBody>
+            <a:bodyPr wrap="square" rtlCol="0">
+              <a:spAutoFit/>
+            </a:bodyPr>
+            <a:lstStyle/>
+            <a:p>
+              <a:pPr algn="ctr"/>
+              <a:r>
+                <a:rPr lang="en-US" b="1" u="sng" dirty="0" smtClean="0"/>
+                <a:t>1. Local  (Developers)</a:t>
+              </a:r>
+              <a:endParaRPr lang="en-US" b="1" u="sng" dirty="0"/>
+            </a:p>
+          </p:txBody>
+        </p:sp>
+        <p:sp>
+          <p:nvSpPr>
+            <p:cNvPr id="26" name="Right Arrow 25"/>
+            <p:cNvSpPr/>
+            <p:nvPr/>
+          </p:nvSpPr>
+          <p:spPr>
+            <a:xfrm>
+              <a:off x="1295400" y="2133600"/>
+              <a:ext cx="381000" cy="304800"/>
+            </a:xfrm>
+            <a:prstGeom prst="rightArrow">
+              <a:avLst/>
+            </a:prstGeom>
+          </p:spPr>
+          <p:style>
+            <a:lnRef idx="2">
+              <a:schemeClr val="accent4">
+                <a:shade val="50000"/>
+              </a:schemeClr>
+            </a:lnRef>
+            <a:fillRef idx="1">
+              <a:schemeClr val="accent4"/>
+            </a:fillRef>
+            <a:effectRef idx="0">
+              <a:schemeClr val="accent4"/>
+            </a:effectRef>
+            <a:fontRef idx="minor">
+              <a:schemeClr val="lt1"/>
+            </a:fontRef>
+          </p:style>
+          <p:txBody>
+            <a:bodyPr rtlCol="0" anchor="ctr"/>
+            <a:lstStyle/>
+            <a:p>
+              <a:pPr algn="ctr"/>
+              <a:endParaRPr lang="en-US"/>
+            </a:p>
+          </p:txBody>
+        </p:sp>
+        <p:sp>
+          <p:nvSpPr>
+            <p:cNvPr id="27" name="Right Arrow 26"/>
+            <p:cNvSpPr/>
+            <p:nvPr/>
+          </p:nvSpPr>
+          <p:spPr>
+            <a:xfrm>
+              <a:off x="1295400" y="2895600"/>
+              <a:ext cx="381000" cy="304800"/>
+            </a:xfrm>
+            <a:prstGeom prst="rightArrow">
+              <a:avLst/>
+            </a:prstGeom>
+          </p:spPr>
+          <p:style>
+            <a:lnRef idx="2">
+              <a:schemeClr val="accent4">
+                <a:shade val="50000"/>
+              </a:schemeClr>
+            </a:lnRef>
+            <a:fillRef idx="1">
+              <a:schemeClr val="accent4"/>
+            </a:fillRef>
+            <a:effectRef idx="0">
+              <a:schemeClr val="accent4"/>
+            </a:effectRef>
+            <a:fontRef idx="minor">
+              <a:schemeClr val="lt1"/>
+            </a:fontRef>
+          </p:style>
+          <p:txBody>
+            <a:bodyPr rtlCol="0" anchor="ctr"/>
+            <a:lstStyle/>
+            <a:p>
+              <a:pPr algn="ctr"/>
+              <a:endParaRPr lang="en-US"/>
+            </a:p>
+          </p:txBody>
+        </p:sp>
+      </p:grpSp>
+      <p:grpSp>
+        <p:nvGrpSpPr>
+          <p:cNvPr id="42" name="Group 41"/>
+          <p:cNvGrpSpPr/>
+          <p:nvPr/>
+        </p:nvGrpSpPr>
+        <p:grpSpPr>
+          <a:xfrm>
+            <a:off x="1066800" y="3974068"/>
+            <a:ext cx="2209800" cy="2045732"/>
+            <a:chOff x="152400" y="3897868"/>
+            <a:chExt cx="2209800" cy="2045732"/>
+          </a:xfrm>
+        </p:grpSpPr>
+        <p:sp>
+          <p:nvSpPr>
+            <p:cNvPr id="28" name="Can 27"/>
+            <p:cNvSpPr/>
+            <p:nvPr/>
+          </p:nvSpPr>
+          <p:spPr>
+            <a:xfrm>
+              <a:off x="1676400" y="4343400"/>
+              <a:ext cx="609600" cy="685800"/>
+            </a:xfrm>
+            <a:prstGeom prst="can">
+              <a:avLst/>
+            </a:prstGeom>
+            <a:solidFill>
+              <a:schemeClr val="accent5">
+                <a:lumMod val="40000"/>
+                <a:lumOff val="60000"/>
+              </a:schemeClr>
+            </a:solidFill>
+          </p:spPr>
+          <p:style>
+            <a:lnRef idx="2">
+              <a:schemeClr val="accent1">
+                <a:shade val="50000"/>
+              </a:schemeClr>
+            </a:lnRef>
+            <a:fillRef idx="1">
+              <a:schemeClr val="accent1"/>
+            </a:fillRef>
+            <a:effectRef idx="0">
+              <a:schemeClr val="accent1"/>
+            </a:effectRef>
+            <a:fontRef idx="minor">
+              <a:schemeClr val="lt1"/>
+            </a:fontRef>
+          </p:style>
+          <p:txBody>
+            <a:bodyPr rtlCol="0" anchor="ctr"/>
+            <a:lstStyle/>
+            <a:p>
+              <a:pPr algn="ctr"/>
+              <a:endParaRPr lang="en-US"/>
+            </a:p>
+          </p:txBody>
+        </p:sp>
+        <p:pic>
+          <p:nvPicPr>
+            <p:cNvPr id="29" name="Picture 28" descr="000803_1078_0652_vuvv.gif"/>
+            <p:cNvPicPr>
+              <a:picLocks noChangeAspect="1"/>
+            </p:cNvPicPr>
+            <p:nvPr/>
+          </p:nvPicPr>
+          <p:blipFill>
+            <a:blip r:embed="rId2" cstate="print"/>
+            <a:stretch>
+              <a:fillRect/>
+            </a:stretch>
+          </p:blipFill>
+          <p:spPr>
+            <a:xfrm>
+              <a:off x="304800" y="4419600"/>
+              <a:ext cx="816015" cy="685800"/>
+            </a:xfrm>
+            <a:prstGeom prst="rect">
+              <a:avLst/>
+            </a:prstGeom>
+          </p:spPr>
+        </p:pic>
+        <p:pic>
+          <p:nvPicPr>
+            <p:cNvPr id="30" name="Picture 29" descr="000803_1078_0652_vuvv.gif"/>
+            <p:cNvPicPr>
+              <a:picLocks noChangeAspect="1"/>
+            </p:cNvPicPr>
+            <p:nvPr/>
+          </p:nvPicPr>
+          <p:blipFill>
+            <a:blip r:embed="rId2" cstate="print"/>
+            <a:stretch>
+              <a:fillRect/>
+            </a:stretch>
+          </p:blipFill>
+          <p:spPr>
+            <a:xfrm>
+              <a:off x="304800" y="5257800"/>
+              <a:ext cx="816015" cy="685800"/>
+            </a:xfrm>
+            <a:prstGeom prst="rect">
+              <a:avLst/>
+            </a:prstGeom>
+          </p:spPr>
+        </p:pic>
+        <p:sp>
+          <p:nvSpPr>
+            <p:cNvPr id="31" name="Can 30"/>
+            <p:cNvSpPr/>
+            <p:nvPr/>
+          </p:nvSpPr>
+          <p:spPr>
+            <a:xfrm>
+              <a:off x="1676400" y="5181600"/>
+              <a:ext cx="609600" cy="685800"/>
+            </a:xfrm>
+            <a:prstGeom prst="can">
+              <a:avLst/>
+            </a:prstGeom>
+            <a:solidFill>
+              <a:schemeClr val="accent5">
+                <a:lumMod val="40000"/>
+                <a:lumOff val="60000"/>
+              </a:schemeClr>
+            </a:solidFill>
+          </p:spPr>
+          <p:style>
+            <a:lnRef idx="2">
+              <a:schemeClr val="accent1">
+                <a:shade val="50000"/>
+              </a:schemeClr>
+            </a:lnRef>
+            <a:fillRef idx="1">
+              <a:schemeClr val="accent1"/>
+            </a:fillRef>
+            <a:effectRef idx="0">
+              <a:schemeClr val="accent1"/>
+            </a:effectRef>
+            <a:fontRef idx="minor">
+              <a:schemeClr val="lt1"/>
+            </a:fontRef>
+          </p:style>
+          <p:txBody>
+            <a:bodyPr rtlCol="0" anchor="ctr"/>
+            <a:lstStyle/>
+            <a:p>
+              <a:pPr algn="ctr"/>
+              <a:endParaRPr lang="en-US"/>
+            </a:p>
+          </p:txBody>
+        </p:sp>
+        <p:sp>
+          <p:nvSpPr>
+            <p:cNvPr id="32" name="TextBox 31"/>
+            <p:cNvSpPr txBox="1"/>
+            <p:nvPr/>
+          </p:nvSpPr>
+          <p:spPr>
+            <a:xfrm>
+              <a:off x="152400" y="3897868"/>
+              <a:ext cx="2209800" cy="369332"/>
+            </a:xfrm>
+            <a:prstGeom prst="rect">
+              <a:avLst/>
+            </a:prstGeom>
+            <a:noFill/>
+          </p:spPr>
+          <p:txBody>
+            <a:bodyPr wrap="square" rtlCol="0">
+              <a:spAutoFit/>
+            </a:bodyPr>
+            <a:lstStyle/>
+            <a:p>
+              <a:pPr algn="ctr"/>
+              <a:r>
+                <a:rPr lang="en-US" b="1" u="sng" dirty="0" smtClean="0"/>
+                <a:t>2 . Test (Testers) </a:t>
+              </a:r>
+              <a:endParaRPr lang="en-US" b="1" u="sng" dirty="0"/>
+            </a:p>
+          </p:txBody>
+        </p:sp>
+        <p:sp>
+          <p:nvSpPr>
+            <p:cNvPr id="33" name="Right Arrow 32"/>
+            <p:cNvSpPr/>
+            <p:nvPr/>
+          </p:nvSpPr>
+          <p:spPr>
+            <a:xfrm>
+              <a:off x="1219200" y="4572000"/>
+              <a:ext cx="381000" cy="304800"/>
+            </a:xfrm>
+            <a:prstGeom prst="rightArrow">
+              <a:avLst/>
+            </a:prstGeom>
+          </p:spPr>
+          <p:style>
+            <a:lnRef idx="2">
+              <a:schemeClr val="accent4">
+                <a:shade val="50000"/>
+              </a:schemeClr>
+            </a:lnRef>
+            <a:fillRef idx="1">
+              <a:schemeClr val="accent4"/>
+            </a:fillRef>
+            <a:effectRef idx="0">
+              <a:schemeClr val="accent4"/>
+            </a:effectRef>
+            <a:fontRef idx="minor">
+              <a:schemeClr val="lt1"/>
+            </a:fontRef>
+          </p:style>
+          <p:txBody>
+            <a:bodyPr rtlCol="0" anchor="ctr"/>
+            <a:lstStyle/>
+            <a:p>
+              <a:pPr algn="ctr"/>
+              <a:endParaRPr lang="en-US"/>
+            </a:p>
+          </p:txBody>
+        </p:sp>
+        <p:sp>
+          <p:nvSpPr>
+            <p:cNvPr id="34" name="Right Arrow 33"/>
+            <p:cNvSpPr/>
+            <p:nvPr/>
+          </p:nvSpPr>
+          <p:spPr>
+            <a:xfrm>
+              <a:off x="1219200" y="5334000"/>
+              <a:ext cx="381000" cy="304800"/>
+            </a:xfrm>
+            <a:prstGeom prst="rightArrow">
+              <a:avLst/>
+            </a:prstGeom>
+          </p:spPr>
+          <p:style>
+            <a:lnRef idx="2">
+              <a:schemeClr val="accent4">
+                <a:shade val="50000"/>
+              </a:schemeClr>
+            </a:lnRef>
+            <a:fillRef idx="1">
+              <a:schemeClr val="accent4"/>
+            </a:fillRef>
+            <a:effectRef idx="0">
+              <a:schemeClr val="accent4"/>
+            </a:effectRef>
+            <a:fontRef idx="minor">
+              <a:schemeClr val="lt1"/>
+            </a:fontRef>
+          </p:style>
+          <p:txBody>
+            <a:bodyPr rtlCol="0" anchor="ctr"/>
+            <a:lstStyle/>
+            <a:p>
+              <a:pPr algn="ctr"/>
+              <a:endParaRPr lang="en-US"/>
+            </a:p>
+          </p:txBody>
+        </p:sp>
+      </p:grpSp>
+      <p:grpSp>
+        <p:nvGrpSpPr>
+          <p:cNvPr id="44" name="Group 43"/>
+          <p:cNvGrpSpPr/>
+          <p:nvPr/>
+        </p:nvGrpSpPr>
+        <p:grpSpPr>
+          <a:xfrm>
+            <a:off x="4610100" y="1459468"/>
+            <a:ext cx="3429000" cy="1207532"/>
+            <a:chOff x="304800" y="3897868"/>
+            <a:chExt cx="3429000" cy="1207532"/>
+          </a:xfrm>
+        </p:grpSpPr>
+        <p:sp>
+          <p:nvSpPr>
+            <p:cNvPr id="45" name="Can 44"/>
+            <p:cNvSpPr/>
+            <p:nvPr/>
+          </p:nvSpPr>
+          <p:spPr>
+            <a:xfrm>
+              <a:off x="1714500" y="4343400"/>
+              <a:ext cx="609600" cy="685800"/>
+            </a:xfrm>
+            <a:prstGeom prst="can">
+              <a:avLst/>
+            </a:prstGeom>
+            <a:solidFill>
+              <a:schemeClr val="accent5">
+                <a:lumMod val="40000"/>
+                <a:lumOff val="60000"/>
+              </a:schemeClr>
+            </a:solidFill>
+          </p:spPr>
+          <p:style>
+            <a:lnRef idx="2">
+              <a:schemeClr val="accent1">
+                <a:shade val="50000"/>
+              </a:schemeClr>
+            </a:lnRef>
+            <a:fillRef idx="1">
+              <a:schemeClr val="accent1"/>
+            </a:fillRef>
+            <a:effectRef idx="0">
+              <a:schemeClr val="accent1"/>
+            </a:effectRef>
+            <a:fontRef idx="minor">
+              <a:schemeClr val="lt1"/>
+            </a:fontRef>
+          </p:style>
+          <p:txBody>
+            <a:bodyPr rtlCol="0" anchor="ctr"/>
+            <a:lstStyle/>
+            <a:p>
+              <a:pPr algn="ctr"/>
+              <a:endParaRPr lang="en-US"/>
+            </a:p>
+          </p:txBody>
+        </p:sp>
+        <p:pic>
+          <p:nvPicPr>
+            <p:cNvPr id="46" name="Picture 45" descr="000803_1078_0652_vuvv.gif"/>
+            <p:cNvPicPr>
+              <a:picLocks noChangeAspect="1"/>
+            </p:cNvPicPr>
+            <p:nvPr/>
+          </p:nvPicPr>
+          <p:blipFill>
+            <a:blip r:embed="rId2" cstate="print"/>
+            <a:stretch>
+              <a:fillRect/>
+            </a:stretch>
+          </p:blipFill>
+          <p:spPr>
+            <a:xfrm>
+              <a:off x="304800" y="4419600"/>
+              <a:ext cx="816015" cy="685800"/>
+            </a:xfrm>
+            <a:prstGeom prst="rect">
+              <a:avLst/>
+            </a:prstGeom>
+          </p:spPr>
+        </p:pic>
+        <p:pic>
+          <p:nvPicPr>
+            <p:cNvPr id="47" name="Picture 46" descr="000803_1078_0652_vuvv.gif"/>
+            <p:cNvPicPr>
+              <a:picLocks noChangeAspect="1"/>
+            </p:cNvPicPr>
+            <p:nvPr/>
+          </p:nvPicPr>
+          <p:blipFill>
+            <a:blip r:embed="rId2" cstate="print"/>
+            <a:stretch>
+              <a:fillRect/>
+            </a:stretch>
+          </p:blipFill>
+          <p:spPr>
+            <a:xfrm>
+              <a:off x="2895600" y="4355068"/>
+              <a:ext cx="816015" cy="685800"/>
+            </a:xfrm>
+            <a:prstGeom prst="rect">
+              <a:avLst/>
+            </a:prstGeom>
+          </p:spPr>
+        </p:pic>
+        <p:sp>
+          <p:nvSpPr>
+            <p:cNvPr id="49" name="TextBox 48"/>
+            <p:cNvSpPr txBox="1"/>
+            <p:nvPr/>
+          </p:nvSpPr>
+          <p:spPr>
+            <a:xfrm>
+              <a:off x="304800" y="3897868"/>
+              <a:ext cx="3429000" cy="369332"/>
+            </a:xfrm>
+            <a:prstGeom prst="rect">
+              <a:avLst/>
+            </a:prstGeom>
+            <a:noFill/>
+          </p:spPr>
+          <p:txBody>
+            <a:bodyPr wrap="square" rtlCol="0">
+              <a:spAutoFit/>
+            </a:bodyPr>
+            <a:lstStyle/>
+            <a:p>
+              <a:pPr algn="ctr"/>
+              <a:r>
+                <a:rPr lang="en-US" b="1" u="sng" dirty="0" smtClean="0"/>
+                <a:t>3 . Staging (Users/Proxies) </a:t>
+              </a:r>
+              <a:endParaRPr lang="en-US" b="1" u="sng" dirty="0"/>
+            </a:p>
+          </p:txBody>
+        </p:sp>
+        <p:sp>
+          <p:nvSpPr>
+            <p:cNvPr id="50" name="Right Arrow 49"/>
+            <p:cNvSpPr/>
+            <p:nvPr/>
+          </p:nvSpPr>
+          <p:spPr>
+            <a:xfrm>
+              <a:off x="1221611" y="4572000"/>
+              <a:ext cx="381000" cy="304800"/>
+            </a:xfrm>
+            <a:prstGeom prst="rightArrow">
+              <a:avLst/>
+            </a:prstGeom>
+          </p:spPr>
+          <p:style>
+            <a:lnRef idx="2">
+              <a:schemeClr val="accent4">
+                <a:shade val="50000"/>
+              </a:schemeClr>
+            </a:lnRef>
+            <a:fillRef idx="1">
+              <a:schemeClr val="accent4"/>
+            </a:fillRef>
+            <a:effectRef idx="0">
+              <a:schemeClr val="accent4"/>
+            </a:effectRef>
+            <a:fontRef idx="minor">
+              <a:schemeClr val="lt1"/>
+            </a:fontRef>
+          </p:style>
+          <p:txBody>
+            <a:bodyPr rtlCol="0" anchor="ctr"/>
+            <a:lstStyle/>
+            <a:p>
+              <a:pPr algn="ctr"/>
+              <a:endParaRPr lang="en-US"/>
+            </a:p>
+          </p:txBody>
+        </p:sp>
+        <p:sp>
+          <p:nvSpPr>
+            <p:cNvPr id="51" name="Right Arrow 50"/>
+            <p:cNvSpPr/>
+            <p:nvPr/>
+          </p:nvSpPr>
+          <p:spPr>
+            <a:xfrm rot="10800000">
+              <a:off x="2413803" y="4572000"/>
+              <a:ext cx="381000" cy="304800"/>
+            </a:xfrm>
+            <a:prstGeom prst="rightArrow">
+              <a:avLst/>
+            </a:prstGeom>
+          </p:spPr>
+          <p:style>
+            <a:lnRef idx="2">
+              <a:schemeClr val="accent4">
+                <a:shade val="50000"/>
+              </a:schemeClr>
+            </a:lnRef>
+            <a:fillRef idx="1">
+              <a:schemeClr val="accent4"/>
+            </a:fillRef>
+            <a:effectRef idx="0">
+              <a:schemeClr val="accent4"/>
+            </a:effectRef>
+            <a:fontRef idx="minor">
+              <a:schemeClr val="lt1"/>
+            </a:fontRef>
+          </p:style>
+          <p:txBody>
+            <a:bodyPr rtlCol="0" anchor="ctr"/>
+            <a:lstStyle/>
+            <a:p>
+              <a:pPr algn="ctr"/>
+              <a:endParaRPr lang="en-US"/>
+            </a:p>
+          </p:txBody>
+        </p:sp>
+      </p:grpSp>
+      <p:grpSp>
+        <p:nvGrpSpPr>
+          <p:cNvPr id="61" name="Group 60"/>
+          <p:cNvGrpSpPr/>
+          <p:nvPr/>
+        </p:nvGrpSpPr>
+        <p:grpSpPr>
+          <a:xfrm>
+            <a:off x="4621193" y="3581400"/>
+            <a:ext cx="3406815" cy="2438400"/>
+            <a:chOff x="4648200" y="3810000"/>
+            <a:chExt cx="3406815" cy="2438400"/>
+          </a:xfrm>
+        </p:grpSpPr>
+        <p:sp>
+          <p:nvSpPr>
+            <p:cNvPr id="53" name="Can 52"/>
+            <p:cNvSpPr/>
+            <p:nvPr/>
+          </p:nvSpPr>
+          <p:spPr>
+            <a:xfrm>
+              <a:off x="6046807" y="4255532"/>
+              <a:ext cx="609600" cy="685800"/>
+            </a:xfrm>
+            <a:prstGeom prst="can">
+              <a:avLst/>
+            </a:prstGeom>
+            <a:solidFill>
+              <a:schemeClr val="accent5">
+                <a:lumMod val="40000"/>
+                <a:lumOff val="60000"/>
+              </a:schemeClr>
+            </a:solidFill>
+          </p:spPr>
+          <p:style>
+            <a:lnRef idx="2">
+              <a:schemeClr val="accent1">
+                <a:shade val="50000"/>
+              </a:schemeClr>
+            </a:lnRef>
+            <a:fillRef idx="1">
+              <a:schemeClr val="accent1"/>
+            </a:fillRef>
+            <a:effectRef idx="0">
+              <a:schemeClr val="accent1"/>
+            </a:effectRef>
+            <a:fontRef idx="minor">
+              <a:schemeClr val="lt1"/>
+            </a:fontRef>
+          </p:style>
+          <p:txBody>
+            <a:bodyPr rtlCol="0" anchor="ctr"/>
+            <a:lstStyle/>
+            <a:p>
+              <a:pPr algn="ctr"/>
+              <a:endParaRPr lang="en-US"/>
+            </a:p>
+          </p:txBody>
+        </p:sp>
+        <p:pic>
+          <p:nvPicPr>
+            <p:cNvPr id="54" name="Picture 53" descr="000803_1078_0652_vuvv.gif"/>
+            <p:cNvPicPr>
+              <a:picLocks noChangeAspect="1"/>
+            </p:cNvPicPr>
+            <p:nvPr/>
+          </p:nvPicPr>
+          <p:blipFill>
+            <a:blip r:embed="rId2" cstate="print"/>
+            <a:stretch>
+              <a:fillRect/>
+            </a:stretch>
+          </p:blipFill>
+          <p:spPr>
+            <a:xfrm>
+              <a:off x="4648200" y="4331732"/>
+              <a:ext cx="816015" cy="685800"/>
+            </a:xfrm>
+            <a:prstGeom prst="rect">
+              <a:avLst/>
+            </a:prstGeom>
+          </p:spPr>
+        </p:pic>
+        <p:pic>
+          <p:nvPicPr>
+            <p:cNvPr id="55" name="Picture 54" descr="000803_1078_0652_vuvv.gif"/>
+            <p:cNvPicPr>
+              <a:picLocks noChangeAspect="1"/>
+            </p:cNvPicPr>
+            <p:nvPr/>
+          </p:nvPicPr>
+          <p:blipFill>
+            <a:blip r:embed="rId2" cstate="print"/>
+            <a:stretch>
+              <a:fillRect/>
+            </a:stretch>
+          </p:blipFill>
+          <p:spPr>
+            <a:xfrm>
+              <a:off x="7239000" y="4267200"/>
+              <a:ext cx="816015" cy="685800"/>
+            </a:xfrm>
+            <a:prstGeom prst="rect">
+              <a:avLst/>
+            </a:prstGeom>
+          </p:spPr>
+        </p:pic>
+        <p:sp>
+          <p:nvSpPr>
+            <p:cNvPr id="56" name="TextBox 55"/>
+            <p:cNvSpPr txBox="1"/>
+            <p:nvPr/>
+          </p:nvSpPr>
+          <p:spPr>
+            <a:xfrm>
+              <a:off x="4648200" y="3810000"/>
+              <a:ext cx="3352800" cy="369332"/>
+            </a:xfrm>
+            <a:prstGeom prst="rect">
+              <a:avLst/>
+            </a:prstGeom>
+            <a:noFill/>
+          </p:spPr>
+          <p:txBody>
+            <a:bodyPr wrap="square" rtlCol="0">
+              <a:spAutoFit/>
+            </a:bodyPr>
+            <a:lstStyle/>
+            <a:p>
+              <a:pPr algn="ctr"/>
+              <a:r>
+                <a:rPr lang="en-US" b="1" u="sng" dirty="0" smtClean="0"/>
+                <a:t>4</a:t>
+              </a:r>
+              <a:r>
+                <a:rPr lang="en-US" b="1" u="sng" dirty="0" smtClean="0"/>
+                <a:t> . Production (Users) </a:t>
+              </a:r>
+              <a:endParaRPr lang="en-US" b="1" u="sng" dirty="0"/>
+            </a:p>
+          </p:txBody>
+        </p:sp>
+        <p:sp>
+          <p:nvSpPr>
+            <p:cNvPr id="57" name="Right Arrow 56"/>
+            <p:cNvSpPr/>
+            <p:nvPr/>
+          </p:nvSpPr>
+          <p:spPr>
+            <a:xfrm>
+              <a:off x="5565011" y="4484132"/>
+              <a:ext cx="381000" cy="304800"/>
+            </a:xfrm>
+            <a:prstGeom prst="rightArrow">
+              <a:avLst/>
+            </a:prstGeom>
+          </p:spPr>
+          <p:style>
+            <a:lnRef idx="2">
+              <a:schemeClr val="accent4">
+                <a:shade val="50000"/>
+              </a:schemeClr>
+            </a:lnRef>
+            <a:fillRef idx="1">
+              <a:schemeClr val="accent4"/>
+            </a:fillRef>
+            <a:effectRef idx="0">
+              <a:schemeClr val="accent4"/>
+            </a:effectRef>
+            <a:fontRef idx="minor">
+              <a:schemeClr val="lt1"/>
+            </a:fontRef>
+          </p:style>
+          <p:txBody>
+            <a:bodyPr rtlCol="0" anchor="ctr"/>
+            <a:lstStyle/>
+            <a:p>
+              <a:pPr algn="ctr"/>
+              <a:endParaRPr lang="en-US"/>
+            </a:p>
+          </p:txBody>
+        </p:sp>
+        <p:sp>
+          <p:nvSpPr>
+            <p:cNvPr id="58" name="Right Arrow 57"/>
+            <p:cNvSpPr/>
+            <p:nvPr/>
+          </p:nvSpPr>
+          <p:spPr>
+            <a:xfrm rot="10800000">
+              <a:off x="6757203" y="4484132"/>
+              <a:ext cx="381000" cy="304800"/>
+            </a:xfrm>
+            <a:prstGeom prst="rightArrow">
+              <a:avLst/>
+            </a:prstGeom>
+          </p:spPr>
+          <p:style>
+            <a:lnRef idx="2">
+              <a:schemeClr val="accent4">
+                <a:shade val="50000"/>
+              </a:schemeClr>
+            </a:lnRef>
+            <a:fillRef idx="1">
+              <a:schemeClr val="accent4"/>
+            </a:fillRef>
+            <a:effectRef idx="0">
+              <a:schemeClr val="accent4"/>
+            </a:effectRef>
+            <a:fontRef idx="minor">
+              <a:schemeClr val="lt1"/>
+            </a:fontRef>
+          </p:style>
+          <p:txBody>
+            <a:bodyPr rtlCol="0" anchor="ctr"/>
+            <a:lstStyle/>
+            <a:p>
+              <a:pPr algn="ctr"/>
+              <a:endParaRPr lang="en-US"/>
+            </a:p>
+          </p:txBody>
+        </p:sp>
+        <p:pic>
+          <p:nvPicPr>
+            <p:cNvPr id="59" name="Picture 58" descr="000803_1078_0652_vuvv.gif"/>
+            <p:cNvPicPr>
+              <a:picLocks noChangeAspect="1"/>
+            </p:cNvPicPr>
+            <p:nvPr/>
+          </p:nvPicPr>
+          <p:blipFill>
+            <a:blip r:embed="rId2" cstate="print"/>
+            <a:stretch>
+              <a:fillRect/>
+            </a:stretch>
+          </p:blipFill>
+          <p:spPr>
+            <a:xfrm>
+              <a:off x="5943600" y="5562600"/>
+              <a:ext cx="816015" cy="685800"/>
+            </a:xfrm>
+            <a:prstGeom prst="rect">
+              <a:avLst/>
+            </a:prstGeom>
+          </p:spPr>
+        </p:pic>
+        <p:sp>
+          <p:nvSpPr>
+            <p:cNvPr id="60" name="Right Arrow 59"/>
+            <p:cNvSpPr/>
+            <p:nvPr/>
+          </p:nvSpPr>
+          <p:spPr>
+            <a:xfrm rot="16200000">
+              <a:off x="6161107" y="5067301"/>
+              <a:ext cx="381000" cy="304800"/>
+            </a:xfrm>
+            <a:prstGeom prst="rightArrow">
+              <a:avLst/>
+            </a:prstGeom>
+          </p:spPr>
+          <p:style>
+            <a:lnRef idx="2">
+              <a:schemeClr val="accent4">
+                <a:shade val="50000"/>
+              </a:schemeClr>
+            </a:lnRef>
+            <a:fillRef idx="1">
+              <a:schemeClr val="accent4"/>
+            </a:fillRef>
+            <a:effectRef idx="0">
+              <a:schemeClr val="accent4"/>
+            </a:effectRef>
+            <a:fontRef idx="minor">
+              <a:schemeClr val="lt1"/>
+            </a:fontRef>
+          </p:style>
+          <p:txBody>
+            <a:bodyPr rtlCol="0" anchor="ctr"/>
+            <a:lstStyle/>
+            <a:p>
+              <a:pPr algn="ctr"/>
+              <a:endParaRPr lang="en-US"/>
+            </a:p>
+          </p:txBody>
+        </p:sp>
+      </p:grpSp>
     </p:spTree>
   </p:cSld>
   <p:clrMapOvr>
@@ -6651,6 +7797,246 @@
           <a:chExt cx="0" cy="0"/>
         </a:xfrm>
       </p:grpSpPr>
+      <p:sp>
+        <p:nvSpPr>
+          <p:cNvPr id="2" name="Title 1"/>
+          <p:cNvSpPr>
+            <a:spLocks noGrp="1"/>
+          </p:cNvSpPr>
+          <p:nvPr>
+            <p:ph type="title"/>
+          </p:nvPr>
+        </p:nvSpPr>
+        <p:spPr/>
+        <p:txBody>
+          <a:bodyPr/>
+          <a:lstStyle/>
+          <a:p>
+            <a:r>
+              <a:rPr lang="en-US" dirty="0" smtClean="0"/>
+              <a:t>Let’s talk about Pain</a:t>
+            </a:r>
+            <a:endParaRPr lang="en-US" dirty="0"/>
+          </a:p>
+        </p:txBody>
+      </p:sp>
+      <p:sp>
+        <p:nvSpPr>
+          <p:cNvPr id="3" name="Content Placeholder 2"/>
+          <p:cNvSpPr>
+            <a:spLocks noGrp="1"/>
+          </p:cNvSpPr>
+          <p:nvPr>
+            <p:ph idx="1"/>
+          </p:nvPr>
+        </p:nvSpPr>
+        <p:spPr/>
+        <p:txBody>
+          <a:bodyPr/>
+          <a:lstStyle/>
+          <a:p>
+            <a:r>
+              <a:rPr lang="en-US" dirty="0" smtClean="0"/>
+              <a:t>How do you apply a database change one time?</a:t>
+            </a:r>
+          </a:p>
+          <a:p>
+            <a:r>
+              <a:rPr lang="en-US" dirty="0" smtClean="0"/>
+              <a:t>How do you keep all environments in sync?</a:t>
+            </a:r>
+            <a:endParaRPr lang="en-US" dirty="0"/>
+          </a:p>
+        </p:txBody>
+      </p:sp>
+    </p:spTree>
+  </p:cSld>
+  <p:clrMapOvr>
+    <a:masterClrMapping/>
+  </p:clrMapOvr>
+  <p:timing>
+    <p:tnLst>
+      <p:par>
+        <p:cTn id="1" dur="indefinite" restart="never" nodeType="tmRoot"/>
+      </p:par>
+    </p:tnLst>
+  </p:timing>
+</p:sld>
+</file>
+
+<file path=ppt/slides/slide7.xml><?xml version="1.0" encoding="utf-8"?>
+<p:sld xmlns:a="http://schemas.openxmlformats.org/drawingml/2006/main" xmlns:r="http://schemas.openxmlformats.org/officeDocument/2006/relationships" xmlns:p="http://schemas.openxmlformats.org/presentationml/2006/main">
+  <p:cSld>
+    <p:spTree>
+      <p:nvGrpSpPr>
+        <p:cNvPr id="1" name=""/>
+        <p:cNvGrpSpPr/>
+        <p:nvPr/>
+      </p:nvGrpSpPr>
+      <p:grpSpPr>
+        <a:xfrm>
+          <a:off x="0" y="0"/>
+          <a:ext cx="0" cy="0"/>
+          <a:chOff x="0" y="0"/>
+          <a:chExt cx="0" cy="0"/>
+        </a:xfrm>
+      </p:grpSpPr>
+      <p:sp>
+        <p:nvSpPr>
+          <p:cNvPr id="2" name="Title 1"/>
+          <p:cNvSpPr>
+            <a:spLocks noGrp="1"/>
+          </p:cNvSpPr>
+          <p:nvPr>
+            <p:ph type="title"/>
+          </p:nvPr>
+        </p:nvSpPr>
+        <p:spPr/>
+        <p:txBody>
+          <a:bodyPr/>
+          <a:lstStyle/>
+          <a:p>
+            <a:r>
+              <a:rPr lang="en-US" dirty="0" smtClean="0"/>
+              <a:t>It’s simple</a:t>
+            </a:r>
+            <a:endParaRPr lang="en-US" dirty="0"/>
+          </a:p>
+        </p:txBody>
+      </p:sp>
+      <p:sp>
+        <p:nvSpPr>
+          <p:cNvPr id="3" name="Content Placeholder 2"/>
+          <p:cNvSpPr>
+            <a:spLocks noGrp="1"/>
+          </p:cNvSpPr>
+          <p:nvPr>
+            <p:ph idx="1"/>
+          </p:nvPr>
+        </p:nvSpPr>
+        <p:spPr/>
+        <p:txBody>
+          <a:bodyPr/>
+          <a:lstStyle/>
+          <a:p>
+            <a:r>
+              <a:rPr lang="en-US" smtClean="0"/>
+              <a:t>Use RoundhousE</a:t>
+            </a:r>
+            <a:r>
+              <a:rPr lang="en-US" dirty="0" smtClean="0"/>
+              <a:t>!</a:t>
+            </a:r>
+            <a:endParaRPr lang="en-US" dirty="0"/>
+          </a:p>
+        </p:txBody>
+      </p:sp>
+    </p:spTree>
+  </p:cSld>
+  <p:clrMapOvr>
+    <a:masterClrMapping/>
+  </p:clrMapOvr>
+  <p:timing>
+    <p:tnLst>
+      <p:par>
+        <p:cTn id="1" dur="indefinite" restart="never" nodeType="tmRoot"/>
+      </p:par>
+    </p:tnLst>
+  </p:timing>
+</p:sld>
+</file>
+
+<file path=ppt/slides/slide8.xml><?xml version="1.0" encoding="utf-8"?>
+<p:sld xmlns:a="http://schemas.openxmlformats.org/drawingml/2006/main" xmlns:r="http://schemas.openxmlformats.org/officeDocument/2006/relationships" xmlns:p="http://schemas.openxmlformats.org/presentationml/2006/main">
+  <p:cSld>
+    <p:spTree>
+      <p:nvGrpSpPr>
+        <p:cNvPr id="1" name=""/>
+        <p:cNvGrpSpPr/>
+        <p:nvPr/>
+      </p:nvGrpSpPr>
+      <p:grpSpPr>
+        <a:xfrm>
+          <a:off x="0" y="0"/>
+          <a:ext cx="0" cy="0"/>
+          <a:chOff x="0" y="0"/>
+          <a:chExt cx="0" cy="0"/>
+        </a:xfrm>
+      </p:grpSpPr>
+      <p:sp>
+        <p:nvSpPr>
+          <p:cNvPr id="2" name="Title 1"/>
+          <p:cNvSpPr>
+            <a:spLocks noGrp="1"/>
+          </p:cNvSpPr>
+          <p:nvPr>
+            <p:ph type="title"/>
+          </p:nvPr>
+        </p:nvSpPr>
+        <p:spPr/>
+        <p:txBody>
+          <a:bodyPr/>
+          <a:lstStyle/>
+          <a:p>
+            <a:r>
+              <a:rPr lang="en-US" dirty="0" smtClean="0"/>
+              <a:t>Let the demos begin</a:t>
+            </a:r>
+            <a:endParaRPr lang="en-US" dirty="0"/>
+          </a:p>
+        </p:txBody>
+      </p:sp>
+      <p:sp>
+        <p:nvSpPr>
+          <p:cNvPr id="3" name="Content Placeholder 2"/>
+          <p:cNvSpPr>
+            <a:spLocks noGrp="1"/>
+          </p:cNvSpPr>
+          <p:nvPr>
+            <p:ph idx="1"/>
+          </p:nvPr>
+        </p:nvSpPr>
+        <p:spPr/>
+        <p:txBody>
+          <a:bodyPr/>
+          <a:lstStyle/>
+          <a:p>
+            <a:endParaRPr lang="en-US"/>
+          </a:p>
+        </p:txBody>
+      </p:sp>
+    </p:spTree>
+  </p:cSld>
+  <p:clrMapOvr>
+    <a:masterClrMapping/>
+  </p:clrMapOvr>
+  <p:timing>
+    <p:tnLst>
+      <p:par>
+        <p:cTn id="1" dur="indefinite" restart="never" nodeType="tmRoot"/>
+      </p:par>
+    </p:tnLst>
+  </p:timing>
+</p:sld>
+</file>
+
+<file path=ppt/slides/slide9.xml><?xml version="1.0" encoding="utf-8"?>
+<p:sld xmlns:a="http://schemas.openxmlformats.org/drawingml/2006/main" xmlns:r="http://schemas.openxmlformats.org/officeDocument/2006/relationships" xmlns:p="http://schemas.openxmlformats.org/presentationml/2006/main">
+  <p:cSld>
+    <p:spTree>
+      <p:nvGrpSpPr>
+        <p:cNvPr id="1" name=""/>
+        <p:cNvGrpSpPr/>
+        <p:nvPr/>
+      </p:nvGrpSpPr>
+      <p:grpSpPr>
+        <a:xfrm>
+          <a:off x="0" y="0"/>
+          <a:ext cx="0" cy="0"/>
+          <a:chOff x="0" y="0"/>
+          <a:chExt cx="0" cy="0"/>
+        </a:xfrm>
+      </p:grpSpPr>
       <p:pic>
         <p:nvPicPr>
           <p:cNvPr id="6" name="Picture 5" descr="UppercuTInvertWithLink.gif"/>
@@ -6660,7 +8046,7 @@
           <p:nvPr/>
         </p:nvPicPr>
         <p:blipFill>
-          <a:blip r:embed="rId2" cstate="print"/>
+          <a:blip r:embed="rId2" cstate="screen"/>
           <a:stretch>
             <a:fillRect/>
           </a:stretch>
@@ -6705,6 +8091,80 @@
             </a:r>
             <a:endParaRPr lang="en-US" sz="4000" b="1" dirty="0">
               <a:latin typeface="Georgia" pitchFamily="18" charset="0"/>
+            </a:endParaRPr>
+          </a:p>
+        </p:txBody>
+      </p:sp>
+      <p:sp>
+        <p:nvSpPr>
+          <p:cNvPr id="4" name="Subtitle 2"/>
+          <p:cNvSpPr txBox="1">
+            <a:spLocks/>
+          </p:cNvSpPr>
+          <p:nvPr/>
+        </p:nvSpPr>
+        <p:spPr>
+          <a:xfrm>
+            <a:off x="0" y="6172200"/>
+            <a:ext cx="9144000" cy="441960"/>
+          </a:xfrm>
+          <a:prstGeom prst="rect">
+            <a:avLst/>
+          </a:prstGeom>
+        </p:spPr>
+        <p:txBody>
+          <a:bodyPr>
+            <a:normAutofit/>
+          </a:bodyPr>
+          <a:lstStyle/>
+          <a:p>
+            <a:pPr marL="411480" marR="0" lvl="0" indent="-342900" algn="ctr" defTabSz="914400" rtl="0" eaLnBrk="1" fontAlgn="auto" latinLnBrk="0" hangingPunct="1">
+              <a:lnSpc>
+                <a:spcPct val="100000"/>
+              </a:lnSpc>
+              <a:spcBef>
+                <a:spcPts val="700"/>
+              </a:spcBef>
+              <a:spcAft>
+                <a:spcPts val="0"/>
+              </a:spcAft>
+              <a:buClr>
+                <a:schemeClr val="tx2"/>
+              </a:buClr>
+              <a:buSzPct val="95000"/>
+              <a:tabLst/>
+              <a:defRPr/>
+            </a:pPr>
+            <a:r>
+              <a:rPr kumimoji="0" lang="en-US" sz="1900" b="0" i="0" u="none" strike="noStrike" kern="1200" cap="none" spc="0" normalizeH="0" baseline="0" noProof="0" dirty="0" smtClean="0">
+                <a:ln>
+                  <a:noFill/>
+                </a:ln>
+                <a:solidFill>
+                  <a:schemeClr val="tx1"/>
+                </a:solidFill>
+                <a:effectLst/>
+                <a:uLnTx/>
+                <a:uFillTx/>
+                <a:latin typeface="Georgia" pitchFamily="18" charset="0"/>
+                <a:ea typeface="+mn-ea"/>
+                <a:cs typeface="+mn-cs"/>
+              </a:rPr>
+              <a:t>http://ferventcoder.com | ferventcoder@gmail.com | Twitter: ferventcoder</a:t>
+            </a:r>
+            <a:endParaRPr kumimoji="0" lang="en-US" sz="1900" b="0" i="0" u="none" strike="noStrike" kern="1200" cap="none" spc="0" normalizeH="0" baseline="0" noProof="0" dirty="0">
+              <a:ln>
+                <a:noFill/>
+              </a:ln>
+              <a:solidFill>
+                <a:schemeClr val="tx1"/>
+              </a:solidFill>
+              <a:effectLst/>
+              <a:uLnTx/>
+              <a:uFillTx/>
+              <a:latin typeface="Georgia" pitchFamily="18" charset="0"/>
+              <a:ea typeface="+mn-ea"/>
+              <a:cs typeface="+mn-cs"/>
             </a:endParaRPr>
           </a:p>
         </p:txBody>

</xml_diff>

<commit_message>
merging back in nhibernate trunk. Next task, make transactions work again
</commit_message>
<xml_diff>
--- a/docs/RoundhousEPresentation.pptx
+++ b/docs/RoundhousEPresentation.pptx
@@ -5,19 +5,28 @@
     <p:sldMasterId id="2147483660" r:id="rId1"/>
   </p:sldMasterIdLst>
   <p:notesMasterIdLst>
-    <p:notesMasterId r:id="rId12"/>
+    <p:notesMasterId r:id="rId21"/>
   </p:notesMasterIdLst>
   <p:sldIdLst>
     <p:sldId id="256" r:id="rId2"/>
-    <p:sldId id="302" r:id="rId3"/>
-    <p:sldId id="296" r:id="rId4"/>
+    <p:sldId id="301" r:id="rId3"/>
+    <p:sldId id="302" r:id="rId4"/>
     <p:sldId id="295" r:id="rId5"/>
-    <p:sldId id="297" r:id="rId6"/>
-    <p:sldId id="298" r:id="rId7"/>
-    <p:sldId id="299" r:id="rId8"/>
-    <p:sldId id="300" r:id="rId9"/>
-    <p:sldId id="294" r:id="rId10"/>
-    <p:sldId id="289" r:id="rId11"/>
+    <p:sldId id="298" r:id="rId6"/>
+    <p:sldId id="299" r:id="rId7"/>
+    <p:sldId id="300" r:id="rId8"/>
+    <p:sldId id="313" r:id="rId9"/>
+    <p:sldId id="312" r:id="rId10"/>
+    <p:sldId id="307" r:id="rId11"/>
+    <p:sldId id="304" r:id="rId12"/>
+    <p:sldId id="303" r:id="rId13"/>
+    <p:sldId id="305" r:id="rId14"/>
+    <p:sldId id="306" r:id="rId15"/>
+    <p:sldId id="311" r:id="rId16"/>
+    <p:sldId id="308" r:id="rId17"/>
+    <p:sldId id="309" r:id="rId18"/>
+    <p:sldId id="310" r:id="rId19"/>
+    <p:sldId id="289" r:id="rId20"/>
   </p:sldIdLst>
   <p:sldSz cx="9144000" cy="6858000" type="screen4x3"/>
   <p:notesSz cx="6858000" cy="9144000"/>
@@ -202,7 +211,7 @@
             <a:fld id="{50B9556B-D0FD-4B47-B68C-0681912A50B6}" type="datetimeFigureOut">
               <a:rPr lang="en-US" smtClean="0"/>
               <a:pPr/>
-              <a:t>6/19/2010</a:t>
+              <a:t>9/9/2010</a:t>
             </a:fld>
             <a:endParaRPr lang="en-US"/>
           </a:p>
@@ -550,204 +559,6 @@
 </p:notes>
 </file>
 
-<file path=ppt/notesSlides/notesSlide2.xml><?xml version="1.0" encoding="utf-8"?>
-<p:notes xmlns:a="http://schemas.openxmlformats.org/drawingml/2006/main" xmlns:r="http://schemas.openxmlformats.org/officeDocument/2006/relationships" xmlns:p="http://schemas.openxmlformats.org/presentationml/2006/main">
-  <p:cSld>
-    <p:spTree>
-      <p:nvGrpSpPr>
-        <p:cNvPr id="1" name=""/>
-        <p:cNvGrpSpPr/>
-        <p:nvPr/>
-      </p:nvGrpSpPr>
-      <p:grpSpPr>
-        <a:xfrm>
-          <a:off x="0" y="0"/>
-          <a:ext cx="0" cy="0"/>
-          <a:chOff x="0" y="0"/>
-          <a:chExt cx="0" cy="0"/>
-        </a:xfrm>
-      </p:grpSpPr>
-      <p:sp>
-        <p:nvSpPr>
-          <p:cNvPr id="2" name="Slide Image Placeholder 1"/>
-          <p:cNvSpPr>
-            <a:spLocks noGrp="1" noRot="1" noChangeAspect="1"/>
-          </p:cNvSpPr>
-          <p:nvPr>
-            <p:ph type="sldImg"/>
-          </p:nvPr>
-        </p:nvSpPr>
-        <p:spPr/>
-      </p:sp>
-      <p:sp>
-        <p:nvSpPr>
-          <p:cNvPr id="3" name="Notes Placeholder 2"/>
-          <p:cNvSpPr>
-            <a:spLocks noGrp="1"/>
-          </p:cNvSpPr>
-          <p:nvPr>
-            <p:ph type="body" idx="1"/>
-          </p:nvPr>
-        </p:nvSpPr>
-        <p:spPr/>
-        <p:txBody>
-          <a:bodyPr>
-            <a:normAutofit/>
-          </a:bodyPr>
-          <a:lstStyle/>
-          <a:p>
-            <a:endParaRPr lang="en-US" dirty="0"/>
-          </a:p>
-        </p:txBody>
-      </p:sp>
-      <p:sp>
-        <p:nvSpPr>
-          <p:cNvPr id="4" name="Slide Number Placeholder 3"/>
-          <p:cNvSpPr>
-            <a:spLocks noGrp="1"/>
-          </p:cNvSpPr>
-          <p:nvPr>
-            <p:ph type="sldNum" sz="quarter" idx="10"/>
-          </p:nvPr>
-        </p:nvSpPr>
-        <p:spPr/>
-        <p:txBody>
-          <a:bodyPr/>
-          <a:lstStyle/>
-          <a:p>
-            <a:fld id="{A1D642FB-5C7D-46F5-ABB1-701CC3AB89E6}" type="slidenum">
-              <a:rPr lang="en-US" smtClean="0"/>
-              <a:pPr/>
-              <a:t>3</a:t>
-            </a:fld>
-            <a:endParaRPr lang="en-US"/>
-          </a:p>
-        </p:txBody>
-      </p:sp>
-    </p:spTree>
-  </p:cSld>
-  <p:clrMapOvr>
-    <a:masterClrMapping/>
-  </p:clrMapOvr>
-</p:notes>
-</file>
-
-<file path=ppt/notesSlides/notesSlide3.xml><?xml version="1.0" encoding="utf-8"?>
-<p:notes xmlns:a="http://schemas.openxmlformats.org/drawingml/2006/main" xmlns:r="http://schemas.openxmlformats.org/officeDocument/2006/relationships" xmlns:p="http://schemas.openxmlformats.org/presentationml/2006/main">
-  <p:cSld>
-    <p:spTree>
-      <p:nvGrpSpPr>
-        <p:cNvPr id="1" name=""/>
-        <p:cNvGrpSpPr/>
-        <p:nvPr/>
-      </p:nvGrpSpPr>
-      <p:grpSpPr>
-        <a:xfrm>
-          <a:off x="0" y="0"/>
-          <a:ext cx="0" cy="0"/>
-          <a:chOff x="0" y="0"/>
-          <a:chExt cx="0" cy="0"/>
-        </a:xfrm>
-      </p:grpSpPr>
-      <p:sp>
-        <p:nvSpPr>
-          <p:cNvPr id="2" name="Slide Image Placeholder 1"/>
-          <p:cNvSpPr>
-            <a:spLocks noGrp="1" noRot="1" noChangeAspect="1"/>
-          </p:cNvSpPr>
-          <p:nvPr>
-            <p:ph type="sldImg"/>
-          </p:nvPr>
-        </p:nvSpPr>
-        <p:spPr/>
-      </p:sp>
-      <p:sp>
-        <p:nvSpPr>
-          <p:cNvPr id="3" name="Notes Placeholder 2"/>
-          <p:cNvSpPr>
-            <a:spLocks noGrp="1"/>
-          </p:cNvSpPr>
-          <p:nvPr>
-            <p:ph type="body" idx="1"/>
-          </p:nvPr>
-        </p:nvSpPr>
-        <p:spPr/>
-        <p:txBody>
-          <a:bodyPr>
-            <a:normAutofit/>
-          </a:bodyPr>
-          <a:lstStyle/>
-          <a:p>
-            <a:r>
-              <a:rPr lang="en-US" dirty="0" smtClean="0"/>
-              <a:t>Product already using </a:t>
-            </a:r>
-          </a:p>
-          <a:p>
-            <a:endParaRPr lang="en-US" dirty="0" smtClean="0"/>
-          </a:p>
-          <a:p>
-            <a:r>
-              <a:rPr lang="en-US" dirty="0" err="1" smtClean="0"/>
-              <a:t>versionBuilder</a:t>
-            </a:r>
-            <a:endParaRPr lang="en-US" dirty="0" smtClean="0"/>
-          </a:p>
-          <a:p>
-            <a:r>
-              <a:rPr lang="en-US" dirty="0" err="1" smtClean="0"/>
-              <a:t>environmentBuilder</a:t>
-            </a:r>
-            <a:endParaRPr lang="en-US" dirty="0" smtClean="0"/>
-          </a:p>
-          <a:p>
-            <a:r>
-              <a:rPr lang="en-US" dirty="0" err="1" smtClean="0"/>
-              <a:t>docBuilder</a:t>
-            </a:r>
-            <a:r>
-              <a:rPr lang="en-US" dirty="0" smtClean="0"/>
-              <a:t>?</a:t>
-            </a:r>
-            <a:endParaRPr lang="en-US" smtClean="0"/>
-          </a:p>
-          <a:p>
-            <a:endParaRPr lang="en-US"/>
-          </a:p>
-        </p:txBody>
-      </p:sp>
-      <p:sp>
-        <p:nvSpPr>
-          <p:cNvPr id="4" name="Slide Number Placeholder 3"/>
-          <p:cNvSpPr>
-            <a:spLocks noGrp="1"/>
-          </p:cNvSpPr>
-          <p:nvPr>
-            <p:ph type="sldNum" sz="quarter" idx="10"/>
-          </p:nvPr>
-        </p:nvSpPr>
-        <p:spPr/>
-        <p:txBody>
-          <a:bodyPr/>
-          <a:lstStyle/>
-          <a:p>
-            <a:fld id="{A1D642FB-5C7D-46F5-ABB1-701CC3AB89E6}" type="slidenum">
-              <a:rPr lang="en-US" smtClean="0"/>
-              <a:pPr/>
-              <a:t>9</a:t>
-            </a:fld>
-            <a:endParaRPr lang="en-US"/>
-          </a:p>
-        </p:txBody>
-      </p:sp>
-    </p:spTree>
-  </p:cSld>
-  <p:clrMapOvr>
-    <a:masterClrMapping/>
-  </p:clrMapOvr>
-</p:notes>
-</file>
-
 <file path=ppt/slideLayouts/slideLayout1.xml><?xml version="1.0" encoding="utf-8"?>
 <p:sldLayout xmlns:a="http://schemas.openxmlformats.org/drawingml/2006/main" xmlns:r="http://schemas.openxmlformats.org/officeDocument/2006/relationships" xmlns:p="http://schemas.openxmlformats.org/presentationml/2006/main" showMasterSp="0" type="title" preserve="1">
   <p:cSld name="Title Slide">
@@ -809,7 +620,7 @@
             <a:fld id="{08C7389D-B56E-4C42-BFE2-46A0FB05E106}" type="datetimeFigureOut">
               <a:rPr lang="en-US" smtClean="0"/>
               <a:pPr/>
-              <a:t>6/19/2010</a:t>
+              <a:t>9/9/2010</a:t>
             </a:fld>
             <a:endParaRPr lang="en-US"/>
           </a:p>
@@ -1088,7 +899,7 @@
             <a:fld id="{08C7389D-B56E-4C42-BFE2-46A0FB05E106}" type="datetimeFigureOut">
               <a:rPr lang="en-US" smtClean="0"/>
               <a:pPr/>
-              <a:t>6/19/2010</a:t>
+              <a:t>9/9/2010</a:t>
             </a:fld>
             <a:endParaRPr lang="en-US"/>
           </a:p>
@@ -1275,7 +1086,7 @@
             <a:fld id="{08C7389D-B56E-4C42-BFE2-46A0FB05E106}" type="datetimeFigureOut">
               <a:rPr lang="en-US" smtClean="0"/>
               <a:pPr/>
-              <a:t>6/19/2010</a:t>
+              <a:t>9/9/2010</a:t>
             </a:fld>
             <a:endParaRPr lang="en-US"/>
           </a:p>
@@ -1462,7 +1273,7 @@
             <a:fld id="{08C7389D-B56E-4C42-BFE2-46A0FB05E106}" type="datetimeFigureOut">
               <a:rPr lang="en-US" smtClean="0"/>
               <a:pPr/>
-              <a:t>6/19/2010</a:t>
+              <a:t>9/9/2010</a:t>
             </a:fld>
             <a:endParaRPr lang="en-US"/>
           </a:p>
@@ -2947,7 +2758,7 @@
             <a:fld id="{08C7389D-B56E-4C42-BFE2-46A0FB05E106}" type="datetimeFigureOut">
               <a:rPr lang="en-US" smtClean="0"/>
               <a:pPr/>
-              <a:t>6/19/2010</a:t>
+              <a:t>9/9/2010</a:t>
             </a:fld>
             <a:endParaRPr lang="en-US"/>
           </a:p>
@@ -3549,7 +3360,7 @@
             <a:fld id="{08C7389D-B56E-4C42-BFE2-46A0FB05E106}" type="datetimeFigureOut">
               <a:rPr lang="en-US" smtClean="0"/>
               <a:pPr/>
-              <a:t>6/19/2010</a:t>
+              <a:t>9/9/2010</a:t>
             </a:fld>
             <a:endParaRPr lang="en-US"/>
           </a:p>
@@ -3988,7 +3799,7 @@
             <a:fld id="{08C7389D-B56E-4C42-BFE2-46A0FB05E106}" type="datetimeFigureOut">
               <a:rPr lang="en-US" smtClean="0"/>
               <a:pPr/>
-              <a:t>6/19/2010</a:t>
+              <a:t>9/9/2010</a:t>
             </a:fld>
             <a:endParaRPr lang="en-US"/>
           </a:p>
@@ -4551,7 +4362,7 @@
             <a:fld id="{08C7389D-B56E-4C42-BFE2-46A0FB05E106}" type="datetimeFigureOut">
               <a:rPr lang="en-US" smtClean="0"/>
               <a:pPr/>
-              <a:t>6/19/2010</a:t>
+              <a:t>9/9/2010</a:t>
             </a:fld>
             <a:endParaRPr lang="en-US"/>
           </a:p>
@@ -4649,7 +4460,7 @@
             <a:fld id="{08C7389D-B56E-4C42-BFE2-46A0FB05E106}" type="datetimeFigureOut">
               <a:rPr lang="en-US" smtClean="0"/>
               <a:pPr/>
-              <a:t>6/19/2010</a:t>
+              <a:t>9/9/2010</a:t>
             </a:fld>
             <a:endParaRPr lang="en-US"/>
           </a:p>
@@ -4905,7 +4716,7 @@
             <a:fld id="{08C7389D-B56E-4C42-BFE2-46A0FB05E106}" type="datetimeFigureOut">
               <a:rPr lang="en-US" smtClean="0"/>
               <a:pPr/>
-              <a:t>6/19/2010</a:t>
+              <a:t>9/9/2010</a:t>
             </a:fld>
             <a:endParaRPr lang="en-US"/>
           </a:p>
@@ -5628,7 +5439,7 @@
             <a:fld id="{08C7389D-B56E-4C42-BFE2-46A0FB05E106}" type="datetimeFigureOut">
               <a:rPr lang="en-US" smtClean="0"/>
               <a:pPr/>
-              <a:t>6/19/2010</a:t>
+              <a:t>9/9/2010</a:t>
             </a:fld>
             <a:endParaRPr lang="en-US"/>
           </a:p>
@@ -5855,7 +5666,7 @@
             <a:fld id="{08C7389D-B56E-4C42-BFE2-46A0FB05E106}" type="datetimeFigureOut">
               <a:rPr lang="en-US" smtClean="0"/>
               <a:pPr/>
-              <a:t>6/19/2010</a:t>
+              <a:t>9/9/2010</a:t>
             </a:fld>
             <a:endParaRPr lang="en-US"/>
           </a:p>
@@ -6381,6 +6192,842 @@
           <a:chExt cx="0" cy="0"/>
         </a:xfrm>
       </p:grpSpPr>
+      <p:sp>
+        <p:nvSpPr>
+          <p:cNvPr id="2" name="Title 1"/>
+          <p:cNvSpPr>
+            <a:spLocks noGrp="1"/>
+          </p:cNvSpPr>
+          <p:nvPr>
+            <p:ph type="title"/>
+          </p:nvPr>
+        </p:nvSpPr>
+        <p:spPr/>
+        <p:txBody>
+          <a:bodyPr/>
+          <a:lstStyle/>
+          <a:p>
+            <a:r>
+              <a:rPr lang="en-US" dirty="0" smtClean="0"/>
+              <a:t>Easy to use</a:t>
+            </a:r>
+            <a:endParaRPr lang="en-US" dirty="0"/>
+          </a:p>
+        </p:txBody>
+      </p:sp>
+      <p:sp>
+        <p:nvSpPr>
+          <p:cNvPr id="3" name="Content Placeholder 2"/>
+          <p:cNvSpPr>
+            <a:spLocks noGrp="1"/>
+          </p:cNvSpPr>
+          <p:nvPr>
+            <p:ph idx="1"/>
+          </p:nvPr>
+        </p:nvSpPr>
+        <p:spPr/>
+        <p:txBody>
+          <a:bodyPr/>
+          <a:lstStyle/>
+          <a:p>
+            <a:r>
+              <a:rPr lang="en-US" dirty="0" smtClean="0"/>
+              <a:t>One required parameter (/d) for database</a:t>
+            </a:r>
+          </a:p>
+          <a:p>
+            <a:r>
+              <a:rPr lang="en-US" dirty="0" smtClean="0"/>
+              <a:t>Folder format</a:t>
+            </a:r>
+          </a:p>
+          <a:p>
+            <a:r>
+              <a:rPr lang="en-US" dirty="0" smtClean="0"/>
+              <a:t>Comes with samples</a:t>
+            </a:r>
+            <a:endParaRPr lang="en-US" dirty="0"/>
+          </a:p>
+        </p:txBody>
+      </p:sp>
+    </p:spTree>
+  </p:cSld>
+  <p:clrMapOvr>
+    <a:masterClrMapping/>
+  </p:clrMapOvr>
+  <p:timing>
+    <p:tnLst>
+      <p:par>
+        <p:cTn id="1" dur="indefinite" restart="never" nodeType="tmRoot"/>
+      </p:par>
+    </p:tnLst>
+  </p:timing>
+</p:sld>
+</file>
+
+<file path=ppt/slides/slide11.xml><?xml version="1.0" encoding="utf-8"?>
+<p:sld xmlns:a="http://schemas.openxmlformats.org/drawingml/2006/main" xmlns:r="http://schemas.openxmlformats.org/officeDocument/2006/relationships" xmlns:p="http://schemas.openxmlformats.org/presentationml/2006/main">
+  <p:cSld>
+    <p:spTree>
+      <p:nvGrpSpPr>
+        <p:cNvPr id="1" name=""/>
+        <p:cNvGrpSpPr/>
+        <p:nvPr/>
+      </p:nvGrpSpPr>
+      <p:grpSpPr>
+        <a:xfrm>
+          <a:off x="0" y="0"/>
+          <a:ext cx="0" cy="0"/>
+          <a:chOff x="0" y="0"/>
+          <a:chExt cx="0" cy="0"/>
+        </a:xfrm>
+      </p:grpSpPr>
+      <p:sp>
+        <p:nvSpPr>
+          <p:cNvPr id="2" name="Title 1"/>
+          <p:cNvSpPr>
+            <a:spLocks noGrp="1"/>
+          </p:cNvSpPr>
+          <p:nvPr>
+            <p:ph type="title"/>
+          </p:nvPr>
+        </p:nvSpPr>
+        <p:spPr/>
+        <p:txBody>
+          <a:bodyPr/>
+          <a:lstStyle/>
+          <a:p>
+            <a:r>
+              <a:rPr lang="en-US" dirty="0" smtClean="0"/>
+              <a:t>Make Your Auditors Smile</a:t>
+            </a:r>
+            <a:endParaRPr lang="en-US" dirty="0"/>
+          </a:p>
+        </p:txBody>
+      </p:sp>
+      <p:sp>
+        <p:nvSpPr>
+          <p:cNvPr id="3" name="Content Placeholder 2"/>
+          <p:cNvSpPr>
+            <a:spLocks noGrp="1"/>
+          </p:cNvSpPr>
+          <p:nvPr>
+            <p:ph idx="1"/>
+          </p:nvPr>
+        </p:nvSpPr>
+        <p:spPr/>
+        <p:txBody>
+          <a:bodyPr/>
+          <a:lstStyle/>
+          <a:p>
+            <a:r>
+              <a:rPr lang="en-US" dirty="0" smtClean="0"/>
+              <a:t>Audit logging – who did exactly what when?</a:t>
+            </a:r>
+          </a:p>
+          <a:p>
+            <a:r>
+              <a:rPr lang="en-US" dirty="0" smtClean="0"/>
+              <a:t>Auditing changes by capturing all scripts and logs each time</a:t>
+            </a:r>
+          </a:p>
+          <a:p>
+            <a:endParaRPr lang="en-US" dirty="0"/>
+          </a:p>
+        </p:txBody>
+      </p:sp>
+    </p:spTree>
+  </p:cSld>
+  <p:clrMapOvr>
+    <a:masterClrMapping/>
+  </p:clrMapOvr>
+  <p:timing>
+    <p:tnLst>
+      <p:par>
+        <p:cTn id="1" dur="indefinite" restart="never" nodeType="tmRoot"/>
+      </p:par>
+    </p:tnLst>
+  </p:timing>
+</p:sld>
+</file>
+
+<file path=ppt/slides/slide12.xml><?xml version="1.0" encoding="utf-8"?>
+<p:sld xmlns:a="http://schemas.openxmlformats.org/drawingml/2006/main" xmlns:r="http://schemas.openxmlformats.org/officeDocument/2006/relationships" xmlns:p="http://schemas.openxmlformats.org/presentationml/2006/main">
+  <p:cSld>
+    <p:spTree>
+      <p:nvGrpSpPr>
+        <p:cNvPr id="1" name=""/>
+        <p:cNvGrpSpPr/>
+        <p:nvPr/>
+      </p:nvGrpSpPr>
+      <p:grpSpPr>
+        <a:xfrm>
+          <a:off x="0" y="0"/>
+          <a:ext cx="0" cy="0"/>
+          <a:chOff x="0" y="0"/>
+          <a:chExt cx="0" cy="0"/>
+        </a:xfrm>
+      </p:grpSpPr>
+      <p:sp>
+        <p:nvSpPr>
+          <p:cNvPr id="2" name="Title 1"/>
+          <p:cNvSpPr>
+            <a:spLocks noGrp="1"/>
+          </p:cNvSpPr>
+          <p:nvPr>
+            <p:ph type="title"/>
+          </p:nvPr>
+        </p:nvSpPr>
+        <p:spPr/>
+        <p:txBody>
+          <a:bodyPr/>
+          <a:lstStyle/>
+          <a:p>
+            <a:r>
+              <a:rPr lang="en-US" dirty="0" smtClean="0"/>
+              <a:t>Version Your Database</a:t>
+            </a:r>
+            <a:endParaRPr lang="en-US" dirty="0"/>
+          </a:p>
+        </p:txBody>
+      </p:sp>
+      <p:sp>
+        <p:nvSpPr>
+          <p:cNvPr id="3" name="Content Placeholder 2"/>
+          <p:cNvSpPr>
+            <a:spLocks noGrp="1"/>
+          </p:cNvSpPr>
+          <p:nvPr>
+            <p:ph idx="1"/>
+          </p:nvPr>
+        </p:nvSpPr>
+        <p:spPr/>
+        <p:txBody>
+          <a:bodyPr/>
+          <a:lstStyle/>
+          <a:p>
+            <a:r>
+              <a:rPr lang="en-US" dirty="0" smtClean="0"/>
+              <a:t>1.0.0.0 – version?</a:t>
+            </a:r>
+          </a:p>
+          <a:p>
+            <a:r>
+              <a:rPr lang="en-US" dirty="0" smtClean="0"/>
+              <a:t>“What version is your database on?”</a:t>
+            </a:r>
+            <a:endParaRPr lang="en-US" dirty="0"/>
+          </a:p>
+        </p:txBody>
+      </p:sp>
+    </p:spTree>
+  </p:cSld>
+  <p:clrMapOvr>
+    <a:masterClrMapping/>
+  </p:clrMapOvr>
+  <p:timing>
+    <p:tnLst>
+      <p:par>
+        <p:cTn id="1" dur="indefinite" restart="never" nodeType="tmRoot"/>
+      </p:par>
+    </p:tnLst>
+  </p:timing>
+</p:sld>
+</file>
+
+<file path=ppt/slides/slide13.xml><?xml version="1.0" encoding="utf-8"?>
+<p:sld xmlns:a="http://schemas.openxmlformats.org/drawingml/2006/main" xmlns:r="http://schemas.openxmlformats.org/officeDocument/2006/relationships" xmlns:p="http://schemas.openxmlformats.org/presentationml/2006/main">
+  <p:cSld>
+    <p:spTree>
+      <p:nvGrpSpPr>
+        <p:cNvPr id="1" name=""/>
+        <p:cNvGrpSpPr/>
+        <p:nvPr/>
+      </p:nvGrpSpPr>
+      <p:grpSpPr>
+        <a:xfrm>
+          <a:off x="0" y="0"/>
+          <a:ext cx="0" cy="0"/>
+          <a:chOff x="0" y="0"/>
+          <a:chExt cx="0" cy="0"/>
+        </a:xfrm>
+      </p:grpSpPr>
+      <p:sp>
+        <p:nvSpPr>
+          <p:cNvPr id="2" name="Title 1"/>
+          <p:cNvSpPr>
+            <a:spLocks noGrp="1"/>
+          </p:cNvSpPr>
+          <p:nvPr>
+            <p:ph type="title"/>
+          </p:nvPr>
+        </p:nvSpPr>
+        <p:spPr/>
+        <p:txBody>
+          <a:bodyPr/>
+          <a:lstStyle/>
+          <a:p>
+            <a:r>
+              <a:rPr lang="en-US" dirty="0" smtClean="0"/>
+              <a:t>Environment Awareness</a:t>
+            </a:r>
+            <a:endParaRPr lang="en-US" dirty="0"/>
+          </a:p>
+        </p:txBody>
+      </p:sp>
+      <p:sp>
+        <p:nvSpPr>
+          <p:cNvPr id="3" name="Content Placeholder 2"/>
+          <p:cNvSpPr>
+            <a:spLocks noGrp="1"/>
+          </p:cNvSpPr>
+          <p:nvPr>
+            <p:ph idx="1"/>
+          </p:nvPr>
+        </p:nvSpPr>
+        <p:spPr/>
+        <p:txBody>
+          <a:bodyPr/>
+          <a:lstStyle/>
+          <a:p>
+            <a:r>
+              <a:rPr lang="en-US" dirty="0" smtClean="0"/>
+              <a:t>Scripts meant for an environment will only run in that environment</a:t>
+            </a:r>
+          </a:p>
+          <a:p>
+            <a:r>
+              <a:rPr lang="en-US" dirty="0" smtClean="0"/>
+              <a:t>Default is “LOCAL”</a:t>
+            </a:r>
+          </a:p>
+        </p:txBody>
+      </p:sp>
+    </p:spTree>
+  </p:cSld>
+  <p:clrMapOvr>
+    <a:masterClrMapping/>
+  </p:clrMapOvr>
+  <p:timing>
+    <p:tnLst>
+      <p:par>
+        <p:cTn id="1" dur="indefinite" restart="never" nodeType="tmRoot"/>
+      </p:par>
+    </p:tnLst>
+  </p:timing>
+</p:sld>
+</file>
+
+<file path=ppt/slides/slide14.xml><?xml version="1.0" encoding="utf-8"?>
+<p:sld xmlns:a="http://schemas.openxmlformats.org/drawingml/2006/main" xmlns:r="http://schemas.openxmlformats.org/officeDocument/2006/relationships" xmlns:p="http://schemas.openxmlformats.org/presentationml/2006/main">
+  <p:cSld>
+    <p:spTree>
+      <p:nvGrpSpPr>
+        <p:cNvPr id="1" name=""/>
+        <p:cNvGrpSpPr/>
+        <p:nvPr/>
+      </p:nvGrpSpPr>
+      <p:grpSpPr>
+        <a:xfrm>
+          <a:off x="0" y="0"/>
+          <a:ext cx="0" cy="0"/>
+          <a:chOff x="0" y="0"/>
+          <a:chExt cx="0" cy="0"/>
+        </a:xfrm>
+      </p:grpSpPr>
+      <p:sp>
+        <p:nvSpPr>
+          <p:cNvPr id="2" name="Title 1"/>
+          <p:cNvSpPr>
+            <a:spLocks noGrp="1"/>
+          </p:cNvSpPr>
+          <p:nvPr>
+            <p:ph type="title"/>
+          </p:nvPr>
+        </p:nvSpPr>
+        <p:spPr/>
+        <p:txBody>
+          <a:bodyPr/>
+          <a:lstStyle/>
+          <a:p>
+            <a:r>
+              <a:rPr lang="en-US" dirty="0" smtClean="0"/>
+              <a:t>Conventions / Customizable</a:t>
+            </a:r>
+            <a:endParaRPr lang="en-US" dirty="0"/>
+          </a:p>
+        </p:txBody>
+      </p:sp>
+      <p:sp>
+        <p:nvSpPr>
+          <p:cNvPr id="3" name="Content Placeholder 2"/>
+          <p:cNvSpPr>
+            <a:spLocks noGrp="1"/>
+          </p:cNvSpPr>
+          <p:nvPr>
+            <p:ph idx="1"/>
+          </p:nvPr>
+        </p:nvSpPr>
+        <p:spPr/>
+        <p:txBody>
+          <a:bodyPr/>
+          <a:lstStyle/>
+          <a:p>
+            <a:r>
+              <a:rPr lang="en-US" dirty="0" smtClean="0"/>
+              <a:t>The cool stuff</a:t>
+            </a:r>
+          </a:p>
+          <a:p>
+            <a:r>
+              <a:rPr lang="en-US" dirty="0" smtClean="0"/>
+              <a:t>Don’t like RoundhousE as the schema? Change it</a:t>
+            </a:r>
+          </a:p>
+          <a:p>
+            <a:r>
+              <a:rPr lang="en-US" dirty="0" smtClean="0"/>
+              <a:t>Don’t like the “up” folder? Change it</a:t>
+            </a:r>
+          </a:p>
+          <a:p>
+            <a:r>
+              <a:rPr lang="en-US" dirty="0" smtClean="0"/>
+              <a:t>Don’t like </a:t>
+            </a:r>
+            <a:r>
+              <a:rPr lang="en-US" dirty="0" err="1" smtClean="0"/>
+              <a:t>xxxxx</a:t>
+            </a:r>
+            <a:r>
+              <a:rPr lang="en-US" dirty="0" smtClean="0"/>
+              <a:t>? Change it</a:t>
+            </a:r>
+          </a:p>
+          <a:p>
+            <a:endParaRPr lang="en-US" dirty="0"/>
+          </a:p>
+        </p:txBody>
+      </p:sp>
+    </p:spTree>
+  </p:cSld>
+  <p:clrMapOvr>
+    <a:masterClrMapping/>
+  </p:clrMapOvr>
+  <p:timing>
+    <p:tnLst>
+      <p:par>
+        <p:cTn id="1" dur="indefinite" restart="never" nodeType="tmRoot"/>
+      </p:par>
+    </p:tnLst>
+  </p:timing>
+</p:sld>
+</file>
+
+<file path=ppt/slides/slide15.xml><?xml version="1.0" encoding="utf-8"?>
+<p:sld xmlns:a="http://schemas.openxmlformats.org/drawingml/2006/main" xmlns:r="http://schemas.openxmlformats.org/officeDocument/2006/relationships" xmlns:p="http://schemas.openxmlformats.org/presentationml/2006/main">
+  <p:cSld>
+    <p:spTree>
+      <p:nvGrpSpPr>
+        <p:cNvPr id="1" name=""/>
+        <p:cNvGrpSpPr/>
+        <p:nvPr/>
+      </p:nvGrpSpPr>
+      <p:grpSpPr>
+        <a:xfrm>
+          <a:off x="0" y="0"/>
+          <a:ext cx="0" cy="0"/>
+          <a:chOff x="0" y="0"/>
+          <a:chExt cx="0" cy="0"/>
+        </a:xfrm>
+      </p:grpSpPr>
+      <p:sp>
+        <p:nvSpPr>
+          <p:cNvPr id="2" name="Title 1"/>
+          <p:cNvSpPr>
+            <a:spLocks noGrp="1"/>
+          </p:cNvSpPr>
+          <p:nvPr>
+            <p:ph type="title"/>
+          </p:nvPr>
+        </p:nvSpPr>
+        <p:spPr/>
+        <p:txBody>
+          <a:bodyPr/>
+          <a:lstStyle/>
+          <a:p>
+            <a:r>
+              <a:rPr lang="en-US" dirty="0" smtClean="0"/>
+              <a:t>Implement into development</a:t>
+            </a:r>
+            <a:endParaRPr lang="en-US" dirty="0"/>
+          </a:p>
+        </p:txBody>
+      </p:sp>
+      <p:sp>
+        <p:nvSpPr>
+          <p:cNvPr id="3" name="Content Placeholder 2"/>
+          <p:cNvSpPr>
+            <a:spLocks noGrp="1"/>
+          </p:cNvSpPr>
+          <p:nvPr>
+            <p:ph idx="1"/>
+          </p:nvPr>
+        </p:nvSpPr>
+        <p:spPr/>
+        <p:txBody>
+          <a:bodyPr/>
+          <a:lstStyle/>
+          <a:p>
+            <a:r>
+              <a:rPr lang="en-US" dirty="0" smtClean="0"/>
+              <a:t>Also the cool stuff</a:t>
+            </a:r>
+            <a:endParaRPr lang="en-US" dirty="0"/>
+          </a:p>
+        </p:txBody>
+      </p:sp>
+    </p:spTree>
+  </p:cSld>
+  <p:clrMapOvr>
+    <a:masterClrMapping/>
+  </p:clrMapOvr>
+  <p:timing>
+    <p:tnLst>
+      <p:par>
+        <p:cTn id="1" dur="indefinite" restart="never" nodeType="tmRoot"/>
+      </p:par>
+    </p:tnLst>
+  </p:timing>
+</p:sld>
+</file>
+
+<file path=ppt/slides/slide16.xml><?xml version="1.0" encoding="utf-8"?>
+<p:sld xmlns:a="http://schemas.openxmlformats.org/drawingml/2006/main" xmlns:r="http://schemas.openxmlformats.org/officeDocument/2006/relationships" xmlns:p="http://schemas.openxmlformats.org/presentationml/2006/main">
+  <p:cSld>
+    <p:spTree>
+      <p:nvGrpSpPr>
+        <p:cNvPr id="1" name=""/>
+        <p:cNvGrpSpPr/>
+        <p:nvPr/>
+      </p:nvGrpSpPr>
+      <p:grpSpPr>
+        <a:xfrm>
+          <a:off x="0" y="0"/>
+          <a:ext cx="0" cy="0"/>
+          <a:chOff x="0" y="0"/>
+          <a:chExt cx="0" cy="0"/>
+        </a:xfrm>
+      </p:grpSpPr>
+      <p:sp>
+        <p:nvSpPr>
+          <p:cNvPr id="2" name="Title 1"/>
+          <p:cNvSpPr>
+            <a:spLocks noGrp="1"/>
+          </p:cNvSpPr>
+          <p:nvPr>
+            <p:ph type="title"/>
+          </p:nvPr>
+        </p:nvSpPr>
+        <p:spPr/>
+        <p:txBody>
+          <a:bodyPr/>
+          <a:lstStyle/>
+          <a:p>
+            <a:r>
+              <a:rPr lang="en-US" dirty="0" smtClean="0"/>
+              <a:t>How do I get RoundhousE?</a:t>
+            </a:r>
+            <a:endParaRPr lang="en-US" dirty="0"/>
+          </a:p>
+        </p:txBody>
+      </p:sp>
+      <p:sp>
+        <p:nvSpPr>
+          <p:cNvPr id="3" name="Content Placeholder 2"/>
+          <p:cNvSpPr>
+            <a:spLocks noGrp="1"/>
+          </p:cNvSpPr>
+          <p:nvPr>
+            <p:ph idx="1"/>
+          </p:nvPr>
+        </p:nvSpPr>
+        <p:spPr/>
+        <p:txBody>
+          <a:bodyPr>
+            <a:normAutofit lnSpcReduction="10000"/>
+          </a:bodyPr>
+          <a:lstStyle/>
+          <a:p>
+            <a:r>
+              <a:rPr lang="en-US" dirty="0" smtClean="0"/>
+              <a:t>gem install roundhouse</a:t>
+            </a:r>
+          </a:p>
+          <a:p>
+            <a:r>
+              <a:rPr lang="en-US" dirty="0" smtClean="0"/>
+              <a:t>nu install roundhouse (bring to your project)</a:t>
+            </a:r>
+          </a:p>
+          <a:p>
+            <a:endParaRPr lang="en-US" dirty="0" smtClean="0"/>
+          </a:p>
+          <a:p>
+            <a:r>
+              <a:rPr lang="en-US" dirty="0" smtClean="0"/>
+              <a:t>Source (</a:t>
+            </a:r>
+            <a:r>
+              <a:rPr lang="en-US" dirty="0" err="1" smtClean="0"/>
+              <a:t>git</a:t>
+            </a:r>
+            <a:r>
+              <a:rPr lang="en-US" dirty="0" smtClean="0"/>
+              <a:t> / </a:t>
+            </a:r>
+            <a:r>
+              <a:rPr lang="en-US" dirty="0" err="1" smtClean="0"/>
+              <a:t>svn</a:t>
+            </a:r>
+            <a:r>
+              <a:rPr lang="en-US" dirty="0" smtClean="0"/>
+              <a:t>) – projectroundhouse.org</a:t>
+            </a:r>
+          </a:p>
+          <a:p>
+            <a:endParaRPr lang="en-US" dirty="0" smtClean="0"/>
+          </a:p>
+          <a:p>
+            <a:r>
+              <a:rPr lang="en-US" dirty="0" smtClean="0"/>
+              <a:t>Old fashioned download – projectroundhouse.org</a:t>
+            </a:r>
+          </a:p>
+          <a:p>
+            <a:endParaRPr lang="en-US" dirty="0" smtClean="0"/>
+          </a:p>
+        </p:txBody>
+      </p:sp>
+    </p:spTree>
+  </p:cSld>
+  <p:clrMapOvr>
+    <a:masterClrMapping/>
+  </p:clrMapOvr>
+  <p:timing>
+    <p:tnLst>
+      <p:par>
+        <p:cTn id="1" dur="indefinite" restart="never" nodeType="tmRoot"/>
+      </p:par>
+    </p:tnLst>
+  </p:timing>
+</p:sld>
+</file>
+
+<file path=ppt/slides/slide17.xml><?xml version="1.0" encoding="utf-8"?>
+<p:sld xmlns:a="http://schemas.openxmlformats.org/drawingml/2006/main" xmlns:r="http://schemas.openxmlformats.org/officeDocument/2006/relationships" xmlns:p="http://schemas.openxmlformats.org/presentationml/2006/main">
+  <p:cSld>
+    <p:spTree>
+      <p:nvGrpSpPr>
+        <p:cNvPr id="1" name=""/>
+        <p:cNvGrpSpPr/>
+        <p:nvPr/>
+      </p:nvGrpSpPr>
+      <p:grpSpPr>
+        <a:xfrm>
+          <a:off x="0" y="0"/>
+          <a:ext cx="0" cy="0"/>
+          <a:chOff x="0" y="0"/>
+          <a:chExt cx="0" cy="0"/>
+        </a:xfrm>
+      </p:grpSpPr>
+      <p:sp>
+        <p:nvSpPr>
+          <p:cNvPr id="2" name="Title 1"/>
+          <p:cNvSpPr>
+            <a:spLocks noGrp="1"/>
+          </p:cNvSpPr>
+          <p:nvPr>
+            <p:ph type="title"/>
+          </p:nvPr>
+        </p:nvSpPr>
+        <p:spPr/>
+        <p:txBody>
+          <a:bodyPr/>
+          <a:lstStyle/>
+          <a:p>
+            <a:r>
+              <a:rPr lang="en-US" dirty="0" smtClean="0"/>
+              <a:t>Asking questions</a:t>
+            </a:r>
+            <a:endParaRPr lang="en-US" dirty="0"/>
+          </a:p>
+        </p:txBody>
+      </p:sp>
+      <p:sp>
+        <p:nvSpPr>
+          <p:cNvPr id="3" name="Content Placeholder 2"/>
+          <p:cNvSpPr>
+            <a:spLocks noGrp="1"/>
+          </p:cNvSpPr>
+          <p:nvPr>
+            <p:ph idx="1"/>
+          </p:nvPr>
+        </p:nvSpPr>
+        <p:spPr/>
+        <p:txBody>
+          <a:bodyPr/>
+          <a:lstStyle/>
+          <a:p>
+            <a:r>
+              <a:rPr lang="en-US" dirty="0" smtClean="0"/>
+              <a:t>Chuck Norris Framework</a:t>
+            </a:r>
+          </a:p>
+          <a:p>
+            <a:pPr lvl="1"/>
+            <a:r>
+              <a:rPr lang="en-US" dirty="0" smtClean="0"/>
+              <a:t>http://groups.google.com/group/chucknorrisframework </a:t>
+            </a:r>
+          </a:p>
+          <a:p>
+            <a:r>
+              <a:rPr lang="en-US" dirty="0" smtClean="0"/>
+              <a:t>@</a:t>
+            </a:r>
+            <a:r>
+              <a:rPr lang="en-US" dirty="0" err="1" smtClean="0"/>
+              <a:t>Roundhouse_DB</a:t>
+            </a:r>
+            <a:endParaRPr lang="en-US" dirty="0" smtClean="0"/>
+          </a:p>
+          <a:p>
+            <a:r>
+              <a:rPr lang="en-US" dirty="0" smtClean="0"/>
+              <a:t>#</a:t>
+            </a:r>
+            <a:r>
+              <a:rPr lang="en-US" dirty="0" err="1" smtClean="0"/>
+              <a:t>roundhouse_db</a:t>
+            </a:r>
+            <a:endParaRPr lang="en-US" dirty="0" smtClean="0"/>
+          </a:p>
+          <a:p>
+            <a:r>
+              <a:rPr lang="en-US" dirty="0" smtClean="0"/>
+              <a:t>@ferventcoder</a:t>
+            </a:r>
+            <a:endParaRPr lang="en-US" dirty="0"/>
+          </a:p>
+        </p:txBody>
+      </p:sp>
+    </p:spTree>
+  </p:cSld>
+  <p:clrMapOvr>
+    <a:masterClrMapping/>
+  </p:clrMapOvr>
+  <p:timing>
+    <p:tnLst>
+      <p:par>
+        <p:cTn id="1" dur="indefinite" restart="never" nodeType="tmRoot"/>
+      </p:par>
+    </p:tnLst>
+  </p:timing>
+</p:sld>
+</file>
+
+<file path=ppt/slides/slide18.xml><?xml version="1.0" encoding="utf-8"?>
+<p:sld xmlns:a="http://schemas.openxmlformats.org/drawingml/2006/main" xmlns:r="http://schemas.openxmlformats.org/officeDocument/2006/relationships" xmlns:p="http://schemas.openxmlformats.org/presentationml/2006/main">
+  <p:cSld>
+    <p:spTree>
+      <p:nvGrpSpPr>
+        <p:cNvPr id="1" name=""/>
+        <p:cNvGrpSpPr/>
+        <p:nvPr/>
+      </p:nvGrpSpPr>
+      <p:grpSpPr>
+        <a:xfrm>
+          <a:off x="0" y="0"/>
+          <a:ext cx="0" cy="0"/>
+          <a:chOff x="0" y="0"/>
+          <a:chExt cx="0" cy="0"/>
+        </a:xfrm>
+      </p:grpSpPr>
+      <p:sp>
+        <p:nvSpPr>
+          <p:cNvPr id="2" name="Title 1"/>
+          <p:cNvSpPr>
+            <a:spLocks noGrp="1"/>
+          </p:cNvSpPr>
+          <p:nvPr>
+            <p:ph type="title"/>
+          </p:nvPr>
+        </p:nvSpPr>
+        <p:spPr/>
+        <p:txBody>
+          <a:bodyPr/>
+          <a:lstStyle/>
+          <a:p>
+            <a:r>
+              <a:rPr lang="en-US" dirty="0" smtClean="0"/>
+              <a:t>Questions?</a:t>
+            </a:r>
+            <a:endParaRPr lang="en-US" dirty="0"/>
+          </a:p>
+        </p:txBody>
+      </p:sp>
+      <p:sp>
+        <p:nvSpPr>
+          <p:cNvPr id="3" name="Content Placeholder 2"/>
+          <p:cNvSpPr>
+            <a:spLocks noGrp="1"/>
+          </p:cNvSpPr>
+          <p:nvPr>
+            <p:ph idx="1"/>
+          </p:nvPr>
+        </p:nvSpPr>
+        <p:spPr/>
+        <p:txBody>
+          <a:bodyPr/>
+          <a:lstStyle/>
+          <a:p>
+            <a:endParaRPr lang="en-US" dirty="0"/>
+          </a:p>
+        </p:txBody>
+      </p:sp>
+    </p:spTree>
+  </p:cSld>
+  <p:clrMapOvr>
+    <a:masterClrMapping/>
+  </p:clrMapOvr>
+  <p:timing>
+    <p:tnLst>
+      <p:par>
+        <p:cTn id="1" dur="indefinite" restart="never" nodeType="tmRoot"/>
+      </p:par>
+    </p:tnLst>
+  </p:timing>
+</p:sld>
+</file>
+
+<file path=ppt/slides/slide19.xml><?xml version="1.0" encoding="utf-8"?>
+<p:sld xmlns:a="http://schemas.openxmlformats.org/drawingml/2006/main" xmlns:r="http://schemas.openxmlformats.org/officeDocument/2006/relationships" xmlns:p="http://schemas.openxmlformats.org/presentationml/2006/main">
+  <p:cSld>
+    <p:spTree>
+      <p:nvGrpSpPr>
+        <p:cNvPr id="1" name=""/>
+        <p:cNvGrpSpPr/>
+        <p:nvPr/>
+      </p:nvGrpSpPr>
+      <p:grpSpPr>
+        <a:xfrm>
+          <a:off x="0" y="0"/>
+          <a:ext cx="0" cy="0"/>
+          <a:chOff x="0" y="0"/>
+          <a:chExt cx="0" cy="0"/>
+        </a:xfrm>
+      </p:grpSpPr>
       <p:pic>
         <p:nvPicPr>
           <p:cNvPr id="6" name="Picture 5" descr="UppercuTInvertWithLink.gif"/>
@@ -6547,882 +7194,75 @@
       </p:grpSpPr>
       <p:sp>
         <p:nvSpPr>
-          <p:cNvPr id="19" name="Rectangle 18"/>
-          <p:cNvSpPr/>
-          <p:nvPr/>
-        </p:nvSpPr>
-        <p:spPr>
-          <a:xfrm>
-            <a:off x="460428" y="76200"/>
-            <a:ext cx="8226371" cy="2286000"/>
-          </a:xfrm>
-          <a:prstGeom prst="rect">
-            <a:avLst/>
-          </a:prstGeom>
-          <a:noFill/>
-          <a:ln>
-            <a:solidFill>
-              <a:schemeClr val="bg2">
-                <a:lumMod val="25000"/>
-                <a:lumOff val="75000"/>
-              </a:schemeClr>
-            </a:solidFill>
-          </a:ln>
-        </p:spPr>
-        <p:style>
-          <a:lnRef idx="2">
-            <a:schemeClr val="accent1">
-              <a:shade val="50000"/>
-            </a:schemeClr>
-          </a:lnRef>
-          <a:fillRef idx="1">
-            <a:schemeClr val="accent1"/>
-          </a:fillRef>
-          <a:effectRef idx="0">
-            <a:schemeClr val="accent1"/>
-          </a:effectRef>
-          <a:fontRef idx="minor">
-            <a:schemeClr val="lt1"/>
-          </a:fontRef>
-        </p:style>
-        <p:txBody>
-          <a:bodyPr rtlCol="0" anchor="ctr"/>
+          <p:cNvPr id="2" name="Title 1"/>
+          <p:cNvSpPr>
+            <a:spLocks noGrp="1"/>
+          </p:cNvSpPr>
+          <p:nvPr>
+            <p:ph type="title"/>
+          </p:nvPr>
+        </p:nvSpPr>
+        <p:spPr/>
+        <p:txBody>
+          <a:bodyPr/>
           <a:lstStyle/>
           <a:p>
-            <a:pPr algn="ctr"/>
-            <a:endParaRPr lang="en-US"/>
-          </a:p>
-        </p:txBody>
-      </p:sp>
-      <p:sp>
-        <p:nvSpPr>
-          <p:cNvPr id="20" name="Rectangle 19"/>
-          <p:cNvSpPr/>
-          <p:nvPr/>
-        </p:nvSpPr>
-        <p:spPr>
-          <a:xfrm>
-            <a:off x="5181600" y="4289502"/>
-            <a:ext cx="3505200" cy="1443335"/>
-          </a:xfrm>
-          <a:prstGeom prst="rect">
-            <a:avLst/>
-          </a:prstGeom>
-          <a:noFill/>
-          <a:ln>
-            <a:solidFill>
-              <a:schemeClr val="accent2">
-                <a:lumMod val="50000"/>
-              </a:schemeClr>
-            </a:solidFill>
-          </a:ln>
-        </p:spPr>
-        <p:style>
-          <a:lnRef idx="2">
-            <a:schemeClr val="accent1">
-              <a:shade val="50000"/>
-            </a:schemeClr>
-          </a:lnRef>
-          <a:fillRef idx="1">
-            <a:schemeClr val="accent1"/>
-          </a:fillRef>
-          <a:effectRef idx="0">
-            <a:schemeClr val="accent1"/>
-          </a:effectRef>
-          <a:fontRef idx="minor">
-            <a:schemeClr val="lt1"/>
-          </a:fontRef>
-        </p:style>
-        <p:txBody>
-          <a:bodyPr rtlCol="0" anchor="ctr"/>
+            <a:r>
+              <a:rPr lang="en-US" dirty="0" smtClean="0"/>
+              <a:t>Before We Start</a:t>
+            </a:r>
+            <a:endParaRPr lang="en-US" dirty="0"/>
+          </a:p>
+        </p:txBody>
+      </p:sp>
+      <p:sp>
+        <p:nvSpPr>
+          <p:cNvPr id="3" name="Content Placeholder 2"/>
+          <p:cNvSpPr>
+            <a:spLocks noGrp="1"/>
+          </p:cNvSpPr>
+          <p:nvPr>
+            <p:ph idx="1"/>
+          </p:nvPr>
+        </p:nvSpPr>
+        <p:spPr/>
+        <p:txBody>
+          <a:bodyPr/>
           <a:lstStyle/>
           <a:p>
-            <a:pPr algn="ctr"/>
-            <a:endParaRPr lang="en-US"/>
-          </a:p>
-        </p:txBody>
-      </p:sp>
-      <p:sp>
-        <p:nvSpPr>
-          <p:cNvPr id="21" name="Rectangle 20"/>
-          <p:cNvSpPr/>
-          <p:nvPr/>
-        </p:nvSpPr>
-        <p:spPr>
-          <a:xfrm>
-            <a:off x="460429" y="4289502"/>
-            <a:ext cx="4644971" cy="1443335"/>
-          </a:xfrm>
-          <a:prstGeom prst="rect">
-            <a:avLst/>
-          </a:prstGeom>
-          <a:noFill/>
-          <a:ln>
-            <a:solidFill>
-              <a:schemeClr val="tx1">
-                <a:lumMod val="65000"/>
-              </a:schemeClr>
-            </a:solidFill>
-          </a:ln>
-        </p:spPr>
-        <p:style>
-          <a:lnRef idx="2">
-            <a:schemeClr val="accent1">
-              <a:shade val="50000"/>
-            </a:schemeClr>
-          </a:lnRef>
-          <a:fillRef idx="1">
-            <a:schemeClr val="accent1"/>
-          </a:fillRef>
-          <a:effectRef idx="0">
-            <a:schemeClr val="accent1"/>
-          </a:effectRef>
-          <a:fontRef idx="minor">
-            <a:schemeClr val="lt1"/>
-          </a:fontRef>
-        </p:style>
-        <p:txBody>
-          <a:bodyPr rtlCol="0" anchor="ctr"/>
-          <a:lstStyle/>
-          <a:p>
-            <a:pPr algn="ctr"/>
-            <a:endParaRPr lang="en-US"/>
-          </a:p>
-        </p:txBody>
-      </p:sp>
-      <p:sp>
-        <p:nvSpPr>
-          <p:cNvPr id="22" name="Rectangle 21"/>
-          <p:cNvSpPr/>
-          <p:nvPr/>
-        </p:nvSpPr>
-        <p:spPr>
-          <a:xfrm>
-            <a:off x="460428" y="2438400"/>
-            <a:ext cx="8226371" cy="1795033"/>
-          </a:xfrm>
-          <a:prstGeom prst="rect">
-            <a:avLst/>
-          </a:prstGeom>
-          <a:noFill/>
-          <a:ln>
-            <a:solidFill>
-              <a:schemeClr val="tx2">
-                <a:lumMod val="40000"/>
-                <a:lumOff val="60000"/>
-              </a:schemeClr>
-            </a:solidFill>
-          </a:ln>
-        </p:spPr>
-        <p:style>
-          <a:lnRef idx="2">
-            <a:schemeClr val="accent1">
-              <a:shade val="50000"/>
-            </a:schemeClr>
-          </a:lnRef>
-          <a:fillRef idx="1">
-            <a:schemeClr val="accent1"/>
-          </a:fillRef>
-          <a:effectRef idx="0">
-            <a:schemeClr val="accent1"/>
-          </a:effectRef>
-          <a:fontRef idx="minor">
-            <a:schemeClr val="lt1"/>
-          </a:fontRef>
-        </p:style>
-        <p:txBody>
-          <a:bodyPr rtlCol="0" anchor="ctr"/>
-          <a:lstStyle/>
-          <a:p>
-            <a:pPr algn="ctr"/>
-            <a:endParaRPr lang="en-US"/>
-          </a:p>
-        </p:txBody>
-      </p:sp>
-      <p:sp>
-        <p:nvSpPr>
-          <p:cNvPr id="23" name="Rectangle 22"/>
-          <p:cNvSpPr/>
-          <p:nvPr/>
-        </p:nvSpPr>
-        <p:spPr>
-          <a:xfrm>
-            <a:off x="350328" y="5934670"/>
-            <a:ext cx="8476808" cy="923330"/>
-          </a:xfrm>
-          <a:prstGeom prst="rect">
-            <a:avLst/>
-          </a:prstGeom>
-          <a:noFill/>
-        </p:spPr>
-        <p:txBody>
-          <a:bodyPr wrap="none" lIns="91440" tIns="45720" rIns="91440" bIns="45720">
-            <a:spAutoFit/>
-            <a:scene3d>
-              <a:camera prst="orthographicFront"/>
-              <a:lightRig rig="brightRoom" dir="t"/>
-            </a:scene3d>
-            <a:sp3d contourW="6350" prstMaterial="plastic">
-              <a:bevelT w="20320" h="20320" prst="angle"/>
-              <a:contourClr>
-                <a:schemeClr val="accent1">
-                  <a:tint val="100000"/>
-                  <a:shade val="100000"/>
-                  <a:hueMod val="100000"/>
-                  <a:satMod val="100000"/>
-                </a:schemeClr>
-              </a:contourClr>
-            </a:sp3d>
-          </a:bodyPr>
-          <a:lstStyle/>
-          <a:p>
-            <a:pPr algn="ctr"/>
-            <a:r>
-              <a:rPr lang="en-US" sz="5400" b="1" cap="all" dirty="0" smtClean="0">
-                <a:ln/>
-                <a:solidFill>
-                  <a:schemeClr val="tx2">
-                    <a:lumMod val="60000"/>
-                    <a:lumOff val="40000"/>
-                  </a:schemeClr>
-                </a:solidFill>
-                <a:effectLst>
-                  <a:outerShdw blurRad="19685" dist="12700" dir="5400000" algn="tl" rotWithShape="0">
-                    <a:schemeClr val="accent1">
-                      <a:satMod val="130000"/>
-                      <a:alpha val="60000"/>
-                    </a:schemeClr>
-                  </a:outerShdw>
-                  <a:reflection blurRad="10000" stA="55000" endPos="48000" dist="500" dir="5400000" sy="-100000" algn="bl" rotWithShape="0"/>
-                </a:effectLst>
-              </a:rPr>
-              <a:t>Thanks to our sponsors!</a:t>
-            </a:r>
-            <a:endParaRPr lang="en-US" sz="5400" b="1" cap="all" dirty="0">
-              <a:ln/>
-              <a:solidFill>
-                <a:schemeClr val="tx2">
-                  <a:lumMod val="60000"/>
-                  <a:lumOff val="40000"/>
-                </a:schemeClr>
-              </a:solidFill>
-              <a:effectLst>
-                <a:outerShdw blurRad="19685" dist="12700" dir="5400000" algn="tl" rotWithShape="0">
-                  <a:schemeClr val="accent1">
-                    <a:satMod val="130000"/>
-                    <a:alpha val="60000"/>
-                  </a:schemeClr>
-                </a:outerShdw>
-                <a:reflection blurRad="10000" stA="55000" endPos="48000" dist="500" dir="5400000" sy="-100000" algn="bl" rotWithShape="0"/>
-              </a:effectLst>
-            </a:endParaRPr>
-          </a:p>
-        </p:txBody>
-      </p:sp>
-      <p:pic>
-        <p:nvPicPr>
-          <p:cNvPr id="24" name="Picture 2" descr="E:\Pictures\KCDC\Sponsors\TypeMock\Typemock_logo_web.jpg"/>
-          <p:cNvPicPr>
-            <a:picLocks noChangeAspect="1" noChangeArrowheads="1"/>
-          </p:cNvPicPr>
-          <p:nvPr/>
-        </p:nvPicPr>
-        <p:blipFill>
-          <a:blip r:embed="rId2" cstate="print">
-            <a:extLst>
-              <a:ext uri="{28A0092B-C50C-407E-A947-70E740481C1C}">
-                <a14:useLocalDpi xmlns="" xmlns:a14="http://schemas.microsoft.com/office/drawing/2010/main" val="0"/>
-              </a:ext>
-            </a:extLst>
-          </a:blip>
-          <a:srcRect/>
-          <a:stretch>
-            <a:fillRect/>
-          </a:stretch>
-        </p:blipFill>
-        <p:spPr bwMode="auto">
-          <a:xfrm>
-            <a:off x="5410201" y="4700983"/>
-            <a:ext cx="1600199" cy="960119"/>
-          </a:xfrm>
-          <a:prstGeom prst="rect">
-            <a:avLst/>
-          </a:prstGeom>
-          <a:noFill/>
-          <a:extLst>
-            <a:ext uri="{909E8E84-426E-40DD-AFC4-6F175D3DCCD1}">
-              <a14:hiddenFill xmlns="" xmlns:a14="http://schemas.microsoft.com/office/drawing/2010/main">
-                <a:solidFill>
-                  <a:srgbClr val="FFFFFF"/>
-                </a:solidFill>
-              </a14:hiddenFill>
-            </a:ext>
-          </a:extLst>
-        </p:spPr>
-      </p:pic>
-      <p:pic>
-        <p:nvPicPr>
-          <p:cNvPr id="25" name="Picture 24"/>
-          <p:cNvPicPr>
-            <a:picLocks noChangeAspect="1"/>
-          </p:cNvPicPr>
-          <p:nvPr/>
-        </p:nvPicPr>
-        <p:blipFill>
-          <a:blip r:embed="rId3" cstate="print">
-            <a:extLst>
-              <a:ext uri="{28A0092B-C50C-407E-A947-70E740481C1C}">
-                <a14:useLocalDpi xmlns="" xmlns:a14="http://schemas.microsoft.com/office/drawing/2010/main" val="0"/>
-              </a:ext>
-            </a:extLst>
-          </a:blip>
-          <a:stretch>
-            <a:fillRect/>
-          </a:stretch>
-        </p:blipFill>
-        <p:spPr>
-          <a:xfrm>
-            <a:off x="1752600" y="3381617"/>
-            <a:ext cx="2081227" cy="831685"/>
-          </a:xfrm>
-          <a:prstGeom prst="rect">
-            <a:avLst/>
-          </a:prstGeom>
-        </p:spPr>
-      </p:pic>
-      <p:pic>
-        <p:nvPicPr>
-          <p:cNvPr id="26" name="Picture 25"/>
-          <p:cNvPicPr>
-            <a:picLocks noChangeAspect="1"/>
-          </p:cNvPicPr>
-          <p:nvPr/>
-        </p:nvPicPr>
-        <p:blipFill>
-          <a:blip r:embed="rId4" cstate="print">
-            <a:extLst>
-              <a:ext uri="{28A0092B-C50C-407E-A947-70E740481C1C}">
-                <a14:useLocalDpi xmlns="" xmlns:a14="http://schemas.microsoft.com/office/drawing/2010/main" val="0"/>
-              </a:ext>
-            </a:extLst>
-          </a:blip>
-          <a:stretch>
-            <a:fillRect/>
-          </a:stretch>
-        </p:blipFill>
-        <p:spPr>
-          <a:xfrm>
-            <a:off x="4800600" y="3406556"/>
-            <a:ext cx="1968500" cy="793738"/>
-          </a:xfrm>
-          <a:prstGeom prst="rect">
-            <a:avLst/>
-          </a:prstGeom>
-        </p:spPr>
-      </p:pic>
-      <p:sp>
-        <p:nvSpPr>
-          <p:cNvPr id="27" name="Rectangle 26"/>
-          <p:cNvSpPr/>
-          <p:nvPr/>
-        </p:nvSpPr>
-        <p:spPr>
-          <a:xfrm>
-            <a:off x="640769" y="2438400"/>
-            <a:ext cx="1641795" cy="830997"/>
-          </a:xfrm>
-          <a:prstGeom prst="rect">
-            <a:avLst/>
-          </a:prstGeom>
-          <a:noFill/>
-        </p:spPr>
-        <p:txBody>
-          <a:bodyPr wrap="none" lIns="91440" tIns="45720" rIns="91440" bIns="45720">
-            <a:spAutoFit/>
-            <a:scene3d>
-              <a:camera prst="orthographicFront"/>
-              <a:lightRig rig="brightRoom" dir="t"/>
-            </a:scene3d>
-            <a:sp3d contourW="6350" prstMaterial="plastic">
-              <a:bevelT w="20320" h="20320" prst="angle"/>
-              <a:contourClr>
-                <a:schemeClr val="accent1">
-                  <a:tint val="100000"/>
-                  <a:shade val="100000"/>
-                  <a:hueMod val="100000"/>
-                  <a:satMod val="100000"/>
-                </a:schemeClr>
-              </a:contourClr>
-            </a:sp3d>
-          </a:bodyPr>
-          <a:lstStyle/>
-          <a:p>
-            <a:pPr algn="ctr"/>
-            <a:r>
-              <a:rPr lang="en-US" sz="4800" b="1" cap="all" dirty="0" smtClean="0">
-                <a:ln/>
-                <a:solidFill>
-                  <a:schemeClr val="tx2">
-                    <a:lumMod val="60000"/>
-                    <a:lumOff val="40000"/>
-                  </a:schemeClr>
-                </a:solidFill>
-                <a:effectLst>
-                  <a:outerShdw blurRad="19685" dist="12700" dir="5400000" algn="tl" rotWithShape="0">
-                    <a:schemeClr val="accent1">
-                      <a:satMod val="130000"/>
-                      <a:alpha val="60000"/>
-                    </a:schemeClr>
-                  </a:outerShdw>
-                  <a:reflection blurRad="10000" stA="55000" endPos="48000" dist="500" dir="5400000" sy="-100000" algn="bl" rotWithShape="0"/>
-                </a:effectLst>
-              </a:rPr>
-              <a:t>GOLD</a:t>
-            </a:r>
-            <a:endParaRPr lang="en-US" sz="4800" b="1" cap="all" dirty="0">
-              <a:ln/>
-              <a:solidFill>
-                <a:schemeClr val="tx2">
-                  <a:lumMod val="60000"/>
-                  <a:lumOff val="40000"/>
-                </a:schemeClr>
-              </a:solidFill>
-              <a:effectLst>
-                <a:outerShdw blurRad="19685" dist="12700" dir="5400000" algn="tl" rotWithShape="0">
-                  <a:schemeClr val="accent1">
-                    <a:satMod val="130000"/>
-                    <a:alpha val="60000"/>
-                  </a:schemeClr>
-                </a:outerShdw>
-                <a:reflection blurRad="10000" stA="55000" endPos="48000" dist="500" dir="5400000" sy="-100000" algn="bl" rotWithShape="0"/>
-              </a:effectLst>
-            </a:endParaRPr>
-          </a:p>
-        </p:txBody>
-      </p:sp>
-      <p:sp>
-        <p:nvSpPr>
-          <p:cNvPr id="28" name="Rectangle 27"/>
-          <p:cNvSpPr/>
-          <p:nvPr/>
-        </p:nvSpPr>
-        <p:spPr>
-          <a:xfrm>
-            <a:off x="610631" y="4763951"/>
-            <a:ext cx="1671933" cy="707886"/>
-          </a:xfrm>
-          <a:prstGeom prst="rect">
-            <a:avLst/>
-          </a:prstGeom>
-          <a:noFill/>
-        </p:spPr>
-        <p:txBody>
-          <a:bodyPr wrap="none" lIns="91440" tIns="45720" rIns="91440" bIns="45720">
-            <a:spAutoFit/>
-            <a:scene3d>
-              <a:camera prst="orthographicFront"/>
-              <a:lightRig rig="brightRoom" dir="t"/>
-            </a:scene3d>
-            <a:sp3d contourW="6350" prstMaterial="plastic">
-              <a:bevelT w="20320" h="20320" prst="angle"/>
-              <a:contourClr>
-                <a:schemeClr val="accent1">
-                  <a:tint val="100000"/>
-                  <a:shade val="100000"/>
-                  <a:hueMod val="100000"/>
-                  <a:satMod val="100000"/>
-                </a:schemeClr>
-              </a:contourClr>
-            </a:sp3d>
-          </a:bodyPr>
-          <a:lstStyle/>
-          <a:p>
-            <a:pPr algn="ctr"/>
-            <a:r>
-              <a:rPr lang="en-US" sz="4000" b="1" cap="all" dirty="0" smtClean="0">
-                <a:ln/>
-                <a:solidFill>
-                  <a:schemeClr val="bg2">
-                    <a:lumMod val="50000"/>
-                    <a:lumOff val="50000"/>
-                  </a:schemeClr>
-                </a:solidFill>
-                <a:effectLst>
-                  <a:outerShdw blurRad="19685" dist="12700" dir="5400000" algn="tl" rotWithShape="0">
-                    <a:schemeClr val="accent1">
-                      <a:satMod val="130000"/>
-                      <a:alpha val="60000"/>
-                    </a:schemeClr>
-                  </a:outerShdw>
-                  <a:reflection blurRad="10000" stA="55000" endPos="48000" dist="500" dir="5400000" sy="-100000" algn="bl" rotWithShape="0"/>
-                </a:effectLst>
-              </a:rPr>
-              <a:t>silver</a:t>
-            </a:r>
-            <a:endParaRPr lang="en-US" sz="4000" b="1" cap="all" dirty="0">
-              <a:ln/>
-              <a:solidFill>
-                <a:schemeClr val="bg2">
-                  <a:lumMod val="50000"/>
-                  <a:lumOff val="50000"/>
-                </a:schemeClr>
-              </a:solidFill>
-              <a:effectLst>
-                <a:outerShdw blurRad="19685" dist="12700" dir="5400000" algn="tl" rotWithShape="0">
-                  <a:schemeClr val="accent1">
-                    <a:satMod val="130000"/>
-                    <a:alpha val="60000"/>
-                  </a:schemeClr>
-                </a:outerShdw>
-                <a:reflection blurRad="10000" stA="55000" endPos="48000" dist="500" dir="5400000" sy="-100000" algn="bl" rotWithShape="0"/>
-              </a:effectLst>
-            </a:endParaRPr>
-          </a:p>
-        </p:txBody>
-      </p:sp>
-      <p:pic>
-        <p:nvPicPr>
-          <p:cNvPr id="29" name="Picture 4" descr="E:\Pictures\KCDC\Sponsors\advantegetech.jpg"/>
-          <p:cNvPicPr>
-            <a:picLocks noChangeAspect="1" noChangeArrowheads="1"/>
-          </p:cNvPicPr>
-          <p:nvPr/>
-        </p:nvPicPr>
-        <p:blipFill>
-          <a:blip r:embed="rId5" cstate="print">
-            <a:extLst>
-              <a:ext uri="{28A0092B-C50C-407E-A947-70E740481C1C}">
-                <a14:useLocalDpi xmlns="" xmlns:a14="http://schemas.microsoft.com/office/drawing/2010/main" val="0"/>
-              </a:ext>
-            </a:extLst>
-          </a:blip>
-          <a:srcRect/>
-          <a:stretch>
-            <a:fillRect/>
-          </a:stretch>
-        </p:blipFill>
-        <p:spPr bwMode="auto">
-          <a:xfrm>
-            <a:off x="2667000" y="4756600"/>
-            <a:ext cx="1968377" cy="676628"/>
-          </a:xfrm>
-          <a:prstGeom prst="rect">
-            <a:avLst/>
-          </a:prstGeom>
-          <a:noFill/>
-          <a:extLst>
-            <a:ext uri="{909E8E84-426E-40DD-AFC4-6F175D3DCCD1}">
-              <a14:hiddenFill xmlns="" xmlns:a14="http://schemas.microsoft.com/office/drawing/2010/main">
-                <a:solidFill>
-                  <a:srgbClr val="FFFFFF"/>
-                </a:solidFill>
-              </a14:hiddenFill>
-            </a:ext>
-          </a:extLst>
-        </p:spPr>
-      </p:pic>
-      <p:sp>
-        <p:nvSpPr>
-          <p:cNvPr id="30" name="Rectangle 29"/>
-          <p:cNvSpPr/>
-          <p:nvPr/>
-        </p:nvSpPr>
-        <p:spPr>
-          <a:xfrm>
-            <a:off x="5181600" y="4191000"/>
-            <a:ext cx="3175000" cy="461665"/>
-          </a:xfrm>
-          <a:prstGeom prst="rect">
-            <a:avLst/>
-          </a:prstGeom>
-        </p:spPr>
-        <p:txBody>
-          <a:bodyPr wrap="square">
-            <a:spAutoFit/>
-          </a:bodyPr>
-          <a:lstStyle/>
-          <a:p>
-            <a:pPr lvl="0"/>
-            <a:r>
-              <a:rPr lang="en-US" sz="2400" b="1" cap="all" dirty="0">
-                <a:ln/>
-                <a:solidFill>
-                  <a:srgbClr val="80716A">
-                    <a:lumMod val="60000"/>
-                    <a:lumOff val="40000"/>
-                  </a:srgbClr>
-                </a:solidFill>
-                <a:effectLst>
-                  <a:outerShdw blurRad="19685" dist="12700" dir="5400000" algn="tl" rotWithShape="0">
-                    <a:srgbClr val="838D9B">
-                      <a:satMod val="130000"/>
-                      <a:alpha val="60000"/>
-                    </a:srgbClr>
-                  </a:outerShdw>
-                  <a:reflection blurRad="10000" stA="55000" endPos="48000" dist="500" dir="5400000" sy="-100000" algn="bl" rotWithShape="0"/>
-                </a:effectLst>
-              </a:rPr>
-              <a:t>PRIZE SPONSORS</a:t>
-            </a:r>
-          </a:p>
-        </p:txBody>
-      </p:sp>
-      <p:pic>
-        <p:nvPicPr>
-          <p:cNvPr id="31" name="Picture 5" descr="E:\Pictures\KCDC\Sponsors\who_is_informit.png"/>
-          <p:cNvPicPr>
-            <a:picLocks noChangeAspect="1" noChangeArrowheads="1"/>
-          </p:cNvPicPr>
-          <p:nvPr/>
-        </p:nvPicPr>
-        <p:blipFill>
-          <a:blip r:embed="rId6" cstate="print">
-            <a:extLst>
-              <a:ext uri="{28A0092B-C50C-407E-A947-70E740481C1C}">
-                <a14:useLocalDpi xmlns="" xmlns:a14="http://schemas.microsoft.com/office/drawing/2010/main" val="0"/>
-              </a:ext>
-            </a:extLst>
-          </a:blip>
-          <a:srcRect/>
-          <a:stretch>
-            <a:fillRect/>
-          </a:stretch>
-        </p:blipFill>
-        <p:spPr bwMode="auto">
-          <a:xfrm>
-            <a:off x="7329366" y="4622595"/>
-            <a:ext cx="1247219" cy="1042996"/>
-          </a:xfrm>
-          <a:prstGeom prst="rect">
-            <a:avLst/>
-          </a:prstGeom>
-          <a:noFill/>
-          <a:extLst>
-            <a:ext uri="{909E8E84-426E-40DD-AFC4-6F175D3DCCD1}">
-              <a14:hiddenFill xmlns="" xmlns:a14="http://schemas.microsoft.com/office/drawing/2010/main">
-                <a:solidFill>
-                  <a:srgbClr val="FFFFFF"/>
-                </a:solidFill>
-              </a14:hiddenFill>
-            </a:ext>
-          </a:extLst>
-        </p:spPr>
-      </p:pic>
-      <p:sp>
-        <p:nvSpPr>
-          <p:cNvPr id="32" name="Rectangle 31"/>
-          <p:cNvSpPr/>
-          <p:nvPr/>
-        </p:nvSpPr>
-        <p:spPr>
-          <a:xfrm>
-            <a:off x="460429" y="76200"/>
-            <a:ext cx="3076548" cy="923330"/>
-          </a:xfrm>
-          <a:prstGeom prst="rect">
-            <a:avLst/>
-          </a:prstGeom>
-          <a:noFill/>
-        </p:spPr>
-        <p:txBody>
-          <a:bodyPr wrap="none" lIns="91440" tIns="45720" rIns="91440" bIns="45720">
-            <a:spAutoFit/>
-            <a:scene3d>
-              <a:camera prst="orthographicFront"/>
-              <a:lightRig rig="brightRoom" dir="t"/>
-            </a:scene3d>
-            <a:sp3d contourW="6350" prstMaterial="plastic">
-              <a:bevelT w="20320" h="20320" prst="angle"/>
-              <a:contourClr>
-                <a:schemeClr val="accent1">
-                  <a:tint val="100000"/>
-                  <a:shade val="100000"/>
-                  <a:hueMod val="100000"/>
-                  <a:satMod val="100000"/>
-                </a:schemeClr>
-              </a:contourClr>
-            </a:sp3d>
-          </a:bodyPr>
-          <a:lstStyle/>
-          <a:p>
-            <a:pPr algn="ctr"/>
-            <a:r>
-              <a:rPr lang="en-US" sz="5400" b="1" cap="all" spc="0" dirty="0" smtClean="0">
-                <a:ln/>
-                <a:solidFill>
-                  <a:schemeClr val="accent6">
-                    <a:lumMod val="20000"/>
-                    <a:lumOff val="80000"/>
-                  </a:schemeClr>
-                </a:solidFill>
-                <a:effectLst>
-                  <a:outerShdw blurRad="19685" dist="12700" dir="5400000" algn="tl" rotWithShape="0">
-                    <a:schemeClr val="accent1">
-                      <a:satMod val="130000"/>
-                      <a:alpha val="60000"/>
-                    </a:schemeClr>
-                  </a:outerShdw>
-                  <a:reflection blurRad="10000" stA="55000" endPos="48000" dist="500" dir="5400000" sy="-100000" algn="bl" rotWithShape="0"/>
-                </a:effectLst>
-              </a:rPr>
-              <a:t>platinum</a:t>
-            </a:r>
-            <a:endParaRPr lang="en-US" sz="5400" b="1" cap="all" spc="0" dirty="0">
-              <a:ln/>
-              <a:solidFill>
-                <a:schemeClr val="accent6">
-                  <a:lumMod val="20000"/>
-                  <a:lumOff val="80000"/>
-                </a:schemeClr>
-              </a:solidFill>
-              <a:effectLst>
-                <a:outerShdw blurRad="19685" dist="12700" dir="5400000" algn="tl" rotWithShape="0">
-                  <a:schemeClr val="accent1">
-                    <a:satMod val="130000"/>
-                    <a:alpha val="60000"/>
-                  </a:schemeClr>
-                </a:outerShdw>
-                <a:reflection blurRad="10000" stA="55000" endPos="48000" dist="500" dir="5400000" sy="-100000" algn="bl" rotWithShape="0"/>
-              </a:effectLst>
-            </a:endParaRPr>
-          </a:p>
-        </p:txBody>
-      </p:sp>
-      <p:pic>
-        <p:nvPicPr>
-          <p:cNvPr id="33" name="Picture 32"/>
-          <p:cNvPicPr>
-            <a:picLocks noChangeAspect="1"/>
-          </p:cNvPicPr>
-          <p:nvPr/>
-        </p:nvPicPr>
-        <p:blipFill>
-          <a:blip r:embed="rId7" cstate="print">
-            <a:extLst>
-              <a:ext uri="{28A0092B-C50C-407E-A947-70E740481C1C}">
-                <a14:useLocalDpi xmlns="" xmlns:a14="http://schemas.microsoft.com/office/drawing/2010/main" val="0"/>
-              </a:ext>
-            </a:extLst>
-          </a:blip>
-          <a:stretch>
-            <a:fillRect/>
-          </a:stretch>
-        </p:blipFill>
-        <p:spPr>
-          <a:xfrm>
-            <a:off x="3624430" y="252277"/>
-            <a:ext cx="2067214" cy="1933845"/>
-          </a:xfrm>
-          <a:prstGeom prst="rect">
-            <a:avLst/>
-          </a:prstGeom>
-        </p:spPr>
-      </p:pic>
-      <p:pic>
-        <p:nvPicPr>
-          <p:cNvPr id="34" name="Picture 33"/>
-          <p:cNvPicPr>
-            <a:picLocks noChangeAspect="1"/>
-          </p:cNvPicPr>
-          <p:nvPr/>
-        </p:nvPicPr>
-        <p:blipFill>
-          <a:blip r:embed="rId8" cstate="print">
-            <a:extLst>
-              <a:ext uri="{28A0092B-C50C-407E-A947-70E740481C1C}">
-                <a14:useLocalDpi xmlns="" xmlns:a14="http://schemas.microsoft.com/office/drawing/2010/main" val="0"/>
-              </a:ext>
-            </a:extLst>
-          </a:blip>
-          <a:stretch>
-            <a:fillRect/>
-          </a:stretch>
-        </p:blipFill>
-        <p:spPr>
-          <a:xfrm>
-            <a:off x="5887075" y="707206"/>
-            <a:ext cx="2653710" cy="1023985"/>
-          </a:xfrm>
-          <a:prstGeom prst="rect">
-            <a:avLst/>
-          </a:prstGeom>
-        </p:spPr>
-      </p:pic>
-      <p:pic>
-        <p:nvPicPr>
-          <p:cNvPr id="35" name="Picture 34"/>
-          <p:cNvPicPr/>
-          <p:nvPr/>
-        </p:nvPicPr>
-        <p:blipFill>
-          <a:blip r:embed="rId9" cstate="print">
-            <a:extLst>
-              <a:ext uri="{28A0092B-C50C-407E-A947-70E740481C1C}">
-                <a14:useLocalDpi xmlns="" xmlns:a14="http://schemas.microsoft.com/office/drawing/2010/main" val="0"/>
-              </a:ext>
-            </a:extLst>
-          </a:blip>
-          <a:stretch>
-            <a:fillRect/>
-          </a:stretch>
-        </p:blipFill>
-        <p:spPr>
-          <a:xfrm>
-            <a:off x="2857500" y="2497176"/>
-            <a:ext cx="2476500" cy="790575"/>
-          </a:xfrm>
-          <a:prstGeom prst="rect">
-            <a:avLst/>
-          </a:prstGeom>
-        </p:spPr>
-      </p:pic>
-      <p:pic>
-        <p:nvPicPr>
-          <p:cNvPr id="36" name="Picture 3" descr="E:\Pictures\KCDC\Sponsors\telerikLogo-web-225x90px.jpg"/>
-          <p:cNvPicPr>
-            <a:picLocks noChangeAspect="1" noChangeArrowheads="1"/>
-          </p:cNvPicPr>
-          <p:nvPr/>
-        </p:nvPicPr>
-        <p:blipFill>
-          <a:blip r:embed="rId10" cstate="print">
-            <a:extLst>
-              <a:ext uri="{28A0092B-C50C-407E-A947-70E740481C1C}">
-                <a14:useLocalDpi xmlns="" xmlns:a14="http://schemas.microsoft.com/office/drawing/2010/main" val="0"/>
-              </a:ext>
-            </a:extLst>
-          </a:blip>
-          <a:srcRect/>
-          <a:stretch>
-            <a:fillRect/>
-          </a:stretch>
-        </p:blipFill>
-        <p:spPr bwMode="auto">
-          <a:xfrm>
-            <a:off x="6210300" y="2494156"/>
-            <a:ext cx="2330485" cy="860108"/>
-          </a:xfrm>
-          <a:prstGeom prst="rect">
-            <a:avLst/>
-          </a:prstGeom>
-          <a:noFill/>
-          <a:extLst>
-            <a:ext uri="{909E8E84-426E-40DD-AFC4-6F175D3DCCD1}">
-              <a14:hiddenFill xmlns="" xmlns:a14="http://schemas.microsoft.com/office/drawing/2010/main">
-                <a:solidFill>
-                  <a:srgbClr val="FFFFFF"/>
-                </a:solidFill>
-              </a14:hiddenFill>
-            </a:ext>
-          </a:extLst>
-        </p:spPr>
-      </p:pic>
+            <a:r>
+              <a:rPr lang="en-US" dirty="0" smtClean="0"/>
+              <a:t>Questions – </a:t>
+            </a:r>
+            <a:r>
+              <a:rPr lang="en-US" dirty="0" smtClean="0"/>
+              <a:t>ask, but </a:t>
+            </a:r>
+            <a:r>
+              <a:rPr lang="en-US" dirty="0" smtClean="0"/>
+              <a:t>we may have to </a:t>
+            </a:r>
+            <a:r>
+              <a:rPr lang="en-US" dirty="0" smtClean="0"/>
+              <a:t>hold </a:t>
+            </a:r>
+            <a:r>
+              <a:rPr lang="en-US" dirty="0" smtClean="0"/>
+              <a:t>until end</a:t>
+            </a:r>
+          </a:p>
+          <a:p>
+            <a:r>
+              <a:rPr lang="en-US" dirty="0" smtClean="0"/>
+              <a:t>http://projectroundhouse.org</a:t>
+            </a:r>
+          </a:p>
+          <a:p>
+            <a:endParaRPr lang="en-US" dirty="0"/>
+          </a:p>
+        </p:txBody>
+      </p:sp>
     </p:spTree>
-    <p:extLst>
-      <p:ext uri="{BB962C8B-B14F-4D97-AF65-F5344CB8AC3E}">
-        <p14:creationId xmlns="" xmlns:p14="http://schemas.microsoft.com/office/powerpoint/2010/main" val="4248424993"/>
-      </p:ext>
-    </p:extLst>
   </p:cSld>
   <p:clrMapOvr>
     <a:masterClrMapping/>
@@ -7471,7 +7311,7 @@
           <a:p>
             <a:r>
               <a:rPr lang="en-US" dirty="0" smtClean="0"/>
-              <a:t>What will we accomplish?</a:t>
+              <a:t>Past/Present</a:t>
             </a:r>
             <a:endParaRPr lang="en-US" dirty="0"/>
           </a:p>
@@ -7494,19 +7334,19 @@
           <a:p>
             <a:r>
               <a:rPr lang="en-US" dirty="0" smtClean="0"/>
-              <a:t>All Database Scripts should be under source control</a:t>
+              <a:t>Worked w/ a database of some sort</a:t>
             </a:r>
           </a:p>
           <a:p>
             <a:r>
               <a:rPr lang="en-US" dirty="0" smtClean="0"/>
-              <a:t>A Migration Tool named RoundhousE</a:t>
+              <a:t>How do you get changes?</a:t>
             </a:r>
           </a:p>
           <a:p>
             <a:r>
               <a:rPr lang="en-US" dirty="0" smtClean="0"/>
-              <a:t>Demos – after all this is a technical presentation right?!</a:t>
+              <a:t>Does it get any easier?</a:t>
             </a:r>
             <a:endParaRPr lang="en-US" dirty="0"/>
           </a:p>
@@ -7621,97 +7461,6 @@
 </file>
 
 <file path=ppt/slides/slide5.xml><?xml version="1.0" encoding="utf-8"?>
-<p:sld xmlns:a="http://schemas.openxmlformats.org/drawingml/2006/main" xmlns:r="http://schemas.openxmlformats.org/officeDocument/2006/relationships" xmlns:p="http://schemas.openxmlformats.org/presentationml/2006/main">
-  <p:cSld>
-    <p:spTree>
-      <p:nvGrpSpPr>
-        <p:cNvPr id="1" name=""/>
-        <p:cNvGrpSpPr/>
-        <p:nvPr/>
-      </p:nvGrpSpPr>
-      <p:grpSpPr>
-        <a:xfrm>
-          <a:off x="0" y="0"/>
-          <a:ext cx="0" cy="0"/>
-          <a:chOff x="0" y="0"/>
-          <a:chExt cx="0" cy="0"/>
-        </a:xfrm>
-      </p:grpSpPr>
-      <p:sp>
-        <p:nvSpPr>
-          <p:cNvPr id="2" name="Title 1"/>
-          <p:cNvSpPr>
-            <a:spLocks noGrp="1"/>
-          </p:cNvSpPr>
-          <p:nvPr>
-            <p:ph type="title"/>
-          </p:nvPr>
-        </p:nvSpPr>
-        <p:spPr/>
-        <p:txBody>
-          <a:bodyPr/>
-          <a:lstStyle/>
-          <a:p>
-            <a:r>
-              <a:rPr lang="en-US" dirty="0" smtClean="0"/>
-              <a:t>Define the Issue</a:t>
-            </a:r>
-            <a:endParaRPr lang="en-US" dirty="0"/>
-          </a:p>
-        </p:txBody>
-      </p:sp>
-      <p:sp>
-        <p:nvSpPr>
-          <p:cNvPr id="3" name="Content Placeholder 2"/>
-          <p:cNvSpPr>
-            <a:spLocks noGrp="1"/>
-          </p:cNvSpPr>
-          <p:nvPr>
-            <p:ph idx="1"/>
-          </p:nvPr>
-        </p:nvSpPr>
-        <p:spPr/>
-        <p:txBody>
-          <a:bodyPr>
-            <a:normAutofit/>
-          </a:bodyPr>
-          <a:lstStyle/>
-          <a:p>
-            <a:r>
-              <a:rPr lang="en-US" sz="3200" dirty="0" smtClean="0"/>
-              <a:t>Databases change – updates with new/changed tables, views, stored procedures, etc</a:t>
-            </a:r>
-          </a:p>
-          <a:p>
-            <a:r>
-              <a:rPr lang="en-US" sz="3200" dirty="0" smtClean="0"/>
-              <a:t>Databases store data</a:t>
-            </a:r>
-          </a:p>
-          <a:p>
-            <a:r>
-              <a:rPr lang="en-US" sz="3200" dirty="0" smtClean="0"/>
-              <a:t>Deleting data is bad. Don’t be a bad monkey!</a:t>
-            </a:r>
-          </a:p>
-        </p:txBody>
-      </p:sp>
-    </p:spTree>
-  </p:cSld>
-  <p:clrMapOvr>
-    <a:masterClrMapping/>
-  </p:clrMapOvr>
-  <p:timing>
-    <p:tnLst>
-      <p:par>
-        <p:cTn id="1" dur="indefinite" restart="never" nodeType="tmRoot"/>
-      </p:par>
-    </p:tnLst>
-  </p:timing>
-</p:sld>
-</file>
-
-<file path=ppt/slides/slide6.xml><?xml version="1.0" encoding="utf-8"?>
 <p:sld xmlns:a="http://schemas.openxmlformats.org/drawingml/2006/main" xmlns:r="http://schemas.openxmlformats.org/officeDocument/2006/relationships" xmlns:p="http://schemas.openxmlformats.org/presentationml/2006/main">
   <p:cSld>
     <p:spTree>
@@ -8803,6 +8552,107 @@
 </p:sld>
 </file>
 
+<file path=ppt/slides/slide6.xml><?xml version="1.0" encoding="utf-8"?>
+<p:sld xmlns:a="http://schemas.openxmlformats.org/drawingml/2006/main" xmlns:r="http://schemas.openxmlformats.org/officeDocument/2006/relationships" xmlns:p="http://schemas.openxmlformats.org/presentationml/2006/main">
+  <p:cSld>
+    <p:spTree>
+      <p:nvGrpSpPr>
+        <p:cNvPr id="1" name=""/>
+        <p:cNvGrpSpPr/>
+        <p:nvPr/>
+      </p:nvGrpSpPr>
+      <p:grpSpPr>
+        <a:xfrm>
+          <a:off x="0" y="0"/>
+          <a:ext cx="0" cy="0"/>
+          <a:chOff x="0" y="0"/>
+          <a:chExt cx="0" cy="0"/>
+        </a:xfrm>
+      </p:grpSpPr>
+      <p:sp>
+        <p:nvSpPr>
+          <p:cNvPr id="2" name="Title 1"/>
+          <p:cNvSpPr>
+            <a:spLocks noGrp="1"/>
+          </p:cNvSpPr>
+          <p:nvPr>
+            <p:ph type="title"/>
+          </p:nvPr>
+        </p:nvSpPr>
+        <p:spPr/>
+        <p:txBody>
+          <a:bodyPr/>
+          <a:lstStyle/>
+          <a:p>
+            <a:r>
+              <a:rPr lang="en-US" dirty="0" smtClean="0"/>
+              <a:t>Let’s talk about Pain</a:t>
+            </a:r>
+            <a:endParaRPr lang="en-US" dirty="0"/>
+          </a:p>
+        </p:txBody>
+      </p:sp>
+      <p:sp>
+        <p:nvSpPr>
+          <p:cNvPr id="3" name="Content Placeholder 2"/>
+          <p:cNvSpPr>
+            <a:spLocks noGrp="1"/>
+          </p:cNvSpPr>
+          <p:nvPr>
+            <p:ph idx="1"/>
+          </p:nvPr>
+        </p:nvSpPr>
+        <p:spPr/>
+        <p:txBody>
+          <a:bodyPr/>
+          <a:lstStyle/>
+          <a:p>
+            <a:r>
+              <a:rPr lang="en-US" dirty="0" smtClean="0"/>
+              <a:t>How do you apply a database change one time?</a:t>
+            </a:r>
+          </a:p>
+          <a:p>
+            <a:r>
+              <a:rPr lang="en-US" dirty="0" smtClean="0"/>
+              <a:t>How do you keep all environments in sync?</a:t>
+            </a:r>
+          </a:p>
+          <a:p>
+            <a:r>
+              <a:rPr lang="en-US" sz="2800" dirty="0" smtClean="0"/>
+              <a:t>Databases change – updates with new/changed tables, views, stored procedures, etc</a:t>
+            </a:r>
+          </a:p>
+          <a:p>
+            <a:r>
+              <a:rPr lang="en-US" sz="2800" dirty="0" smtClean="0"/>
+              <a:t>Databases store data</a:t>
+            </a:r>
+          </a:p>
+          <a:p>
+            <a:r>
+              <a:rPr lang="en-US" sz="2800" dirty="0" smtClean="0"/>
+              <a:t>Deleting data is bad. Don’t be a bad monkey!</a:t>
+            </a:r>
+          </a:p>
+        </p:txBody>
+      </p:sp>
+    </p:spTree>
+  </p:cSld>
+  <p:clrMapOvr>
+    <a:masterClrMapping/>
+  </p:clrMapOvr>
+  <p:timing>
+    <p:tnLst>
+      <p:par>
+        <p:cTn id="1" dur="indefinite" restart="never" nodeType="tmRoot"/>
+      </p:par>
+    </p:tnLst>
+  </p:timing>
+</p:sld>
+</file>
+
 <file path=ppt/slides/slide7.xml><?xml version="1.0" encoding="utf-8"?>
 <p:sld xmlns:a="http://schemas.openxmlformats.org/drawingml/2006/main" xmlns:r="http://schemas.openxmlformats.org/officeDocument/2006/relationships" xmlns:p="http://schemas.openxmlformats.org/presentationml/2006/main">
   <p:cSld>
@@ -8837,7 +8687,7 @@
           <a:p>
             <a:r>
               <a:rPr lang="en-US" dirty="0" smtClean="0"/>
-              <a:t>Let’s talk about Pain</a:t>
+              <a:t>What is RoundhousE?</a:t>
             </a:r>
             <a:endParaRPr lang="en-US" dirty="0"/>
           </a:p>
@@ -8860,13 +8710,37 @@
           <a:p>
             <a:r>
               <a:rPr lang="en-US" dirty="0" smtClean="0"/>
-              <a:t>How do you apply a database change one time?</a:t>
+              <a:t>And why is kicking my database a good thing?</a:t>
             </a:r>
           </a:p>
           <a:p>
             <a:r>
               <a:rPr lang="en-US" dirty="0" smtClean="0"/>
-              <a:t>How do you keep all environments in sync?</a:t>
+              <a:t>It’s easy to use</a:t>
+            </a:r>
+          </a:p>
+          <a:p>
+            <a:r>
+              <a:rPr lang="en-US" dirty="0" smtClean="0"/>
+              <a:t>Make your auditors smile</a:t>
+            </a:r>
+          </a:p>
+          <a:p>
+            <a:r>
+              <a:rPr lang="en-US" dirty="0" smtClean="0"/>
+              <a:t>Version your database</a:t>
+            </a:r>
+          </a:p>
+          <a:p>
+            <a:r>
+              <a:rPr lang="en-US" dirty="0" smtClean="0"/>
+              <a:t>It’s environment aware</a:t>
+            </a:r>
+          </a:p>
+          <a:p>
+            <a:r>
+              <a:rPr lang="en-US" dirty="0" smtClean="0"/>
+              <a:t>And that’s not even the cool stuff yet.</a:t>
             </a:r>
             <a:endParaRPr lang="en-US" dirty="0"/>
           </a:p>
@@ -8921,7 +8795,7 @@
           <a:p>
             <a:r>
               <a:rPr lang="en-US" dirty="0" smtClean="0"/>
-              <a:t>It’s simple</a:t>
+              <a:t>What does it work with?</a:t>
             </a:r>
             <a:endParaRPr lang="en-US" dirty="0"/>
           </a:p>
@@ -8943,14 +8817,54 @@
           <a:lstStyle/>
           <a:p>
             <a:r>
-              <a:rPr lang="en-US" smtClean="0"/>
-              <a:t>Use RoundhousE</a:t>
-            </a:r>
-            <a:r>
               <a:rPr lang="en-US" dirty="0" smtClean="0"/>
-              <a:t>!</a:t>
-            </a:r>
-            <a:endParaRPr lang="en-US" dirty="0"/>
+              <a:t>SQL Server 2000/2005/2008/Express</a:t>
+            </a:r>
+          </a:p>
+          <a:p>
+            <a:r>
+              <a:rPr lang="en-US" dirty="0" smtClean="0"/>
+              <a:t>Oracle</a:t>
+            </a:r>
+          </a:p>
+          <a:p>
+            <a:r>
+              <a:rPr lang="en-US" dirty="0" smtClean="0"/>
+              <a:t>Access</a:t>
+            </a:r>
+          </a:p>
+          <a:p>
+            <a:endParaRPr lang="en-US" dirty="0" smtClean="0"/>
+          </a:p>
+          <a:p>
+            <a:r>
+              <a:rPr lang="en-US" dirty="0" smtClean="0"/>
+              <a:t>Soon:</a:t>
+            </a:r>
+          </a:p>
+          <a:p>
+            <a:pPr lvl="1"/>
+            <a:r>
+              <a:rPr lang="en-US" dirty="0" err="1" smtClean="0"/>
+              <a:t>MySQL</a:t>
+            </a:r>
+            <a:endParaRPr lang="en-US" dirty="0" smtClean="0"/>
+          </a:p>
+          <a:p>
+            <a:pPr lvl="1"/>
+            <a:r>
+              <a:rPr lang="en-US" dirty="0" err="1" smtClean="0"/>
+              <a:t>PostgreSQL</a:t>
+            </a:r>
+            <a:endParaRPr lang="en-US" dirty="0" smtClean="0"/>
+          </a:p>
+          <a:p>
+            <a:pPr lvl="1"/>
+            <a:r>
+              <a:rPr lang="en-US" dirty="0" err="1" smtClean="0"/>
+              <a:t>SQLite</a:t>
+            </a:r>
+            <a:endParaRPr lang="en-US" dirty="0" smtClean="0"/>
           </a:p>
         </p:txBody>
       </p:sp>
@@ -9002,8 +8916,8 @@
           <a:lstStyle/>
           <a:p>
             <a:r>
-              <a:rPr lang="en-US" dirty="0" smtClean="0"/>
-              <a:t>Let the demos begin</a:t>
+              <a:rPr lang="en-US" dirty="0" err="1" smtClean="0"/>
+              <a:t>ChuckNorris</a:t>
             </a:r>
             <a:endParaRPr lang="en-US" dirty="0"/>
           </a:p>
@@ -9024,7 +8938,23 @@
           <a:bodyPr/>
           <a:lstStyle/>
           <a:p>
-            <a:endParaRPr lang="en-US"/>
+            <a:r>
+              <a:rPr lang="en-US" dirty="0" smtClean="0"/>
+              <a:t>Suite of tools to help make developers more productive by scaffolding frameworks, etc</a:t>
+            </a:r>
+          </a:p>
+          <a:p>
+            <a:r>
+              <a:rPr lang="en-US" dirty="0" smtClean="0"/>
+              <a:t>RoundhousE makes db migrations easy</a:t>
+            </a:r>
+          </a:p>
+          <a:p>
+            <a:r>
+              <a:rPr lang="en-US" dirty="0" smtClean="0"/>
+              <a:t>http://groups.google.com/group/chucknorrisframework</a:t>
+            </a:r>
+            <a:endParaRPr lang="en-US" dirty="0"/>
           </a:p>
         </p:txBody>
       </p:sp>

</xml_diff>

<commit_message>
updating presentation. Removing items no longer needed by the deploy
</commit_message>
<xml_diff>
--- a/docs/RoundhousEPresentation.pptx
+++ b/docs/RoundhousEPresentation.pptx
@@ -5,28 +5,29 @@
     <p:sldMasterId id="2147483660" r:id="rId1"/>
   </p:sldMasterIdLst>
   <p:notesMasterIdLst>
-    <p:notesMasterId r:id="rId21"/>
+    <p:notesMasterId r:id="rId22"/>
   </p:notesMasterIdLst>
   <p:sldIdLst>
     <p:sldId id="256" r:id="rId2"/>
     <p:sldId id="301" r:id="rId3"/>
-    <p:sldId id="302" r:id="rId4"/>
-    <p:sldId id="295" r:id="rId5"/>
-    <p:sldId id="298" r:id="rId6"/>
-    <p:sldId id="299" r:id="rId7"/>
-    <p:sldId id="300" r:id="rId8"/>
-    <p:sldId id="313" r:id="rId9"/>
-    <p:sldId id="312" r:id="rId10"/>
-    <p:sldId id="307" r:id="rId11"/>
-    <p:sldId id="304" r:id="rId12"/>
-    <p:sldId id="303" r:id="rId13"/>
-    <p:sldId id="305" r:id="rId14"/>
-    <p:sldId id="306" r:id="rId15"/>
-    <p:sldId id="311" r:id="rId16"/>
-    <p:sldId id="308" r:id="rId17"/>
-    <p:sldId id="309" r:id="rId18"/>
-    <p:sldId id="310" r:id="rId19"/>
-    <p:sldId id="289" r:id="rId20"/>
+    <p:sldId id="314" r:id="rId4"/>
+    <p:sldId id="302" r:id="rId5"/>
+    <p:sldId id="295" r:id="rId6"/>
+    <p:sldId id="298" r:id="rId7"/>
+    <p:sldId id="299" r:id="rId8"/>
+    <p:sldId id="300" r:id="rId9"/>
+    <p:sldId id="313" r:id="rId10"/>
+    <p:sldId id="312" r:id="rId11"/>
+    <p:sldId id="307" r:id="rId12"/>
+    <p:sldId id="304" r:id="rId13"/>
+    <p:sldId id="303" r:id="rId14"/>
+    <p:sldId id="305" r:id="rId15"/>
+    <p:sldId id="306" r:id="rId16"/>
+    <p:sldId id="311" r:id="rId17"/>
+    <p:sldId id="308" r:id="rId18"/>
+    <p:sldId id="309" r:id="rId19"/>
+    <p:sldId id="310" r:id="rId20"/>
+    <p:sldId id="289" r:id="rId21"/>
   </p:sldIdLst>
   <p:sldSz cx="9144000" cy="6858000" type="screen4x3"/>
   <p:notesSz cx="6858000" cy="9144000"/>
@@ -211,7 +212,7 @@
             <a:fld id="{50B9556B-D0FD-4B47-B68C-0681912A50B6}" type="datetimeFigureOut">
               <a:rPr lang="en-US" smtClean="0"/>
               <a:pPr/>
-              <a:t>9/9/2010</a:t>
+              <a:t>10/26/2010</a:t>
             </a:fld>
             <a:endParaRPr lang="en-US"/>
           </a:p>
@@ -620,7 +621,7 @@
             <a:fld id="{08C7389D-B56E-4C42-BFE2-46A0FB05E106}" type="datetimeFigureOut">
               <a:rPr lang="en-US" smtClean="0"/>
               <a:pPr/>
-              <a:t>9/9/2010</a:t>
+              <a:t>10/26/2010</a:t>
             </a:fld>
             <a:endParaRPr lang="en-US"/>
           </a:p>
@@ -899,7 +900,7 @@
             <a:fld id="{08C7389D-B56E-4C42-BFE2-46A0FB05E106}" type="datetimeFigureOut">
               <a:rPr lang="en-US" smtClean="0"/>
               <a:pPr/>
-              <a:t>9/9/2010</a:t>
+              <a:t>10/26/2010</a:t>
             </a:fld>
             <a:endParaRPr lang="en-US"/>
           </a:p>
@@ -1086,7 +1087,7 @@
             <a:fld id="{08C7389D-B56E-4C42-BFE2-46A0FB05E106}" type="datetimeFigureOut">
               <a:rPr lang="en-US" smtClean="0"/>
               <a:pPr/>
-              <a:t>9/9/2010</a:t>
+              <a:t>10/26/2010</a:t>
             </a:fld>
             <a:endParaRPr lang="en-US"/>
           </a:p>
@@ -1273,7 +1274,7 @@
             <a:fld id="{08C7389D-B56E-4C42-BFE2-46A0FB05E106}" type="datetimeFigureOut">
               <a:rPr lang="en-US" smtClean="0"/>
               <a:pPr/>
-              <a:t>9/9/2010</a:t>
+              <a:t>10/26/2010</a:t>
             </a:fld>
             <a:endParaRPr lang="en-US"/>
           </a:p>
@@ -2758,7 +2759,7 @@
             <a:fld id="{08C7389D-B56E-4C42-BFE2-46A0FB05E106}" type="datetimeFigureOut">
               <a:rPr lang="en-US" smtClean="0"/>
               <a:pPr/>
-              <a:t>9/9/2010</a:t>
+              <a:t>10/26/2010</a:t>
             </a:fld>
             <a:endParaRPr lang="en-US"/>
           </a:p>
@@ -3360,7 +3361,7 @@
             <a:fld id="{08C7389D-B56E-4C42-BFE2-46A0FB05E106}" type="datetimeFigureOut">
               <a:rPr lang="en-US" smtClean="0"/>
               <a:pPr/>
-              <a:t>9/9/2010</a:t>
+              <a:t>10/26/2010</a:t>
             </a:fld>
             <a:endParaRPr lang="en-US"/>
           </a:p>
@@ -3799,7 +3800,7 @@
             <a:fld id="{08C7389D-B56E-4C42-BFE2-46A0FB05E106}" type="datetimeFigureOut">
               <a:rPr lang="en-US" smtClean="0"/>
               <a:pPr/>
-              <a:t>9/9/2010</a:t>
+              <a:t>10/26/2010</a:t>
             </a:fld>
             <a:endParaRPr lang="en-US"/>
           </a:p>
@@ -4362,7 +4363,7 @@
             <a:fld id="{08C7389D-B56E-4C42-BFE2-46A0FB05E106}" type="datetimeFigureOut">
               <a:rPr lang="en-US" smtClean="0"/>
               <a:pPr/>
-              <a:t>9/9/2010</a:t>
+              <a:t>10/26/2010</a:t>
             </a:fld>
             <a:endParaRPr lang="en-US"/>
           </a:p>
@@ -4460,7 +4461,7 @@
             <a:fld id="{08C7389D-B56E-4C42-BFE2-46A0FB05E106}" type="datetimeFigureOut">
               <a:rPr lang="en-US" smtClean="0"/>
               <a:pPr/>
-              <a:t>9/9/2010</a:t>
+              <a:t>10/26/2010</a:t>
             </a:fld>
             <a:endParaRPr lang="en-US"/>
           </a:p>
@@ -4716,7 +4717,7 @@
             <a:fld id="{08C7389D-B56E-4C42-BFE2-46A0FB05E106}" type="datetimeFigureOut">
               <a:rPr lang="en-US" smtClean="0"/>
               <a:pPr/>
-              <a:t>9/9/2010</a:t>
+              <a:t>10/26/2010</a:t>
             </a:fld>
             <a:endParaRPr lang="en-US"/>
           </a:p>
@@ -5439,7 +5440,7 @@
             <a:fld id="{08C7389D-B56E-4C42-BFE2-46A0FB05E106}" type="datetimeFigureOut">
               <a:rPr lang="en-US" smtClean="0"/>
               <a:pPr/>
-              <a:t>9/9/2010</a:t>
+              <a:t>10/26/2010</a:t>
             </a:fld>
             <a:endParaRPr lang="en-US"/>
           </a:p>
@@ -5666,7 +5667,7 @@
             <a:fld id="{08C7389D-B56E-4C42-BFE2-46A0FB05E106}" type="datetimeFigureOut">
               <a:rPr lang="en-US" smtClean="0"/>
               <a:pPr/>
-              <a:t>9/9/2010</a:t>
+              <a:t>10/26/2010</a:t>
             </a:fld>
             <a:endParaRPr lang="en-US"/>
           </a:p>
@@ -6136,27 +6137,32 @@
         </p:spPr>
         <p:txBody>
           <a:bodyPr>
-            <a:normAutofit fontScale="92500" lnSpcReduction="20000"/>
+            <a:normAutofit/>
           </a:bodyPr>
           <a:lstStyle/>
           <a:p>
+            <a:pPr algn="ctr"/>
             <a:r>
               <a:rPr lang="en-US" dirty="0" smtClean="0"/>
-              <a:t>Rob Reynolds</a:t>
-            </a:r>
-          </a:p>
-          <a:p>
+              <a:t>Rob </a:t>
+            </a:r>
+            <a:r>
+              <a:rPr lang="en-US" dirty="0" smtClean="0"/>
+              <a:t>Reynolds</a:t>
+            </a:r>
             <a:r>
               <a:rPr lang="en-US" sz="1900" dirty="0" smtClean="0"/>
-              <a:t>C# MVP </a:t>
-            </a:r>
-          </a:p>
-          <a:p>
+              <a:t> </a:t>
+            </a:r>
             <a:r>
               <a:rPr lang="en-US" sz="1900" dirty="0" smtClean="0"/>
-              <a:t>http://ferventcoder.com | ferventcoder@gmail.com | Twitter: ferventcoder</a:t>
-            </a:r>
-            <a:endParaRPr lang="en-US" sz="1900" dirty="0"/>
+              <a:t>|</a:t>
+            </a:r>
+            <a:r>
+              <a:rPr lang="en-US" sz="1900" dirty="0" smtClean="0"/>
+              <a:t> Federal Home Loan Bank Topeka | Topeka, KS</a:t>
+            </a:r>
+            <a:endParaRPr lang="en-US" sz="1900" dirty="0" smtClean="0"/>
           </a:p>
         </p:txBody>
       </p:sp>
@@ -6208,8 +6214,8 @@
           <a:lstStyle/>
           <a:p>
             <a:r>
-              <a:rPr lang="en-US" dirty="0" smtClean="0"/>
-              <a:t>Easy to use</a:t>
+              <a:rPr lang="en-US" dirty="0" err="1" smtClean="0"/>
+              <a:t>ChuckNorris</a:t>
             </a:r>
             <a:endParaRPr lang="en-US" dirty="0"/>
           </a:p>
@@ -6232,19 +6238,19 @@
           <a:p>
             <a:r>
               <a:rPr lang="en-US" dirty="0" smtClean="0"/>
-              <a:t>One required parameter (/d) for database</a:t>
+              <a:t>Suite of tools to help make developers more productive by scaffolding frameworks, etc</a:t>
             </a:r>
           </a:p>
           <a:p>
             <a:r>
               <a:rPr lang="en-US" dirty="0" smtClean="0"/>
-              <a:t>Folder format</a:t>
+              <a:t>RoundhousE makes db migrations easy</a:t>
             </a:r>
           </a:p>
           <a:p>
             <a:r>
               <a:rPr lang="en-US" dirty="0" smtClean="0"/>
-              <a:t>Comes with samples</a:t>
+              <a:t>http://groups.google.com/group/chucknorrisframework</a:t>
             </a:r>
             <a:endParaRPr lang="en-US" dirty="0"/>
           </a:p>
@@ -6299,7 +6305,7 @@
           <a:p>
             <a:r>
               <a:rPr lang="en-US" dirty="0" smtClean="0"/>
-              <a:t>Make Your Auditors Smile</a:t>
+              <a:t>Easy to use</a:t>
             </a:r>
             <a:endParaRPr lang="en-US" dirty="0"/>
           </a:p>
@@ -6322,16 +6328,20 @@
           <a:p>
             <a:r>
               <a:rPr lang="en-US" dirty="0" smtClean="0"/>
-              <a:t>Audit logging – who did exactly what when?</a:t>
+              <a:t>One required parameter (/d) for database</a:t>
             </a:r>
           </a:p>
           <a:p>
             <a:r>
               <a:rPr lang="en-US" dirty="0" smtClean="0"/>
-              <a:t>Auditing changes by capturing all scripts and logs each time</a:t>
-            </a:r>
-          </a:p>
-          <a:p>
+              <a:t>Folder format</a:t>
+            </a:r>
+          </a:p>
+          <a:p>
+            <a:r>
+              <a:rPr lang="en-US" dirty="0" smtClean="0"/>
+              <a:t>Comes with samples</a:t>
+            </a:r>
             <a:endParaRPr lang="en-US" dirty="0"/>
           </a:p>
         </p:txBody>
@@ -6385,7 +6395,7 @@
           <a:p>
             <a:r>
               <a:rPr lang="en-US" dirty="0" smtClean="0"/>
-              <a:t>Version Your Database</a:t>
+              <a:t>Make Your Auditors Smile</a:t>
             </a:r>
             <a:endParaRPr lang="en-US" dirty="0"/>
           </a:p>
@@ -6408,14 +6418,16 @@
           <a:p>
             <a:r>
               <a:rPr lang="en-US" dirty="0" smtClean="0"/>
-              <a:t>1.0.0.0 – version?</a:t>
+              <a:t>Audit logging – who did exactly what when?</a:t>
             </a:r>
           </a:p>
           <a:p>
             <a:r>
               <a:rPr lang="en-US" dirty="0" smtClean="0"/>
-              <a:t>“What version is your database on?”</a:t>
-            </a:r>
+              <a:t>Auditing changes by capturing all scripts and logs each time</a:t>
+            </a:r>
+          </a:p>
+          <a:p>
             <a:endParaRPr lang="en-US" dirty="0"/>
           </a:p>
         </p:txBody>
@@ -6469,7 +6481,7 @@
           <a:p>
             <a:r>
               <a:rPr lang="en-US" dirty="0" smtClean="0"/>
-              <a:t>Environment Awareness</a:t>
+              <a:t>Version Your Database</a:t>
             </a:r>
             <a:endParaRPr lang="en-US" dirty="0"/>
           </a:p>
@@ -6492,14 +6504,15 @@
           <a:p>
             <a:r>
               <a:rPr lang="en-US" dirty="0" smtClean="0"/>
-              <a:t>Scripts meant for an environment will only run in that environment</a:t>
+              <a:t>1.0.0.0 – version?</a:t>
             </a:r>
           </a:p>
           <a:p>
             <a:r>
               <a:rPr lang="en-US" dirty="0" smtClean="0"/>
-              <a:t>Default is “LOCAL”</a:t>
-            </a:r>
+              <a:t>“What version is your database on?”</a:t>
+            </a:r>
+            <a:endParaRPr lang="en-US" dirty="0"/>
           </a:p>
         </p:txBody>
       </p:sp>
@@ -6552,7 +6565,7 @@
           <a:p>
             <a:r>
               <a:rPr lang="en-US" dirty="0" smtClean="0"/>
-              <a:t>Conventions / Customizable</a:t>
+              <a:t>Environment Awareness</a:t>
             </a:r>
             <a:endParaRPr lang="en-US" dirty="0"/>
           </a:p>
@@ -6575,37 +6588,14 @@
           <a:p>
             <a:r>
               <a:rPr lang="en-US" dirty="0" smtClean="0"/>
-              <a:t>The cool stuff</a:t>
+              <a:t>Scripts meant for an environment will only run in that environment</a:t>
             </a:r>
           </a:p>
           <a:p>
             <a:r>
               <a:rPr lang="en-US" dirty="0" smtClean="0"/>
-              <a:t>Don’t like RoundhousE as the schema? Change it</a:t>
-            </a:r>
-          </a:p>
-          <a:p>
-            <a:r>
-              <a:rPr lang="en-US" dirty="0" smtClean="0"/>
-              <a:t>Don’t like the “up” folder? Change it</a:t>
-            </a:r>
-          </a:p>
-          <a:p>
-            <a:r>
-              <a:rPr lang="en-US" dirty="0" smtClean="0"/>
-              <a:t>Don’t like </a:t>
-            </a:r>
-            <a:r>
-              <a:rPr lang="en-US" dirty="0" err="1" smtClean="0"/>
-              <a:t>xxxxx</a:t>
-            </a:r>
-            <a:r>
-              <a:rPr lang="en-US" dirty="0" smtClean="0"/>
-              <a:t>? Change it</a:t>
-            </a:r>
-          </a:p>
-          <a:p>
-            <a:endParaRPr lang="en-US" dirty="0"/>
+              <a:t>Default is “LOCAL”</a:t>
+            </a:r>
           </a:p>
         </p:txBody>
       </p:sp>
@@ -6658,7 +6648,7 @@
           <a:p>
             <a:r>
               <a:rPr lang="en-US" dirty="0" smtClean="0"/>
-              <a:t>Implement into development</a:t>
+              <a:t>Conventions / Customizable</a:t>
             </a:r>
             <a:endParaRPr lang="en-US" dirty="0"/>
           </a:p>
@@ -6681,8 +6671,36 @@
           <a:p>
             <a:r>
               <a:rPr lang="en-US" dirty="0" smtClean="0"/>
-              <a:t>Also the cool stuff</a:t>
-            </a:r>
+              <a:t>The cool stuff</a:t>
+            </a:r>
+          </a:p>
+          <a:p>
+            <a:r>
+              <a:rPr lang="en-US" dirty="0" smtClean="0"/>
+              <a:t>Don’t like RoundhousE as the schema? Change it</a:t>
+            </a:r>
+          </a:p>
+          <a:p>
+            <a:r>
+              <a:rPr lang="en-US" dirty="0" smtClean="0"/>
+              <a:t>Don’t like the “up” folder? Change it</a:t>
+            </a:r>
+          </a:p>
+          <a:p>
+            <a:r>
+              <a:rPr lang="en-US" dirty="0" smtClean="0"/>
+              <a:t>Don’t like </a:t>
+            </a:r>
+            <a:r>
+              <a:rPr lang="en-US" dirty="0" err="1" smtClean="0"/>
+              <a:t>xxxxx</a:t>
+            </a:r>
+            <a:r>
+              <a:rPr lang="en-US" dirty="0" smtClean="0"/>
+              <a:t>? Change it</a:t>
+            </a:r>
+          </a:p>
+          <a:p>
             <a:endParaRPr lang="en-US" dirty="0"/>
           </a:p>
         </p:txBody>
@@ -6736,7 +6754,7 @@
           <a:p>
             <a:r>
               <a:rPr lang="en-US" dirty="0" smtClean="0"/>
-              <a:t>How do I get RoundhousE?</a:t>
+              <a:t>Implement into development</a:t>
             </a:r>
             <a:endParaRPr lang="en-US" dirty="0"/>
           </a:p>
@@ -6754,58 +6772,14 @@
         </p:nvSpPr>
         <p:spPr/>
         <p:txBody>
-          <a:bodyPr>
-            <a:normAutofit lnSpcReduction="10000"/>
-          </a:bodyPr>
+          <a:bodyPr/>
           <a:lstStyle/>
           <a:p>
             <a:r>
               <a:rPr lang="en-US" dirty="0" smtClean="0"/>
-              <a:t>gem install roundhouse</a:t>
-            </a:r>
-          </a:p>
-          <a:p>
-            <a:r>
-              <a:rPr lang="en-US" dirty="0" smtClean="0"/>
-              <a:t>nu install roundhouse (bring to your project)</a:t>
-            </a:r>
-          </a:p>
-          <a:p>
-            <a:endParaRPr lang="en-US" dirty="0" smtClean="0"/>
-          </a:p>
-          <a:p>
-            <a:r>
-              <a:rPr lang="en-US" dirty="0" smtClean="0"/>
-              <a:t>Source (</a:t>
-            </a:r>
-            <a:r>
-              <a:rPr lang="en-US" dirty="0" err="1" smtClean="0"/>
-              <a:t>git</a:t>
-            </a:r>
-            <a:r>
-              <a:rPr lang="en-US" dirty="0" smtClean="0"/>
-              <a:t> / </a:t>
-            </a:r>
-            <a:r>
-              <a:rPr lang="en-US" dirty="0" err="1" smtClean="0"/>
-              <a:t>svn</a:t>
-            </a:r>
-            <a:r>
-              <a:rPr lang="en-US" dirty="0" smtClean="0"/>
-              <a:t>) – projectroundhouse.org</a:t>
-            </a:r>
-          </a:p>
-          <a:p>
-            <a:endParaRPr lang="en-US" dirty="0" smtClean="0"/>
-          </a:p>
-          <a:p>
-            <a:r>
-              <a:rPr lang="en-US" dirty="0" smtClean="0"/>
-              <a:t>Old fashioned download – projectroundhouse.org</a:t>
-            </a:r>
-          </a:p>
-          <a:p>
-            <a:endParaRPr lang="en-US" dirty="0" smtClean="0"/>
+              <a:t>Also the cool stuff</a:t>
+            </a:r>
+            <a:endParaRPr lang="en-US" dirty="0"/>
           </a:p>
         </p:txBody>
       </p:sp>
@@ -6858,7 +6832,7 @@
           <a:p>
             <a:r>
               <a:rPr lang="en-US" dirty="0" smtClean="0"/>
-              <a:t>Asking questions</a:t>
+              <a:t>How do I get RoundhousE?</a:t>
             </a:r>
             <a:endParaRPr lang="en-US" dirty="0"/>
           </a:p>
@@ -6876,49 +6850,58 @@
         </p:nvSpPr>
         <p:spPr/>
         <p:txBody>
-          <a:bodyPr/>
+          <a:bodyPr>
+            <a:normAutofit lnSpcReduction="10000"/>
+          </a:bodyPr>
           <a:lstStyle/>
           <a:p>
             <a:r>
               <a:rPr lang="en-US" dirty="0" smtClean="0"/>
-              <a:t>Chuck Norris Framework</a:t>
-            </a:r>
-          </a:p>
-          <a:p>
-            <a:pPr lvl="1"/>
+              <a:t>gem install roundhouse</a:t>
+            </a:r>
+          </a:p>
+          <a:p>
             <a:r>
               <a:rPr lang="en-US" dirty="0" smtClean="0"/>
-              <a:t>http://groups.google.com/group/chucknorrisframework </a:t>
-            </a:r>
+              <a:t>nu install roundhouse (bring to your project)</a:t>
+            </a:r>
+          </a:p>
+          <a:p>
+            <a:endParaRPr lang="en-US" dirty="0" smtClean="0"/>
           </a:p>
           <a:p>
             <a:r>
               <a:rPr lang="en-US" dirty="0" smtClean="0"/>
-              <a:t>@</a:t>
+              <a:t>Source (</a:t>
             </a:r>
             <a:r>
               <a:rPr lang="en-US" dirty="0" err="1" smtClean="0"/>
-              <a:t>Roundhouse_DB</a:t>
-            </a:r>
+              <a:t>git</a:t>
+            </a:r>
+            <a:r>
+              <a:rPr lang="en-US" dirty="0" smtClean="0"/>
+              <a:t> / </a:t>
+            </a:r>
+            <a:r>
+              <a:rPr lang="en-US" dirty="0" err="1" smtClean="0"/>
+              <a:t>svn</a:t>
+            </a:r>
+            <a:r>
+              <a:rPr lang="en-US" dirty="0" smtClean="0"/>
+              <a:t>) – projectroundhouse.org</a:t>
+            </a:r>
+          </a:p>
+          <a:p>
             <a:endParaRPr lang="en-US" dirty="0" smtClean="0"/>
           </a:p>
           <a:p>
             <a:r>
               <a:rPr lang="en-US" dirty="0" smtClean="0"/>
-              <a:t>#</a:t>
-            </a:r>
-            <a:r>
-              <a:rPr lang="en-US" dirty="0" err="1" smtClean="0"/>
-              <a:t>roundhouse_db</a:t>
-            </a:r>
+              <a:t>Old fashioned download – projectroundhouse.org</a:t>
+            </a:r>
+          </a:p>
+          <a:p>
             <a:endParaRPr lang="en-US" dirty="0" smtClean="0"/>
-          </a:p>
-          <a:p>
-            <a:r>
-              <a:rPr lang="en-US" dirty="0" smtClean="0"/>
-              <a:t>@ferventcoder</a:t>
-            </a:r>
-            <a:endParaRPr lang="en-US" dirty="0"/>
           </a:p>
         </p:txBody>
       </p:sp>
@@ -6971,7 +6954,7 @@
           <a:p>
             <a:r>
               <a:rPr lang="en-US" dirty="0" smtClean="0"/>
-              <a:t>Questions?</a:t>
+              <a:t>Asking questions</a:t>
             </a:r>
             <a:endParaRPr lang="en-US" dirty="0"/>
           </a:p>
@@ -6992,6 +6975,45 @@
           <a:bodyPr/>
           <a:lstStyle/>
           <a:p>
+            <a:r>
+              <a:rPr lang="en-US" dirty="0" smtClean="0"/>
+              <a:t>Chuck Norris Framework</a:t>
+            </a:r>
+          </a:p>
+          <a:p>
+            <a:pPr lvl="1"/>
+            <a:r>
+              <a:rPr lang="en-US" dirty="0" smtClean="0"/>
+              <a:t>http://groups.google.com/group/chucknorrisframework </a:t>
+            </a:r>
+          </a:p>
+          <a:p>
+            <a:r>
+              <a:rPr lang="en-US" dirty="0" smtClean="0"/>
+              <a:t>@</a:t>
+            </a:r>
+            <a:r>
+              <a:rPr lang="en-US" dirty="0" err="1" smtClean="0"/>
+              <a:t>Roundhouse_DB</a:t>
+            </a:r>
+            <a:endParaRPr lang="en-US" dirty="0" smtClean="0"/>
+          </a:p>
+          <a:p>
+            <a:r>
+              <a:rPr lang="en-US" dirty="0" smtClean="0"/>
+              <a:t>#</a:t>
+            </a:r>
+            <a:r>
+              <a:rPr lang="en-US" dirty="0" err="1" smtClean="0"/>
+              <a:t>roundhouse_db</a:t>
+            </a:r>
+            <a:endParaRPr lang="en-US" dirty="0" smtClean="0"/>
+          </a:p>
+          <a:p>
+            <a:r>
+              <a:rPr lang="en-US" dirty="0" smtClean="0"/>
+              <a:t>@ferventcoder</a:t>
+            </a:r>
             <a:endParaRPr lang="en-US" dirty="0"/>
           </a:p>
         </p:txBody>
@@ -7012,6 +7034,174 @@
 </file>
 
 <file path=ppt/slides/slide19.xml><?xml version="1.0" encoding="utf-8"?>
+<p:sld xmlns:a="http://schemas.openxmlformats.org/drawingml/2006/main" xmlns:r="http://schemas.openxmlformats.org/officeDocument/2006/relationships" xmlns:p="http://schemas.openxmlformats.org/presentationml/2006/main">
+  <p:cSld>
+    <p:spTree>
+      <p:nvGrpSpPr>
+        <p:cNvPr id="1" name=""/>
+        <p:cNvGrpSpPr/>
+        <p:nvPr/>
+      </p:nvGrpSpPr>
+      <p:grpSpPr>
+        <a:xfrm>
+          <a:off x="0" y="0"/>
+          <a:ext cx="0" cy="0"/>
+          <a:chOff x="0" y="0"/>
+          <a:chExt cx="0" cy="0"/>
+        </a:xfrm>
+      </p:grpSpPr>
+      <p:sp>
+        <p:nvSpPr>
+          <p:cNvPr id="2" name="Title 1"/>
+          <p:cNvSpPr>
+            <a:spLocks noGrp="1"/>
+          </p:cNvSpPr>
+          <p:nvPr>
+            <p:ph type="title"/>
+          </p:nvPr>
+        </p:nvSpPr>
+        <p:spPr/>
+        <p:txBody>
+          <a:bodyPr/>
+          <a:lstStyle/>
+          <a:p>
+            <a:r>
+              <a:rPr lang="en-US" dirty="0" smtClean="0"/>
+              <a:t>Questions?</a:t>
+            </a:r>
+            <a:endParaRPr lang="en-US" dirty="0"/>
+          </a:p>
+        </p:txBody>
+      </p:sp>
+      <p:sp>
+        <p:nvSpPr>
+          <p:cNvPr id="3" name="Content Placeholder 2"/>
+          <p:cNvSpPr>
+            <a:spLocks noGrp="1"/>
+          </p:cNvSpPr>
+          <p:nvPr>
+            <p:ph idx="1"/>
+          </p:nvPr>
+        </p:nvSpPr>
+        <p:spPr/>
+        <p:txBody>
+          <a:bodyPr/>
+          <a:lstStyle/>
+          <a:p>
+            <a:endParaRPr lang="en-US" dirty="0"/>
+          </a:p>
+        </p:txBody>
+      </p:sp>
+    </p:spTree>
+  </p:cSld>
+  <p:clrMapOvr>
+    <a:masterClrMapping/>
+  </p:clrMapOvr>
+  <p:timing>
+    <p:tnLst>
+      <p:par>
+        <p:cTn id="1" dur="indefinite" restart="never" nodeType="tmRoot"/>
+      </p:par>
+    </p:tnLst>
+  </p:timing>
+</p:sld>
+</file>
+
+<file path=ppt/slides/slide2.xml><?xml version="1.0" encoding="utf-8"?>
+<p:sld xmlns:a="http://schemas.openxmlformats.org/drawingml/2006/main" xmlns:r="http://schemas.openxmlformats.org/officeDocument/2006/relationships" xmlns:p="http://schemas.openxmlformats.org/presentationml/2006/main">
+  <p:cSld>
+    <p:spTree>
+      <p:nvGrpSpPr>
+        <p:cNvPr id="1" name=""/>
+        <p:cNvGrpSpPr/>
+        <p:nvPr/>
+      </p:nvGrpSpPr>
+      <p:grpSpPr>
+        <a:xfrm>
+          <a:off x="0" y="0"/>
+          <a:ext cx="0" cy="0"/>
+          <a:chOff x="0" y="0"/>
+          <a:chExt cx="0" cy="0"/>
+        </a:xfrm>
+      </p:grpSpPr>
+      <p:sp>
+        <p:nvSpPr>
+          <p:cNvPr id="2" name="Title 1"/>
+          <p:cNvSpPr>
+            <a:spLocks noGrp="1"/>
+          </p:cNvSpPr>
+          <p:nvPr>
+            <p:ph type="title"/>
+          </p:nvPr>
+        </p:nvSpPr>
+        <p:spPr/>
+        <p:txBody>
+          <a:bodyPr/>
+          <a:lstStyle/>
+          <a:p>
+            <a:r>
+              <a:rPr lang="en-US" dirty="0" smtClean="0"/>
+              <a:t>Before We Start</a:t>
+            </a:r>
+            <a:endParaRPr lang="en-US" dirty="0"/>
+          </a:p>
+        </p:txBody>
+      </p:sp>
+      <p:sp>
+        <p:nvSpPr>
+          <p:cNvPr id="3" name="Content Placeholder 2"/>
+          <p:cNvSpPr>
+            <a:spLocks noGrp="1"/>
+          </p:cNvSpPr>
+          <p:nvPr>
+            <p:ph idx="1"/>
+          </p:nvPr>
+        </p:nvSpPr>
+        <p:spPr/>
+        <p:txBody>
+          <a:bodyPr/>
+          <a:lstStyle/>
+          <a:p>
+            <a:r>
+              <a:rPr lang="en-US" dirty="0" smtClean="0"/>
+              <a:t>Questions – </a:t>
+            </a:r>
+            <a:r>
+              <a:rPr lang="en-US" dirty="0" smtClean="0"/>
+              <a:t>ask</a:t>
+            </a:r>
+            <a:r>
+              <a:rPr lang="en-US" dirty="0" smtClean="0"/>
+              <a:t>, but we may have to hold until end</a:t>
+            </a:r>
+          </a:p>
+          <a:p>
+            <a:r>
+              <a:rPr lang="en-US" dirty="0" smtClean="0"/>
+              <a:t>http://projectroundhouse.org</a:t>
+            </a:r>
+          </a:p>
+          <a:p>
+            <a:endParaRPr lang="en-US" dirty="0"/>
+          </a:p>
+        </p:txBody>
+      </p:sp>
+    </p:spTree>
+  </p:cSld>
+  <p:clrMapOvr>
+    <a:masterClrMapping/>
+  </p:clrMapOvr>
+  <p:timing>
+    <p:tnLst>
+      <p:par>
+        <p:cTn id="1" dur="indefinite" restart="never" nodeType="tmRoot"/>
+      </p:par>
+    </p:tnLst>
+  </p:timing>
+</p:sld>
+</file>
+
+<file path=ppt/slides/slide20.xml><?xml version="1.0" encoding="utf-8"?>
 <p:sld xmlns:a="http://schemas.openxmlformats.org/drawingml/2006/main" xmlns:r="http://schemas.openxmlformats.org/officeDocument/2006/relationships" xmlns:p="http://schemas.openxmlformats.org/presentationml/2006/main">
   <p:cSld>
     <p:spTree>
@@ -7175,108 +7365,6 @@
 </p:sld>
 </file>
 
-<file path=ppt/slides/slide2.xml><?xml version="1.0" encoding="utf-8"?>
-<p:sld xmlns:a="http://schemas.openxmlformats.org/drawingml/2006/main" xmlns:r="http://schemas.openxmlformats.org/officeDocument/2006/relationships" xmlns:p="http://schemas.openxmlformats.org/presentationml/2006/main">
-  <p:cSld>
-    <p:spTree>
-      <p:nvGrpSpPr>
-        <p:cNvPr id="1" name=""/>
-        <p:cNvGrpSpPr/>
-        <p:nvPr/>
-      </p:nvGrpSpPr>
-      <p:grpSpPr>
-        <a:xfrm>
-          <a:off x="0" y="0"/>
-          <a:ext cx="0" cy="0"/>
-          <a:chOff x="0" y="0"/>
-          <a:chExt cx="0" cy="0"/>
-        </a:xfrm>
-      </p:grpSpPr>
-      <p:sp>
-        <p:nvSpPr>
-          <p:cNvPr id="2" name="Title 1"/>
-          <p:cNvSpPr>
-            <a:spLocks noGrp="1"/>
-          </p:cNvSpPr>
-          <p:nvPr>
-            <p:ph type="title"/>
-          </p:nvPr>
-        </p:nvSpPr>
-        <p:spPr/>
-        <p:txBody>
-          <a:bodyPr/>
-          <a:lstStyle/>
-          <a:p>
-            <a:r>
-              <a:rPr lang="en-US" dirty="0" smtClean="0"/>
-              <a:t>Before We Start</a:t>
-            </a:r>
-            <a:endParaRPr lang="en-US" dirty="0"/>
-          </a:p>
-        </p:txBody>
-      </p:sp>
-      <p:sp>
-        <p:nvSpPr>
-          <p:cNvPr id="3" name="Content Placeholder 2"/>
-          <p:cNvSpPr>
-            <a:spLocks noGrp="1"/>
-          </p:cNvSpPr>
-          <p:nvPr>
-            <p:ph idx="1"/>
-          </p:nvPr>
-        </p:nvSpPr>
-        <p:spPr/>
-        <p:txBody>
-          <a:bodyPr/>
-          <a:lstStyle/>
-          <a:p>
-            <a:r>
-              <a:rPr lang="en-US" dirty="0" smtClean="0"/>
-              <a:t>Questions – </a:t>
-            </a:r>
-            <a:r>
-              <a:rPr lang="en-US" dirty="0" smtClean="0"/>
-              <a:t>ask, but </a:t>
-            </a:r>
-            <a:r>
-              <a:rPr lang="en-US" dirty="0" smtClean="0"/>
-              <a:t>we may have to </a:t>
-            </a:r>
-            <a:r>
-              <a:rPr lang="en-US" dirty="0" smtClean="0"/>
-              <a:t>hold </a:t>
-            </a:r>
-            <a:r>
-              <a:rPr lang="en-US" dirty="0" smtClean="0"/>
-              <a:t>until end</a:t>
-            </a:r>
-          </a:p>
-          <a:p>
-            <a:r>
-              <a:rPr lang="en-US" dirty="0" smtClean="0"/>
-              <a:t>http://projectroundhouse.org</a:t>
-            </a:r>
-          </a:p>
-          <a:p>
-            <a:endParaRPr lang="en-US" dirty="0"/>
-          </a:p>
-        </p:txBody>
-      </p:sp>
-    </p:spTree>
-  </p:cSld>
-  <p:clrMapOvr>
-    <a:masterClrMapping/>
-  </p:clrMapOvr>
-  <p:timing>
-    <p:tnLst>
-      <p:par>
-        <p:cTn id="1" dur="indefinite" restart="never" nodeType="tmRoot"/>
-      </p:par>
-    </p:tnLst>
-  </p:timing>
-</p:sld>
-</file>
-
 <file path=ppt/slides/slide3.xml><?xml version="1.0" encoding="utf-8"?>
 <p:sld xmlns:a="http://schemas.openxmlformats.org/drawingml/2006/main" xmlns:r="http://schemas.openxmlformats.org/officeDocument/2006/relationships" xmlns:p="http://schemas.openxmlformats.org/presentationml/2006/main">
   <p:cSld>
@@ -7311,7 +7399,15 @@
           <a:p>
             <a:r>
               <a:rPr lang="en-US" dirty="0" smtClean="0"/>
-              <a:t>Past/Present</a:t>
+              <a:t>Rob “</a:t>
+            </a:r>
+            <a:r>
+              <a:rPr lang="en-US" dirty="0" err="1" smtClean="0"/>
+              <a:t>FerventCoder</a:t>
+            </a:r>
+            <a:r>
+              <a:rPr lang="en-US" dirty="0" smtClean="0"/>
+              <a:t>” Reynolds</a:t>
             </a:r>
             <a:endParaRPr lang="en-US" dirty="0"/>
           </a:p>
@@ -7334,19 +7430,66 @@
           <a:p>
             <a:r>
               <a:rPr lang="en-US" dirty="0" smtClean="0"/>
-              <a:t>Worked w/ a database of some sort</a:t>
+              <a:t>C# MVP</a:t>
             </a:r>
           </a:p>
           <a:p>
             <a:r>
               <a:rPr lang="en-US" dirty="0" smtClean="0"/>
-              <a:t>How do you get changes?</a:t>
+              <a:t>Work @ bank – locked doors / no money</a:t>
             </a:r>
           </a:p>
           <a:p>
             <a:r>
               <a:rPr lang="en-US" dirty="0" smtClean="0"/>
-              <a:t>Does it get any easier?</a:t>
+              <a:t>Been working w/.NET since early 1.0</a:t>
+            </a:r>
+          </a:p>
+          <a:p>
+            <a:r>
+              <a:rPr lang="en-US" sz="3200" dirty="0" smtClean="0">
+                <a:hlinkClick r:id="rId2"/>
+              </a:rPr>
+              <a:t>http://</a:t>
+            </a:r>
+            <a:r>
+              <a:rPr lang="en-US" sz="3200" dirty="0" smtClean="0">
+                <a:hlinkClick r:id="rId2"/>
+              </a:rPr>
+              <a:t>ferventcoder.com</a:t>
+            </a:r>
+            <a:endParaRPr lang="en-US" sz="3200" dirty="0" smtClean="0"/>
+          </a:p>
+          <a:p>
+            <a:r>
+              <a:rPr lang="en-US" sz="3200" dirty="0" smtClean="0">
+                <a:hlinkClick r:id="rId3"/>
+              </a:rPr>
+              <a:t>ferventcoder@gmail.com</a:t>
+            </a:r>
+            <a:r>
+              <a:rPr lang="en-US" sz="3200" dirty="0" smtClean="0"/>
+              <a:t> </a:t>
+            </a:r>
+          </a:p>
+          <a:p>
+            <a:r>
+              <a:rPr lang="en-US" sz="3200" dirty="0" smtClean="0"/>
+              <a:t>Twitter</a:t>
+            </a:r>
+            <a:r>
+              <a:rPr lang="en-US" sz="3200" dirty="0" smtClean="0"/>
+              <a:t>: ferventcoder</a:t>
+            </a:r>
+          </a:p>
+          <a:p>
+            <a:r>
+              <a:rPr lang="en-US" dirty="0" smtClean="0"/>
+              <a:t>Manage several OSS projects </a:t>
+            </a:r>
+            <a:r>
+              <a:rPr lang="en-US" smtClean="0"/>
+              <a:t>including this</a:t>
             </a:r>
             <a:endParaRPr lang="en-US" dirty="0"/>
           </a:p>
@@ -7401,7 +7544,7 @@
           <a:p>
             <a:r>
               <a:rPr lang="en-US" dirty="0" smtClean="0"/>
-              <a:t>Why do we need migrations?</a:t>
+              <a:t>Past/Present</a:t>
             </a:r>
             <a:endParaRPr lang="en-US" dirty="0"/>
           </a:p>
@@ -7417,30 +7560,27 @@
             <p:ph idx="1"/>
           </p:nvPr>
         </p:nvSpPr>
-        <p:spPr>
-          <a:xfrm>
-            <a:off x="914400" y="1371600"/>
-            <a:ext cx="7772400" cy="5105400"/>
-          </a:xfrm>
-        </p:spPr>
-        <p:txBody>
-          <a:bodyPr>
-            <a:normAutofit/>
-          </a:bodyPr>
+        <p:spPr/>
+        <p:txBody>
+          <a:bodyPr/>
           <a:lstStyle/>
           <a:p>
             <a:r>
               <a:rPr lang="en-US" dirty="0" smtClean="0"/>
-              <a:t>Things invariably will change</a:t>
+              <a:t>Worked w/ a database of some sort</a:t>
             </a:r>
           </a:p>
           <a:p>
             <a:r>
               <a:rPr lang="en-US" dirty="0" smtClean="0"/>
-              <a:t>Very few systems require no changes over the years</a:t>
-            </a:r>
-          </a:p>
-          <a:p>
+              <a:t>How do you get changes?</a:t>
+            </a:r>
+          </a:p>
+          <a:p>
+            <a:r>
+              <a:rPr lang="en-US" dirty="0" smtClean="0"/>
+              <a:t>Does it get any easier?</a:t>
+            </a:r>
             <a:endParaRPr lang="en-US" dirty="0"/>
           </a:p>
         </p:txBody>
@@ -7461,6 +7601,99 @@
 </file>
 
 <file path=ppt/slides/slide5.xml><?xml version="1.0" encoding="utf-8"?>
+<p:sld xmlns:a="http://schemas.openxmlformats.org/drawingml/2006/main" xmlns:r="http://schemas.openxmlformats.org/officeDocument/2006/relationships" xmlns:p="http://schemas.openxmlformats.org/presentationml/2006/main">
+  <p:cSld>
+    <p:spTree>
+      <p:nvGrpSpPr>
+        <p:cNvPr id="1" name=""/>
+        <p:cNvGrpSpPr/>
+        <p:nvPr/>
+      </p:nvGrpSpPr>
+      <p:grpSpPr>
+        <a:xfrm>
+          <a:off x="0" y="0"/>
+          <a:ext cx="0" cy="0"/>
+          <a:chOff x="0" y="0"/>
+          <a:chExt cx="0" cy="0"/>
+        </a:xfrm>
+      </p:grpSpPr>
+      <p:sp>
+        <p:nvSpPr>
+          <p:cNvPr id="2" name="Title 1"/>
+          <p:cNvSpPr>
+            <a:spLocks noGrp="1"/>
+          </p:cNvSpPr>
+          <p:nvPr>
+            <p:ph type="title"/>
+          </p:nvPr>
+        </p:nvSpPr>
+        <p:spPr/>
+        <p:txBody>
+          <a:bodyPr/>
+          <a:lstStyle/>
+          <a:p>
+            <a:r>
+              <a:rPr lang="en-US" dirty="0" smtClean="0"/>
+              <a:t>Why do we need migrations?</a:t>
+            </a:r>
+            <a:endParaRPr lang="en-US" dirty="0"/>
+          </a:p>
+        </p:txBody>
+      </p:sp>
+      <p:sp>
+        <p:nvSpPr>
+          <p:cNvPr id="3" name="Content Placeholder 2"/>
+          <p:cNvSpPr>
+            <a:spLocks noGrp="1"/>
+          </p:cNvSpPr>
+          <p:nvPr>
+            <p:ph idx="1"/>
+          </p:nvPr>
+        </p:nvSpPr>
+        <p:spPr>
+          <a:xfrm>
+            <a:off x="914400" y="1371600"/>
+            <a:ext cx="7772400" cy="5105400"/>
+          </a:xfrm>
+        </p:spPr>
+        <p:txBody>
+          <a:bodyPr>
+            <a:normAutofit/>
+          </a:bodyPr>
+          <a:lstStyle/>
+          <a:p>
+            <a:r>
+              <a:rPr lang="en-US" dirty="0" smtClean="0"/>
+              <a:t>Things invariably will change</a:t>
+            </a:r>
+          </a:p>
+          <a:p>
+            <a:r>
+              <a:rPr lang="en-US" dirty="0" smtClean="0"/>
+              <a:t>Very few systems require no changes over the years</a:t>
+            </a:r>
+          </a:p>
+          <a:p>
+            <a:endParaRPr lang="en-US" dirty="0"/>
+          </a:p>
+        </p:txBody>
+      </p:sp>
+    </p:spTree>
+  </p:cSld>
+  <p:clrMapOvr>
+    <a:masterClrMapping/>
+  </p:clrMapOvr>
+  <p:timing>
+    <p:tnLst>
+      <p:par>
+        <p:cTn id="1" dur="indefinite" restart="never" nodeType="tmRoot"/>
+      </p:par>
+    </p:tnLst>
+  </p:timing>
+</p:sld>
+</file>
+
+<file path=ppt/slides/slide6.xml><?xml version="1.0" encoding="utf-8"?>
 <p:sld xmlns:a="http://schemas.openxmlformats.org/drawingml/2006/main" xmlns:r="http://schemas.openxmlformats.org/officeDocument/2006/relationships" xmlns:p="http://schemas.openxmlformats.org/presentationml/2006/main">
   <p:cSld>
     <p:spTree>
@@ -8552,107 +8785,6 @@
 </p:sld>
 </file>
 
-<file path=ppt/slides/slide6.xml><?xml version="1.0" encoding="utf-8"?>
-<p:sld xmlns:a="http://schemas.openxmlformats.org/drawingml/2006/main" xmlns:r="http://schemas.openxmlformats.org/officeDocument/2006/relationships" xmlns:p="http://schemas.openxmlformats.org/presentationml/2006/main">
-  <p:cSld>
-    <p:spTree>
-      <p:nvGrpSpPr>
-        <p:cNvPr id="1" name=""/>
-        <p:cNvGrpSpPr/>
-        <p:nvPr/>
-      </p:nvGrpSpPr>
-      <p:grpSpPr>
-        <a:xfrm>
-          <a:off x="0" y="0"/>
-          <a:ext cx="0" cy="0"/>
-          <a:chOff x="0" y="0"/>
-          <a:chExt cx="0" cy="0"/>
-        </a:xfrm>
-      </p:grpSpPr>
-      <p:sp>
-        <p:nvSpPr>
-          <p:cNvPr id="2" name="Title 1"/>
-          <p:cNvSpPr>
-            <a:spLocks noGrp="1"/>
-          </p:cNvSpPr>
-          <p:nvPr>
-            <p:ph type="title"/>
-          </p:nvPr>
-        </p:nvSpPr>
-        <p:spPr/>
-        <p:txBody>
-          <a:bodyPr/>
-          <a:lstStyle/>
-          <a:p>
-            <a:r>
-              <a:rPr lang="en-US" dirty="0" smtClean="0"/>
-              <a:t>Let’s talk about Pain</a:t>
-            </a:r>
-            <a:endParaRPr lang="en-US" dirty="0"/>
-          </a:p>
-        </p:txBody>
-      </p:sp>
-      <p:sp>
-        <p:nvSpPr>
-          <p:cNvPr id="3" name="Content Placeholder 2"/>
-          <p:cNvSpPr>
-            <a:spLocks noGrp="1"/>
-          </p:cNvSpPr>
-          <p:nvPr>
-            <p:ph idx="1"/>
-          </p:nvPr>
-        </p:nvSpPr>
-        <p:spPr/>
-        <p:txBody>
-          <a:bodyPr/>
-          <a:lstStyle/>
-          <a:p>
-            <a:r>
-              <a:rPr lang="en-US" dirty="0" smtClean="0"/>
-              <a:t>How do you apply a database change one time?</a:t>
-            </a:r>
-          </a:p>
-          <a:p>
-            <a:r>
-              <a:rPr lang="en-US" dirty="0" smtClean="0"/>
-              <a:t>How do you keep all environments in sync?</a:t>
-            </a:r>
-          </a:p>
-          <a:p>
-            <a:r>
-              <a:rPr lang="en-US" sz="2800" dirty="0" smtClean="0"/>
-              <a:t>Databases change – updates with new/changed tables, views, stored procedures, etc</a:t>
-            </a:r>
-          </a:p>
-          <a:p>
-            <a:r>
-              <a:rPr lang="en-US" sz="2800" dirty="0" smtClean="0"/>
-              <a:t>Databases store data</a:t>
-            </a:r>
-          </a:p>
-          <a:p>
-            <a:r>
-              <a:rPr lang="en-US" sz="2800" dirty="0" smtClean="0"/>
-              <a:t>Deleting data is bad. Don’t be a bad monkey!</a:t>
-            </a:r>
-          </a:p>
-        </p:txBody>
-      </p:sp>
-    </p:spTree>
-  </p:cSld>
-  <p:clrMapOvr>
-    <a:masterClrMapping/>
-  </p:clrMapOvr>
-  <p:timing>
-    <p:tnLst>
-      <p:par>
-        <p:cTn id="1" dur="indefinite" restart="never" nodeType="tmRoot"/>
-      </p:par>
-    </p:tnLst>
-  </p:timing>
-</p:sld>
-</file>
-
 <file path=ppt/slides/slide7.xml><?xml version="1.0" encoding="utf-8"?>
 <p:sld xmlns:a="http://schemas.openxmlformats.org/drawingml/2006/main" xmlns:r="http://schemas.openxmlformats.org/officeDocument/2006/relationships" xmlns:p="http://schemas.openxmlformats.org/presentationml/2006/main">
   <p:cSld>
@@ -8687,7 +8819,7 @@
           <a:p>
             <a:r>
               <a:rPr lang="en-US" dirty="0" smtClean="0"/>
-              <a:t>What is RoundhousE?</a:t>
+              <a:t>Let’s talk about Pain</a:t>
             </a:r>
             <a:endParaRPr lang="en-US" dirty="0"/>
           </a:p>
@@ -8710,39 +8842,32 @@
           <a:p>
             <a:r>
               <a:rPr lang="en-US" dirty="0" smtClean="0"/>
-              <a:t>And why is kicking my database a good thing?</a:t>
+              <a:t>How do you apply a database change one time?</a:t>
             </a:r>
           </a:p>
           <a:p>
             <a:r>
               <a:rPr lang="en-US" dirty="0" smtClean="0"/>
-              <a:t>It’s easy to use</a:t>
-            </a:r>
-          </a:p>
-          <a:p>
-            <a:r>
-              <a:rPr lang="en-US" dirty="0" smtClean="0"/>
-              <a:t>Make your auditors smile</a:t>
-            </a:r>
-          </a:p>
-          <a:p>
-            <a:r>
-              <a:rPr lang="en-US" dirty="0" smtClean="0"/>
-              <a:t>Version your database</a:t>
-            </a:r>
-          </a:p>
-          <a:p>
-            <a:r>
-              <a:rPr lang="en-US" dirty="0" smtClean="0"/>
-              <a:t>It’s environment aware</a:t>
-            </a:r>
-          </a:p>
-          <a:p>
-            <a:r>
-              <a:rPr lang="en-US" dirty="0" smtClean="0"/>
-              <a:t>And that’s not even the cool stuff yet.</a:t>
-            </a:r>
-            <a:endParaRPr lang="en-US" dirty="0"/>
+              <a:t>How do you keep all environments in sync?</a:t>
+            </a:r>
+          </a:p>
+          <a:p>
+            <a:r>
+              <a:rPr lang="en-US" sz="2800" dirty="0" smtClean="0"/>
+              <a:t>Databases change – updates with new/changed tables, views, stored procedures, etc</a:t>
+            </a:r>
+          </a:p>
+          <a:p>
+            <a:r>
+              <a:rPr lang="en-US" sz="2800" dirty="0" smtClean="0"/>
+              <a:t>Databases store data</a:t>
+            </a:r>
+          </a:p>
+          <a:p>
+            <a:r>
+              <a:rPr lang="en-US" sz="2800" dirty="0" smtClean="0"/>
+              <a:t>Deleting data is bad. Don’t be a bad monkey!</a:t>
+            </a:r>
           </a:p>
         </p:txBody>
       </p:sp>
@@ -8795,7 +8920,7 @@
           <a:p>
             <a:r>
               <a:rPr lang="en-US" dirty="0" smtClean="0"/>
-              <a:t>What does it work with?</a:t>
+              <a:t>What is RoundhousE?</a:t>
             </a:r>
             <a:endParaRPr lang="en-US" dirty="0"/>
           </a:p>
@@ -8818,53 +8943,39 @@
           <a:p>
             <a:r>
               <a:rPr lang="en-US" dirty="0" smtClean="0"/>
-              <a:t>SQL Server 2000/2005/2008/Express</a:t>
+              <a:t>And why is kicking my database a good thing?</a:t>
             </a:r>
           </a:p>
           <a:p>
             <a:r>
               <a:rPr lang="en-US" dirty="0" smtClean="0"/>
-              <a:t>Oracle</a:t>
+              <a:t>It’s easy to use</a:t>
             </a:r>
           </a:p>
           <a:p>
             <a:r>
               <a:rPr lang="en-US" dirty="0" smtClean="0"/>
-              <a:t>Access</a:t>
-            </a:r>
-          </a:p>
-          <a:p>
-            <a:endParaRPr lang="en-US" dirty="0" smtClean="0"/>
+              <a:t>Make your auditors smile</a:t>
+            </a:r>
           </a:p>
           <a:p>
             <a:r>
               <a:rPr lang="en-US" dirty="0" smtClean="0"/>
-              <a:t>Soon:</a:t>
-            </a:r>
-          </a:p>
-          <a:p>
-            <a:pPr lvl="1"/>
-            <a:r>
-              <a:rPr lang="en-US" dirty="0" err="1" smtClean="0"/>
-              <a:t>MySQL</a:t>
-            </a:r>
-            <a:endParaRPr lang="en-US" dirty="0" smtClean="0"/>
-          </a:p>
-          <a:p>
-            <a:pPr lvl="1"/>
-            <a:r>
-              <a:rPr lang="en-US" dirty="0" err="1" smtClean="0"/>
-              <a:t>PostgreSQL</a:t>
-            </a:r>
-            <a:endParaRPr lang="en-US" dirty="0" smtClean="0"/>
-          </a:p>
-          <a:p>
-            <a:pPr lvl="1"/>
-            <a:r>
-              <a:rPr lang="en-US" dirty="0" err="1" smtClean="0"/>
-              <a:t>SQLite</a:t>
-            </a:r>
-            <a:endParaRPr lang="en-US" dirty="0" smtClean="0"/>
+              <a:t>Version your database</a:t>
+            </a:r>
+          </a:p>
+          <a:p>
+            <a:r>
+              <a:rPr lang="en-US" dirty="0" smtClean="0"/>
+              <a:t>It’s environment aware</a:t>
+            </a:r>
+          </a:p>
+          <a:p>
+            <a:r>
+              <a:rPr lang="en-US" dirty="0" smtClean="0"/>
+              <a:t>And that’s not even the cool stuff yet.</a:t>
+            </a:r>
+            <a:endParaRPr lang="en-US" dirty="0"/>
           </a:p>
         </p:txBody>
       </p:sp>
@@ -8916,8 +9027,8 @@
           <a:lstStyle/>
           <a:p>
             <a:r>
-              <a:rPr lang="en-US" dirty="0" err="1" smtClean="0"/>
-              <a:t>ChuckNorris</a:t>
+              <a:rPr lang="en-US" dirty="0" smtClean="0"/>
+              <a:t>What does it work with?</a:t>
             </a:r>
             <a:endParaRPr lang="en-US" dirty="0"/>
           </a:p>
@@ -8940,21 +9051,53 @@
           <a:p>
             <a:r>
               <a:rPr lang="en-US" dirty="0" smtClean="0"/>
-              <a:t>Suite of tools to help make developers more productive by scaffolding frameworks, etc</a:t>
+              <a:t>SQL Server 2000/2005/2008/Express</a:t>
             </a:r>
           </a:p>
           <a:p>
             <a:r>
               <a:rPr lang="en-US" dirty="0" smtClean="0"/>
-              <a:t>RoundhousE makes db migrations easy</a:t>
+              <a:t>Oracle</a:t>
             </a:r>
           </a:p>
           <a:p>
             <a:r>
               <a:rPr lang="en-US" dirty="0" smtClean="0"/>
-              <a:t>http://groups.google.com/group/chucknorrisframework</a:t>
-            </a:r>
-            <a:endParaRPr lang="en-US" dirty="0"/>
+              <a:t>Access</a:t>
+            </a:r>
+          </a:p>
+          <a:p>
+            <a:endParaRPr lang="en-US" dirty="0" smtClean="0"/>
+          </a:p>
+          <a:p>
+            <a:r>
+              <a:rPr lang="en-US" dirty="0" smtClean="0"/>
+              <a:t>Soon:</a:t>
+            </a:r>
+          </a:p>
+          <a:p>
+            <a:pPr lvl="1"/>
+            <a:r>
+              <a:rPr lang="en-US" dirty="0" err="1" smtClean="0"/>
+              <a:t>MySQL</a:t>
+            </a:r>
+            <a:endParaRPr lang="en-US" dirty="0" smtClean="0"/>
+          </a:p>
+          <a:p>
+            <a:pPr lvl="1"/>
+            <a:r>
+              <a:rPr lang="en-US" dirty="0" err="1" smtClean="0"/>
+              <a:t>PostgreSQL</a:t>
+            </a:r>
+            <a:endParaRPr lang="en-US" dirty="0" smtClean="0"/>
+          </a:p>
+          <a:p>
+            <a:pPr lvl="1"/>
+            <a:r>
+              <a:rPr lang="en-US" dirty="0" err="1" smtClean="0"/>
+              <a:t>SQLite</a:t>
+            </a:r>
+            <a:endParaRPr lang="en-US" dirty="0" smtClean="0"/>
           </a:p>
         </p:txBody>
       </p:sp>

</xml_diff>

<commit_message>
Upgrading to VS2010. Keeping it at 3.5 for now though. No longer building with a custom build (using _PublishedApplications instead). ILMerge works now for lib and msbuild. Starting the renmnants of nuget.
</commit_message>
<xml_diff>
--- a/docs/RoundhousEPresentation.pptx
+++ b/docs/RoundhousEPresentation.pptx
@@ -212,7 +212,7 @@
             <a:fld id="{50B9556B-D0FD-4B47-B68C-0681912A50B6}" type="datetimeFigureOut">
               <a:rPr lang="en-US" smtClean="0"/>
               <a:pPr/>
-              <a:t>10/26/2010</a:t>
+              <a:t>2/9/2011</a:t>
             </a:fld>
             <a:endParaRPr lang="en-US"/>
           </a:p>
@@ -381,6 +381,11 @@
         </p:txBody>
       </p:sp>
     </p:spTree>
+    <p:extLst>
+      <p:ext uri="{BB962C8B-B14F-4D97-AF65-F5344CB8AC3E}">
+        <p14:creationId xmlns:p14="http://schemas.microsoft.com/office/powerpoint/2010/main" val="234403476"/>
+      </p:ext>
+    </p:extLst>
   </p:cSld>
   <p:clrMap bg1="lt1" tx1="dk1" bg2="lt2" tx2="dk2" accent1="accent1" accent2="accent2" accent3="accent3" accent4="accent4" accent5="accent5" accent6="accent6" hlink="hlink" folHlink="folHlink"/>
   <p:notesStyle>
@@ -621,7 +626,7 @@
             <a:fld id="{08C7389D-B56E-4C42-BFE2-46A0FB05E106}" type="datetimeFigureOut">
               <a:rPr lang="en-US" smtClean="0"/>
               <a:pPr/>
-              <a:t>10/26/2010</a:t>
+              <a:t>2/9/2011</a:t>
             </a:fld>
             <a:endParaRPr lang="en-US"/>
           </a:p>
@@ -900,7 +905,7 @@
             <a:fld id="{08C7389D-B56E-4C42-BFE2-46A0FB05E106}" type="datetimeFigureOut">
               <a:rPr lang="en-US" smtClean="0"/>
               <a:pPr/>
-              <a:t>10/26/2010</a:t>
+              <a:t>2/9/2011</a:t>
             </a:fld>
             <a:endParaRPr lang="en-US"/>
           </a:p>
@@ -1087,7 +1092,7 @@
             <a:fld id="{08C7389D-B56E-4C42-BFE2-46A0FB05E106}" type="datetimeFigureOut">
               <a:rPr lang="en-US" smtClean="0"/>
               <a:pPr/>
-              <a:t>10/26/2010</a:t>
+              <a:t>2/9/2011</a:t>
             </a:fld>
             <a:endParaRPr lang="en-US"/>
           </a:p>
@@ -1274,7 +1279,7 @@
             <a:fld id="{08C7389D-B56E-4C42-BFE2-46A0FB05E106}" type="datetimeFigureOut">
               <a:rPr lang="en-US" smtClean="0"/>
               <a:pPr/>
-              <a:t>10/26/2010</a:t>
+              <a:t>2/9/2011</a:t>
             </a:fld>
             <a:endParaRPr lang="en-US"/>
           </a:p>
@@ -2759,7 +2764,7 @@
             <a:fld id="{08C7389D-B56E-4C42-BFE2-46A0FB05E106}" type="datetimeFigureOut">
               <a:rPr lang="en-US" smtClean="0"/>
               <a:pPr/>
-              <a:t>10/26/2010</a:t>
+              <a:t>2/9/2011</a:t>
             </a:fld>
             <a:endParaRPr lang="en-US"/>
           </a:p>
@@ -3361,7 +3366,7 @@
             <a:fld id="{08C7389D-B56E-4C42-BFE2-46A0FB05E106}" type="datetimeFigureOut">
               <a:rPr lang="en-US" smtClean="0"/>
               <a:pPr/>
-              <a:t>10/26/2010</a:t>
+              <a:t>2/9/2011</a:t>
             </a:fld>
             <a:endParaRPr lang="en-US"/>
           </a:p>
@@ -3800,7 +3805,7 @@
             <a:fld id="{08C7389D-B56E-4C42-BFE2-46A0FB05E106}" type="datetimeFigureOut">
               <a:rPr lang="en-US" smtClean="0"/>
               <a:pPr/>
-              <a:t>10/26/2010</a:t>
+              <a:t>2/9/2011</a:t>
             </a:fld>
             <a:endParaRPr lang="en-US"/>
           </a:p>
@@ -4363,7 +4368,7 @@
             <a:fld id="{08C7389D-B56E-4C42-BFE2-46A0FB05E106}" type="datetimeFigureOut">
               <a:rPr lang="en-US" smtClean="0"/>
               <a:pPr/>
-              <a:t>10/26/2010</a:t>
+              <a:t>2/9/2011</a:t>
             </a:fld>
             <a:endParaRPr lang="en-US"/>
           </a:p>
@@ -4461,7 +4466,7 @@
             <a:fld id="{08C7389D-B56E-4C42-BFE2-46A0FB05E106}" type="datetimeFigureOut">
               <a:rPr lang="en-US" smtClean="0"/>
               <a:pPr/>
-              <a:t>10/26/2010</a:t>
+              <a:t>2/9/2011</a:t>
             </a:fld>
             <a:endParaRPr lang="en-US"/>
           </a:p>
@@ -4717,7 +4722,7 @@
             <a:fld id="{08C7389D-B56E-4C42-BFE2-46A0FB05E106}" type="datetimeFigureOut">
               <a:rPr lang="en-US" smtClean="0"/>
               <a:pPr/>
-              <a:t>10/26/2010</a:t>
+              <a:t>2/9/2011</a:t>
             </a:fld>
             <a:endParaRPr lang="en-US"/>
           </a:p>
@@ -5440,7 +5445,7 @@
             <a:fld id="{08C7389D-B56E-4C42-BFE2-46A0FB05E106}" type="datetimeFigureOut">
               <a:rPr lang="en-US" smtClean="0"/>
               <a:pPr/>
-              <a:t>10/26/2010</a:t>
+              <a:t>2/9/2011</a:t>
             </a:fld>
             <a:endParaRPr lang="en-US"/>
           </a:p>
@@ -5667,7 +5672,7 @@
             <a:fld id="{08C7389D-B56E-4C42-BFE2-46A0FB05E106}" type="datetimeFigureOut">
               <a:rPr lang="en-US" smtClean="0"/>
               <a:pPr/>
-              <a:t>10/26/2010</a:t>
+              <a:t>2/9/2011</a:t>
             </a:fld>
             <a:endParaRPr lang="en-US"/>
           </a:p>
@@ -6144,25 +6149,20 @@
             <a:pPr algn="ctr"/>
             <a:r>
               <a:rPr lang="en-US" dirty="0" smtClean="0"/>
-              <a:t>Rob </a:t>
-            </a:r>
-            <a:r>
-              <a:rPr lang="en-US" dirty="0" smtClean="0"/>
-              <a:t>Reynolds</a:t>
+              <a:t>Rob Reynolds</a:t>
             </a:r>
             <a:r>
               <a:rPr lang="en-US" sz="1900" dirty="0" smtClean="0"/>
-              <a:t> </a:t>
+              <a:t> | </a:t>
             </a:r>
             <a:r>
               <a:rPr lang="en-US" sz="1900" dirty="0" smtClean="0"/>
-              <a:t>|</a:t>
+              <a:t>Heartland Crop Insurance </a:t>
             </a:r>
             <a:r>
               <a:rPr lang="en-US" sz="1900" dirty="0" smtClean="0"/>
-              <a:t> Federal Home Loan Bank Topeka | Topeka, KS</a:t>
-            </a:r>
-            <a:endParaRPr lang="en-US" sz="1900" dirty="0" smtClean="0"/>
+              <a:t>| Topeka, KS</a:t>
+            </a:r>
           </a:p>
         </p:txBody>
       </p:sp>
@@ -7164,15 +7164,7 @@
           <a:p>
             <a:r>
               <a:rPr lang="en-US" dirty="0" smtClean="0"/>
-              <a:t>Questions – </a:t>
-            </a:r>
-            <a:r>
-              <a:rPr lang="en-US" dirty="0" smtClean="0"/>
-              <a:t>ask</a:t>
-            </a:r>
-            <a:r>
-              <a:rPr lang="en-US" dirty="0" smtClean="0"/>
-              <a:t>, but we may have to hold until end</a:t>
+              <a:t>Questions – ask, but we may have to hold until end</a:t>
             </a:r>
           </a:p>
           <a:p>
@@ -7450,13 +7442,7 @@
               <a:rPr lang="en-US" sz="3200" dirty="0" smtClean="0">
                 <a:hlinkClick r:id="rId2"/>
               </a:rPr>
-              <a:t>http://</a:t>
-            </a:r>
-            <a:r>
-              <a:rPr lang="en-US" sz="3200" dirty="0" smtClean="0">
-                <a:hlinkClick r:id="rId2"/>
-              </a:rPr>
-              <a:t>ferventcoder.com</a:t>
+              <a:t>http://ferventcoder.com</a:t>
             </a:r>
             <a:endParaRPr lang="en-US" sz="3200" dirty="0" smtClean="0"/>
           </a:p>
@@ -7475,11 +7461,7 @@
           <a:p>
             <a:r>
               <a:rPr lang="en-US" sz="3200" dirty="0" smtClean="0"/>
-              <a:t>Twitter</a:t>
-            </a:r>
-            <a:r>
-              <a:rPr lang="en-US" sz="3200" dirty="0" smtClean="0"/>
-              <a:t>: ferventcoder</a:t>
+              <a:t>Twitter: ferventcoder</a:t>
             </a:r>
           </a:p>
           <a:p>

</xml_diff>